<commit_message>
did Germination index analysis
</commit_message>
<xml_diff>
--- a/germination_trials/seed_update_labmeeting.pptx
+++ b/germination_trials/seed_update_labmeeting.pptx
@@ -5,15 +5,18 @@
     <p:sldMasterId id="2147483648" r:id="rId1"/>
   </p:sldMasterIdLst>
   <p:notesMasterIdLst>
-    <p:notesMasterId r:id="rId8"/>
+    <p:notesMasterId r:id="rId11"/>
   </p:notesMasterIdLst>
   <p:sldIdLst>
-    <p:sldId id="256" r:id="rId2"/>
-    <p:sldId id="257" r:id="rId3"/>
-    <p:sldId id="258" r:id="rId4"/>
-    <p:sldId id="259" r:id="rId5"/>
-    <p:sldId id="260" r:id="rId6"/>
-    <p:sldId id="261" r:id="rId7"/>
+    <p:sldId id="263" r:id="rId2"/>
+    <p:sldId id="265" r:id="rId3"/>
+    <p:sldId id="262" r:id="rId4"/>
+    <p:sldId id="257" r:id="rId5"/>
+    <p:sldId id="258" r:id="rId6"/>
+    <p:sldId id="259" r:id="rId7"/>
+    <p:sldId id="260" r:id="rId8"/>
+    <p:sldId id="261" r:id="rId9"/>
+    <p:sldId id="264" r:id="rId10"/>
   </p:sldIdLst>
   <p:sldSz cx="12192000" cy="6858000"/>
   <p:notesSz cx="6858000" cy="9144000"/>
@@ -112,6 +115,11 @@
       </a:defRPr>
     </a:lvl9pPr>
   </p:defaultTextStyle>
+  <p:extLst>
+    <p:ext uri="{EFAFB233-063F-42B5-8137-9DF3F51BA10A}">
+      <p15:sldGuideLst xmlns:p15="http://schemas.microsoft.com/office/powerpoint/2012/main"/>
+    </p:ext>
+  </p:extLst>
 </p:presentation>
 </file>
 
@@ -197,7 +205,7 @@
           <a:p>
             <a:fld id="{D4CF87E2-4DF1-AC4F-8672-7C737A70B6C5}" type="datetimeFigureOut">
               <a:rPr lang="en-US" smtClean="0"/>
-              <a:t>1/16/19</a:t>
+              <a:t>1/22/19</a:t>
             </a:fld>
             <a:endParaRPr lang="en-US"/>
           </a:p>
@@ -529,7 +537,7 @@
           <a:p>
             <a:fld id="{5C9C3A39-9915-0A4F-AB78-AFD769A447D1}" type="slidenum">
               <a:rPr lang="en-US" smtClean="0"/>
-              <a:t>2</a:t>
+              <a:t>4</a:t>
             </a:fld>
             <a:endParaRPr lang="en-US"/>
           </a:p>
@@ -613,7 +621,7 @@
           <a:p>
             <a:fld id="{5C9C3A39-9915-0A4F-AB78-AFD769A447D1}" type="slidenum">
               <a:rPr lang="en-US" smtClean="0"/>
-              <a:t>3</a:t>
+              <a:t>5</a:t>
             </a:fld>
             <a:endParaRPr lang="en-US"/>
           </a:p>
@@ -623,6 +631,98 @@
     <p:extLst>
       <p:ext uri="{BB962C8B-B14F-4D97-AF65-F5344CB8AC3E}">
         <p14:creationId xmlns:p14="http://schemas.microsoft.com/office/powerpoint/2010/main" val="1307203891"/>
+      </p:ext>
+    </p:extLst>
+  </p:cSld>
+  <p:clrMapOvr>
+    <a:masterClrMapping/>
+  </p:clrMapOvr>
+</p:notes>
+</file>
+
+<file path=ppt/notesSlides/notesSlide3.xml><?xml version="1.0" encoding="utf-8"?>
+<p:notes xmlns:a="http://schemas.openxmlformats.org/drawingml/2006/main" xmlns:r="http://schemas.openxmlformats.org/officeDocument/2006/relationships" xmlns:p="http://schemas.openxmlformats.org/presentationml/2006/main">
+  <p:cSld>
+    <p:spTree>
+      <p:nvGrpSpPr>
+        <p:cNvPr id="1" name=""/>
+        <p:cNvGrpSpPr/>
+        <p:nvPr/>
+      </p:nvGrpSpPr>
+      <p:grpSpPr>
+        <a:xfrm>
+          <a:off x="0" y="0"/>
+          <a:ext cx="0" cy="0"/>
+          <a:chOff x="0" y="0"/>
+          <a:chExt cx="0" cy="0"/>
+        </a:xfrm>
+      </p:grpSpPr>
+      <p:sp>
+        <p:nvSpPr>
+          <p:cNvPr id="2" name="Slide Image Placeholder 1"/>
+          <p:cNvSpPr>
+            <a:spLocks noGrp="1" noRot="1" noChangeAspect="1"/>
+          </p:cNvSpPr>
+          <p:nvPr>
+            <p:ph type="sldImg"/>
+          </p:nvPr>
+        </p:nvSpPr>
+        <p:spPr/>
+      </p:sp>
+      <p:sp>
+        <p:nvSpPr>
+          <p:cNvPr id="3" name="Notes Placeholder 2"/>
+          <p:cNvSpPr>
+            <a:spLocks noGrp="1"/>
+          </p:cNvSpPr>
+          <p:nvPr>
+            <p:ph type="body" idx="1"/>
+          </p:nvPr>
+        </p:nvSpPr>
+        <p:spPr/>
+        <p:txBody>
+          <a:bodyPr/>
+          <a:lstStyle/>
+          <a:p>
+            <a:r>
+              <a:rPr lang="en-US" dirty="0"/>
+              <a:t>Germination index is hard to think of in real </a:t>
+            </a:r>
+            <a:r>
+              <a:rPr lang="en-US" dirty="0" err="1"/>
+              <a:t>tems</a:t>
+            </a:r>
+            <a:endParaRPr lang="en-US" dirty="0"/>
+          </a:p>
+        </p:txBody>
+      </p:sp>
+      <p:sp>
+        <p:nvSpPr>
+          <p:cNvPr id="4" name="Slide Number Placeholder 3"/>
+          <p:cNvSpPr>
+            <a:spLocks noGrp="1"/>
+          </p:cNvSpPr>
+          <p:nvPr>
+            <p:ph type="sldNum" sz="quarter" idx="10"/>
+          </p:nvPr>
+        </p:nvSpPr>
+        <p:spPr/>
+        <p:txBody>
+          <a:bodyPr/>
+          <a:lstStyle/>
+          <a:p>
+            <a:fld id="{5C9C3A39-9915-0A4F-AB78-AFD769A447D1}" type="slidenum">
+              <a:rPr lang="en-US" smtClean="0"/>
+              <a:t>7</a:t>
+            </a:fld>
+            <a:endParaRPr lang="en-US"/>
+          </a:p>
+        </p:txBody>
+      </p:sp>
+    </p:spTree>
+    <p:extLst>
+      <p:ext uri="{BB962C8B-B14F-4D97-AF65-F5344CB8AC3E}">
+        <p14:creationId xmlns:p14="http://schemas.microsoft.com/office/powerpoint/2010/main" val="3508592378"/>
       </p:ext>
     </p:extLst>
   </p:cSld>
@@ -779,7 +879,7 @@
           <a:p>
             <a:fld id="{4F1BA5B5-647B-EF49-A2C5-BE1321D4BC46}" type="datetimeFigureOut">
               <a:rPr lang="en-US" smtClean="0"/>
-              <a:t>1/16/19</a:t>
+              <a:t>1/22/19</a:t>
             </a:fld>
             <a:endParaRPr lang="en-US"/>
           </a:p>
@@ -977,7 +1077,7 @@
           <a:p>
             <a:fld id="{4F1BA5B5-647B-EF49-A2C5-BE1321D4BC46}" type="datetimeFigureOut">
               <a:rPr lang="en-US" smtClean="0"/>
-              <a:t>1/16/19</a:t>
+              <a:t>1/22/19</a:t>
             </a:fld>
             <a:endParaRPr lang="en-US"/>
           </a:p>
@@ -1185,7 +1285,7 @@
           <a:p>
             <a:fld id="{4F1BA5B5-647B-EF49-A2C5-BE1321D4BC46}" type="datetimeFigureOut">
               <a:rPr lang="en-US" smtClean="0"/>
-              <a:t>1/16/19</a:t>
+              <a:t>1/22/19</a:t>
             </a:fld>
             <a:endParaRPr lang="en-US"/>
           </a:p>
@@ -1383,7 +1483,7 @@
           <a:p>
             <a:fld id="{4F1BA5B5-647B-EF49-A2C5-BE1321D4BC46}" type="datetimeFigureOut">
               <a:rPr lang="en-US" smtClean="0"/>
-              <a:t>1/16/19</a:t>
+              <a:t>1/22/19</a:t>
             </a:fld>
             <a:endParaRPr lang="en-US"/>
           </a:p>
@@ -1658,7 +1758,7 @@
           <a:p>
             <a:fld id="{4F1BA5B5-647B-EF49-A2C5-BE1321D4BC46}" type="datetimeFigureOut">
               <a:rPr lang="en-US" smtClean="0"/>
-              <a:t>1/16/19</a:t>
+              <a:t>1/22/19</a:t>
             </a:fld>
             <a:endParaRPr lang="en-US"/>
           </a:p>
@@ -1923,7 +2023,7 @@
           <a:p>
             <a:fld id="{4F1BA5B5-647B-EF49-A2C5-BE1321D4BC46}" type="datetimeFigureOut">
               <a:rPr lang="en-US" smtClean="0"/>
-              <a:t>1/16/19</a:t>
+              <a:t>1/22/19</a:t>
             </a:fld>
             <a:endParaRPr lang="en-US"/>
           </a:p>
@@ -2335,7 +2435,7 @@
           <a:p>
             <a:fld id="{4F1BA5B5-647B-EF49-A2C5-BE1321D4BC46}" type="datetimeFigureOut">
               <a:rPr lang="en-US" smtClean="0"/>
-              <a:t>1/16/19</a:t>
+              <a:t>1/22/19</a:t>
             </a:fld>
             <a:endParaRPr lang="en-US"/>
           </a:p>
@@ -2476,7 +2576,7 @@
           <a:p>
             <a:fld id="{4F1BA5B5-647B-EF49-A2C5-BE1321D4BC46}" type="datetimeFigureOut">
               <a:rPr lang="en-US" smtClean="0"/>
-              <a:t>1/16/19</a:t>
+              <a:t>1/22/19</a:t>
             </a:fld>
             <a:endParaRPr lang="en-US"/>
           </a:p>
@@ -2589,7 +2689,7 @@
           <a:p>
             <a:fld id="{4F1BA5B5-647B-EF49-A2C5-BE1321D4BC46}" type="datetimeFigureOut">
               <a:rPr lang="en-US" smtClean="0"/>
-              <a:t>1/16/19</a:t>
+              <a:t>1/22/19</a:t>
             </a:fld>
             <a:endParaRPr lang="en-US"/>
           </a:p>
@@ -2900,7 +3000,7 @@
           <a:p>
             <a:fld id="{4F1BA5B5-647B-EF49-A2C5-BE1321D4BC46}" type="datetimeFigureOut">
               <a:rPr lang="en-US" smtClean="0"/>
-              <a:t>1/16/19</a:t>
+              <a:t>1/22/19</a:t>
             </a:fld>
             <a:endParaRPr lang="en-US"/>
           </a:p>
@@ -3188,7 +3288,7 @@
           <a:p>
             <a:fld id="{4F1BA5B5-647B-EF49-A2C5-BE1321D4BC46}" type="datetimeFigureOut">
               <a:rPr lang="en-US" smtClean="0"/>
-              <a:t>1/16/19</a:t>
+              <a:t>1/22/19</a:t>
             </a:fld>
             <a:endParaRPr lang="en-US"/>
           </a:p>
@@ -3429,7 +3529,7 @@
           <a:p>
             <a:fld id="{4F1BA5B5-647B-EF49-A2C5-BE1321D4BC46}" type="datetimeFigureOut">
               <a:rPr lang="en-US" smtClean="0"/>
-              <a:t>1/16/19</a:t>
+              <a:t>1/22/19</a:t>
             </a:fld>
             <a:endParaRPr lang="en-US"/>
           </a:p>
@@ -3867,7 +3967,10 @@
           <a:bodyPr/>
           <a:lstStyle/>
           <a:p>
-            <a:endParaRPr lang="en-US"/>
+            <a:r>
+              <a:rPr lang="en-US" dirty="0"/>
+              <a:t>Germination Update</a:t>
+            </a:r>
           </a:p>
         </p:txBody>
       </p:sp>
@@ -3899,7 +4002,7 @@
     </p:spTree>
     <p:extLst>
       <p:ext uri="{BB962C8B-B14F-4D97-AF65-F5344CB8AC3E}">
-        <p14:creationId xmlns:p14="http://schemas.microsoft.com/office/powerpoint/2010/main" val="985341247"/>
+        <p14:creationId xmlns:p14="http://schemas.microsoft.com/office/powerpoint/2010/main" val="3182189343"/>
       </p:ext>
     </p:extLst>
   </p:cSld>
@@ -3926,24 +4029,107 @@
           <a:chExt cx="0" cy="0"/>
         </a:xfrm>
       </p:grpSpPr>
+      <p:sp>
+        <p:nvSpPr>
+          <p:cNvPr id="2" name="TextBox 1">
+            <a:extLst>
+              <a:ext uri="{FF2B5EF4-FFF2-40B4-BE49-F238E27FC236}">
+                <a16:creationId xmlns:a16="http://schemas.microsoft.com/office/drawing/2014/main" id="{EFC08C6B-3BED-9C4A-AEEE-86217C435C7E}"/>
+              </a:ext>
+            </a:extLst>
+          </p:cNvPr>
+          <p:cNvSpPr txBox="1"/>
+          <p:nvPr/>
+        </p:nvSpPr>
+        <p:spPr>
+          <a:xfrm>
+            <a:off x="2438400" y="1444487"/>
+            <a:ext cx="8547652" cy="923330"/>
+          </a:xfrm>
+          <a:prstGeom prst="rect">
+            <a:avLst/>
+          </a:prstGeom>
+          <a:noFill/>
+        </p:spPr>
+        <p:txBody>
+          <a:bodyPr wrap="square" rtlCol="0">
+            <a:spAutoFit/>
+          </a:bodyPr>
+          <a:lstStyle/>
+          <a:p>
+            <a:r>
+              <a:rPr lang="en-US" dirty="0"/>
+              <a:t>GOALS:</a:t>
+            </a:r>
+          </a:p>
+          <a:p>
+            <a:pPr marL="342900" indent="-342900">
+              <a:buFont typeface="+mj-lt"/>
+              <a:buAutoNum type="arabicPeriod"/>
+            </a:pPr>
+            <a:r>
+              <a:rPr lang="en-US" dirty="0"/>
+              <a:t>Species selection for competition trial</a:t>
+            </a:r>
+          </a:p>
+          <a:p>
+            <a:pPr marL="342900" indent="-342900">
+              <a:buFont typeface="+mj-lt"/>
+              <a:buAutoNum type="arabicPeriod"/>
+            </a:pPr>
+            <a:r>
+              <a:rPr lang="en-US" dirty="0"/>
+              <a:t>Quantify sensitivity to winter temperature for a suite of temperate herbs</a:t>
+            </a:r>
+          </a:p>
+        </p:txBody>
+      </p:sp>
+    </p:spTree>
+    <p:extLst>
+      <p:ext uri="{BB962C8B-B14F-4D97-AF65-F5344CB8AC3E}">
+        <p14:creationId xmlns:p14="http://schemas.microsoft.com/office/powerpoint/2010/main" val="3318225598"/>
+      </p:ext>
+    </p:extLst>
+  </p:cSld>
+  <p:clrMapOvr>
+    <a:masterClrMapping/>
+  </p:clrMapOvr>
+</p:sld>
+</file>
+
+<file path=ppt/slides/slide3.xml><?xml version="1.0" encoding="utf-8"?>
+<p:sld xmlns:a="http://schemas.openxmlformats.org/drawingml/2006/main" xmlns:r="http://schemas.openxmlformats.org/officeDocument/2006/relationships" xmlns:p="http://schemas.openxmlformats.org/presentationml/2006/main">
+  <p:cSld>
+    <p:spTree>
+      <p:nvGrpSpPr>
+        <p:cNvPr id="1" name=""/>
+        <p:cNvGrpSpPr/>
+        <p:nvPr/>
+      </p:nvGrpSpPr>
+      <p:grpSpPr>
+        <a:xfrm>
+          <a:off x="0" y="0"/>
+          <a:ext cx="0" cy="0"/>
+          <a:chOff x="0" y="0"/>
+          <a:chExt cx="0" cy="0"/>
+        </a:xfrm>
+      </p:grpSpPr>
       <p:pic>
         <p:nvPicPr>
-          <p:cNvPr id="6" name="Content Placeholder 5">
-            <a:extLst>
-              <a:ext uri="{FF2B5EF4-FFF2-40B4-BE49-F238E27FC236}">
-                <a16:creationId xmlns:a16="http://schemas.microsoft.com/office/drawing/2014/main" id="{A452E3CD-7760-D042-9426-CFB92C190B5D}"/>
+          <p:cNvPr id="2" name="Content Placeholder 5">
+            <a:extLst>
+              <a:ext uri="{FF2B5EF4-FFF2-40B4-BE49-F238E27FC236}">
+                <a16:creationId xmlns:a16="http://schemas.microsoft.com/office/drawing/2014/main" id="{5732D0DE-7E3A-1346-AE26-2AFFA8950314}"/>
               </a:ext>
             </a:extLst>
           </p:cNvPr>
           <p:cNvPicPr>
-            <a:picLocks noGrp="1" noChangeAspect="1"/>
+            <a:picLocks noChangeAspect="1"/>
           </p:cNvPicPr>
-          <p:nvPr>
-            <p:ph sz="half" idx="1"/>
-          </p:nvPr>
+          <p:nvPr/>
         </p:nvPicPr>
         <p:blipFill rotWithShape="1">
-          <a:blip r:embed="rId3" cstate="print">
+          <a:blip r:embed="rId2" cstate="print">
             <a:extLst>
               <a:ext uri="{28A0092B-C50C-407E-A947-70E740481C1C}">
                 <a14:useLocalDpi xmlns:a14="http://schemas.microsoft.com/office/drawing/2010/main"/>
@@ -3955,8 +4141,8 @@
         </p:blipFill>
         <p:spPr>
           <a:xfrm rot="19686489">
-            <a:off x="158776" y="1585721"/>
-            <a:ext cx="3985827" cy="3618787"/>
+            <a:off x="3453097" y="744814"/>
+            <a:ext cx="5125563" cy="4653568"/>
           </a:xfrm>
           <a:prstGeom prst="ellipse">
             <a:avLst/>
@@ -3987,6 +4173,36 @@
           </a:sp3d>
         </p:spPr>
       </p:pic>
+    </p:spTree>
+    <p:extLst>
+      <p:ext uri="{BB962C8B-B14F-4D97-AF65-F5344CB8AC3E}">
+        <p14:creationId xmlns:p14="http://schemas.microsoft.com/office/powerpoint/2010/main" val="289332664"/>
+      </p:ext>
+    </p:extLst>
+  </p:cSld>
+  <p:clrMapOvr>
+    <a:masterClrMapping/>
+  </p:clrMapOvr>
+</p:sld>
+</file>
+
+<file path=ppt/slides/slide4.xml><?xml version="1.0" encoding="utf-8"?>
+<p:sld xmlns:a="http://schemas.openxmlformats.org/drawingml/2006/main" xmlns:r="http://schemas.openxmlformats.org/officeDocument/2006/relationships" xmlns:p="http://schemas.openxmlformats.org/presentationml/2006/main">
+  <p:cSld>
+    <p:spTree>
+      <p:nvGrpSpPr>
+        <p:cNvPr id="1" name=""/>
+        <p:cNvGrpSpPr/>
+        <p:nvPr/>
+      </p:nvGrpSpPr>
+      <p:grpSpPr>
+        <a:xfrm>
+          <a:off x="0" y="0"/>
+          <a:ext cx="0" cy="0"/>
+          <a:chOff x="0" y="0"/>
+          <a:chExt cx="0" cy="0"/>
+        </a:xfrm>
+      </p:grpSpPr>
       <p:cxnSp>
         <p:nvCxnSpPr>
           <p:cNvPr id="10" name="Straight Connector 9">
@@ -4459,6 +4675,171 @@
           </a:p>
         </p:txBody>
       </p:sp>
+      <p:pic>
+        <p:nvPicPr>
+          <p:cNvPr id="3" name="Picture 2">
+            <a:extLst>
+              <a:ext uri="{FF2B5EF4-FFF2-40B4-BE49-F238E27FC236}">
+                <a16:creationId xmlns:a16="http://schemas.microsoft.com/office/drawing/2014/main" id="{0B3FF0B0-B901-074C-AB6E-2EDED8E637B5}"/>
+              </a:ext>
+            </a:extLst>
+          </p:cNvPr>
+          <p:cNvPicPr>
+            <a:picLocks noChangeAspect="1"/>
+          </p:cNvPicPr>
+          <p:nvPr/>
+        </p:nvPicPr>
+        <p:blipFill>
+          <a:blip r:embed="rId3"/>
+          <a:stretch>
+            <a:fillRect/>
+          </a:stretch>
+        </p:blipFill>
+        <p:spPr>
+          <a:xfrm>
+            <a:off x="-60431" y="-4"/>
+            <a:ext cx="5371539" cy="6858003"/>
+          </a:xfrm>
+          <a:prstGeom prst="rect">
+            <a:avLst/>
+          </a:prstGeom>
+        </p:spPr>
+      </p:pic>
+      <p:sp>
+        <p:nvSpPr>
+          <p:cNvPr id="4" name="TextBox 3">
+            <a:extLst>
+              <a:ext uri="{FF2B5EF4-FFF2-40B4-BE49-F238E27FC236}">
+                <a16:creationId xmlns:a16="http://schemas.microsoft.com/office/drawing/2014/main" id="{DB3AE387-9906-634D-B8D1-A0EF76766FF0}"/>
+              </a:ext>
+            </a:extLst>
+          </p:cNvPr>
+          <p:cNvSpPr txBox="1"/>
+          <p:nvPr/>
+        </p:nvSpPr>
+        <p:spPr>
+          <a:xfrm>
+            <a:off x="6205708" y="6215063"/>
+            <a:ext cx="2088183" cy="369332"/>
+          </a:xfrm>
+          <a:prstGeom prst="rect">
+            <a:avLst/>
+          </a:prstGeom>
+          <a:noFill/>
+        </p:spPr>
+        <p:txBody>
+          <a:bodyPr wrap="square" rtlCol="0">
+            <a:spAutoFit/>
+          </a:bodyPr>
+          <a:lstStyle/>
+          <a:p>
+            <a:r>
+              <a:rPr lang="en-US" dirty="0"/>
+              <a:t>Kader 2005</a:t>
+            </a:r>
+          </a:p>
+        </p:txBody>
+      </p:sp>
+      <p:sp>
+        <p:nvSpPr>
+          <p:cNvPr id="5" name="Rectangle 4">
+            <a:extLst>
+              <a:ext uri="{FF2B5EF4-FFF2-40B4-BE49-F238E27FC236}">
+                <a16:creationId xmlns:a16="http://schemas.microsoft.com/office/drawing/2014/main" id="{1E28698D-923A-CB4A-AB01-43A78B8FDD6B}"/>
+              </a:ext>
+            </a:extLst>
+          </p:cNvPr>
+          <p:cNvSpPr/>
+          <p:nvPr/>
+        </p:nvSpPr>
+        <p:spPr>
+          <a:xfrm>
+            <a:off x="442913" y="3957638"/>
+            <a:ext cx="4214812" cy="226676"/>
+          </a:xfrm>
+          <a:prstGeom prst="rect">
+            <a:avLst/>
+          </a:prstGeom>
+          <a:noFill/>
+          <a:ln>
+            <a:solidFill>
+              <a:schemeClr val="accent1"/>
+            </a:solidFill>
+          </a:ln>
+        </p:spPr>
+        <p:style>
+          <a:lnRef idx="2">
+            <a:schemeClr val="accent6"/>
+          </a:lnRef>
+          <a:fillRef idx="1">
+            <a:schemeClr val="lt1"/>
+          </a:fillRef>
+          <a:effectRef idx="0">
+            <a:schemeClr val="accent6"/>
+          </a:effectRef>
+          <a:fontRef idx="minor">
+            <a:schemeClr val="dk1"/>
+          </a:fontRef>
+        </p:style>
+        <p:txBody>
+          <a:bodyPr rtlCol="0" anchor="ctr"/>
+          <a:lstStyle/>
+          <a:p>
+            <a:pPr algn="ctr"/>
+            <a:endParaRPr lang="en-US" dirty="0"/>
+          </a:p>
+        </p:txBody>
+      </p:sp>
+      <p:sp>
+        <p:nvSpPr>
+          <p:cNvPr id="18" name="Rectangle 17">
+            <a:extLst>
+              <a:ext uri="{FF2B5EF4-FFF2-40B4-BE49-F238E27FC236}">
+                <a16:creationId xmlns:a16="http://schemas.microsoft.com/office/drawing/2014/main" id="{1596415C-7C26-2C4E-B13E-51147E2E7349}"/>
+              </a:ext>
+            </a:extLst>
+          </p:cNvPr>
+          <p:cNvSpPr/>
+          <p:nvPr/>
+        </p:nvSpPr>
+        <p:spPr>
+          <a:xfrm>
+            <a:off x="423036" y="4255810"/>
+            <a:ext cx="4214812" cy="226676"/>
+          </a:xfrm>
+          <a:prstGeom prst="rect">
+            <a:avLst/>
+          </a:prstGeom>
+          <a:noFill/>
+          <a:ln>
+            <a:solidFill>
+              <a:srgbClr val="FF0000"/>
+            </a:solidFill>
+          </a:ln>
+        </p:spPr>
+        <p:style>
+          <a:lnRef idx="2">
+            <a:schemeClr val="accent6"/>
+          </a:lnRef>
+          <a:fillRef idx="1">
+            <a:schemeClr val="lt1"/>
+          </a:fillRef>
+          <a:effectRef idx="0">
+            <a:schemeClr val="accent6"/>
+          </a:effectRef>
+          <a:fontRef idx="minor">
+            <a:schemeClr val="dk1"/>
+          </a:fontRef>
+        </p:style>
+        <p:txBody>
+          <a:bodyPr rtlCol="0" anchor="ctr"/>
+          <a:lstStyle/>
+          <a:p>
+            <a:pPr algn="ctr"/>
+            <a:endParaRPr lang="en-US" dirty="0"/>
+          </a:p>
+        </p:txBody>
+      </p:sp>
     </p:spTree>
     <p:extLst>
       <p:ext uri="{BB962C8B-B14F-4D97-AF65-F5344CB8AC3E}">
@@ -4472,7 +4853,7 @@
 </p:sld>
 </file>
 
-<file path=ppt/slides/slide3.xml><?xml version="1.0" encoding="utf-8"?>
+<file path=ppt/slides/slide5.xml><?xml version="1.0" encoding="utf-8"?>
 <p:sld xmlns:a="http://schemas.openxmlformats.org/drawingml/2006/main" xmlns:r="http://schemas.openxmlformats.org/officeDocument/2006/relationships" xmlns:p="http://schemas.openxmlformats.org/presentationml/2006/main">
   <p:cSld>
     <p:spTree>
@@ -4491,10 +4872,100 @@
       </p:grpSpPr>
       <p:pic>
         <p:nvPicPr>
-          <p:cNvPr id="6" name="Content Placeholder 5">
-            <a:extLst>
-              <a:ext uri="{FF2B5EF4-FFF2-40B4-BE49-F238E27FC236}">
-                <a16:creationId xmlns:a16="http://schemas.microsoft.com/office/drawing/2014/main" id="{A452E3CD-7760-D042-9426-CFB92C190B5D}"/>
+          <p:cNvPr id="11" name="Picture 10">
+            <a:extLst>
+              <a:ext uri="{FF2B5EF4-FFF2-40B4-BE49-F238E27FC236}">
+                <a16:creationId xmlns:a16="http://schemas.microsoft.com/office/drawing/2014/main" id="{C204B580-252B-E84A-AF12-5E6E3F6B0284}"/>
+              </a:ext>
+            </a:extLst>
+          </p:cNvPr>
+          <p:cNvPicPr>
+            <a:picLocks noChangeAspect="1"/>
+          </p:cNvPicPr>
+          <p:nvPr/>
+        </p:nvPicPr>
+        <p:blipFill>
+          <a:blip r:embed="rId3"/>
+          <a:stretch>
+            <a:fillRect/>
+          </a:stretch>
+        </p:blipFill>
+        <p:spPr>
+          <a:xfrm>
+            <a:off x="184921" y="313581"/>
+            <a:ext cx="5076191" cy="6398646"/>
+          </a:xfrm>
+          <a:prstGeom prst="rect">
+            <a:avLst/>
+          </a:prstGeom>
+        </p:spPr>
+      </p:pic>
+      <p:pic>
+        <p:nvPicPr>
+          <p:cNvPr id="14" name="Picture 13">
+            <a:extLst>
+              <a:ext uri="{FF2B5EF4-FFF2-40B4-BE49-F238E27FC236}">
+                <a16:creationId xmlns:a16="http://schemas.microsoft.com/office/drawing/2014/main" id="{2C451898-16D3-E742-892D-681DB91D36FB}"/>
+              </a:ext>
+            </a:extLst>
+          </p:cNvPr>
+          <p:cNvPicPr>
+            <a:picLocks noChangeAspect="1"/>
+          </p:cNvPicPr>
+          <p:nvPr/>
+        </p:nvPicPr>
+        <p:blipFill>
+          <a:blip r:embed="rId4"/>
+          <a:stretch>
+            <a:fillRect/>
+          </a:stretch>
+        </p:blipFill>
+        <p:spPr>
+          <a:xfrm>
+            <a:off x="5052390" y="583094"/>
+            <a:ext cx="6808500" cy="5261114"/>
+          </a:xfrm>
+          <a:prstGeom prst="rect">
+            <a:avLst/>
+          </a:prstGeom>
+        </p:spPr>
+      </p:pic>
+    </p:spTree>
+    <p:extLst>
+      <p:ext uri="{BB962C8B-B14F-4D97-AF65-F5344CB8AC3E}">
+        <p14:creationId xmlns:p14="http://schemas.microsoft.com/office/powerpoint/2010/main" val="3845122436"/>
+      </p:ext>
+    </p:extLst>
+  </p:cSld>
+  <p:clrMapOvr>
+    <a:masterClrMapping/>
+  </p:clrMapOvr>
+</p:sld>
+</file>
+
+<file path=ppt/slides/slide6.xml><?xml version="1.0" encoding="utf-8"?>
+<p:sld xmlns:a="http://schemas.openxmlformats.org/drawingml/2006/main" xmlns:r="http://schemas.openxmlformats.org/officeDocument/2006/relationships" xmlns:p="http://schemas.openxmlformats.org/presentationml/2006/main">
+  <p:cSld>
+    <p:spTree>
+      <p:nvGrpSpPr>
+        <p:cNvPr id="1" name=""/>
+        <p:cNvGrpSpPr/>
+        <p:nvPr/>
+      </p:nvGrpSpPr>
+      <p:grpSpPr>
+        <a:xfrm>
+          <a:off x="0" y="0"/>
+          <a:ext cx="0" cy="0"/>
+          <a:chOff x="0" y="0"/>
+          <a:chExt cx="0" cy="0"/>
+        </a:xfrm>
+      </p:grpSpPr>
+      <p:pic>
+        <p:nvPicPr>
+          <p:cNvPr id="8" name="Content Placeholder 5">
+            <a:extLst>
+              <a:ext uri="{FF2B5EF4-FFF2-40B4-BE49-F238E27FC236}">
+                <a16:creationId xmlns:a16="http://schemas.microsoft.com/office/drawing/2014/main" id="{E23F09F2-413B-924F-8A4C-4CD96FFA5850}"/>
               </a:ext>
             </a:extLst>
           </p:cNvPr>
@@ -4506,7 +4977,7 @@
           </p:nvPr>
         </p:nvPicPr>
         <p:blipFill rotWithShape="1">
-          <a:blip r:embed="rId3" cstate="print">
+          <a:blip r:embed="rId2" cstate="print">
             <a:extLst>
               <a:ext uri="{28A0092B-C50C-407E-A947-70E740481C1C}">
                 <a14:useLocalDpi xmlns:a14="http://schemas.microsoft.com/office/drawing/2010/main"/>
@@ -4518,8 +4989,8 @@
         </p:blipFill>
         <p:spPr>
           <a:xfrm rot="19686489">
-            <a:off x="384587" y="372578"/>
-            <a:ext cx="5117902" cy="4646613"/>
+            <a:off x="590628" y="559285"/>
+            <a:ext cx="5125563" cy="4653568"/>
           </a:xfrm>
           <a:prstGeom prst="ellipse">
             <a:avLst/>
@@ -4552,31 +5023,195 @@
       </p:pic>
       <p:sp>
         <p:nvSpPr>
-          <p:cNvPr id="4" name="Content Placeholder 3">
-            <a:extLst>
-              <a:ext uri="{FF2B5EF4-FFF2-40B4-BE49-F238E27FC236}">
-                <a16:creationId xmlns:a16="http://schemas.microsoft.com/office/drawing/2014/main" id="{4A2E1E14-88CE-C042-A2C1-3B0499309C5C}"/>
-              </a:ext>
-            </a:extLst>
-          </p:cNvPr>
-          <p:cNvSpPr>
-            <a:spLocks noGrp="1"/>
-          </p:cNvSpPr>
-          <p:nvPr>
-            <p:ph sz="half" idx="2"/>
-          </p:nvPr>
+          <p:cNvPr id="9" name="Content Placeholder 3">
+            <a:extLst>
+              <a:ext uri="{FF2B5EF4-FFF2-40B4-BE49-F238E27FC236}">
+                <a16:creationId xmlns:a16="http://schemas.microsoft.com/office/drawing/2014/main" id="{29D8D491-7A5C-064E-B59C-248B65727903}"/>
+              </a:ext>
+            </a:extLst>
+          </p:cNvPr>
+          <p:cNvSpPr txBox="1">
+            <a:spLocks/>
+          </p:cNvSpPr>
+          <p:nvPr/>
         </p:nvSpPr>
         <p:spPr>
           <a:xfrm>
-            <a:off x="6772281" y="471491"/>
-            <a:ext cx="4829175" cy="2414579"/>
+            <a:off x="6308035" y="524499"/>
+            <a:ext cx="5658678" cy="5425726"/>
           </a:xfrm>
+          <a:prstGeom prst="rect">
+            <a:avLst/>
+          </a:prstGeom>
         </p:spPr>
         <p:txBody>
           <a:bodyPr>
-            <a:normAutofit fontScale="85000" lnSpcReduction="20000"/>
+            <a:normAutofit/>
           </a:bodyPr>
-          <a:lstStyle/>
+          <a:lstStyle>
+            <a:lvl1pPr marL="228600" indent="-228600" algn="l" defTabSz="914400" rtl="0" eaLnBrk="1" latinLnBrk="0" hangingPunct="1">
+              <a:lnSpc>
+                <a:spcPct val="90000"/>
+              </a:lnSpc>
+              <a:spcBef>
+                <a:spcPts val="1000"/>
+              </a:spcBef>
+              <a:buFont typeface="Arial" panose="020B0604020202020204" pitchFamily="34" charset="0"/>
+              <a:buChar char="•"/>
+              <a:defRPr sz="2800" kern="1200">
+                <a:solidFill>
+                  <a:schemeClr val="tx1"/>
+                </a:solidFill>
+                <a:latin typeface="+mn-lt"/>
+                <a:ea typeface="+mn-ea"/>
+                <a:cs typeface="+mn-cs"/>
+              </a:defRPr>
+            </a:lvl1pPr>
+            <a:lvl2pPr marL="685800" indent="-228600" algn="l" defTabSz="914400" rtl="0" eaLnBrk="1" latinLnBrk="0" hangingPunct="1">
+              <a:lnSpc>
+                <a:spcPct val="90000"/>
+              </a:lnSpc>
+              <a:spcBef>
+                <a:spcPts val="500"/>
+              </a:spcBef>
+              <a:buFont typeface="Arial" panose="020B0604020202020204" pitchFamily="34" charset="0"/>
+              <a:buChar char="•"/>
+              <a:defRPr sz="2400" kern="1200">
+                <a:solidFill>
+                  <a:schemeClr val="tx1"/>
+                </a:solidFill>
+                <a:latin typeface="+mn-lt"/>
+                <a:ea typeface="+mn-ea"/>
+                <a:cs typeface="+mn-cs"/>
+              </a:defRPr>
+            </a:lvl2pPr>
+            <a:lvl3pPr marL="1143000" indent="-228600" algn="l" defTabSz="914400" rtl="0" eaLnBrk="1" latinLnBrk="0" hangingPunct="1">
+              <a:lnSpc>
+                <a:spcPct val="90000"/>
+              </a:lnSpc>
+              <a:spcBef>
+                <a:spcPts val="500"/>
+              </a:spcBef>
+              <a:buFont typeface="Arial" panose="020B0604020202020204" pitchFamily="34" charset="0"/>
+              <a:buChar char="•"/>
+              <a:defRPr sz="2000" kern="1200">
+                <a:solidFill>
+                  <a:schemeClr val="tx1"/>
+                </a:solidFill>
+                <a:latin typeface="+mn-lt"/>
+                <a:ea typeface="+mn-ea"/>
+                <a:cs typeface="+mn-cs"/>
+              </a:defRPr>
+            </a:lvl3pPr>
+            <a:lvl4pPr marL="1600200" indent="-228600" algn="l" defTabSz="914400" rtl="0" eaLnBrk="1" latinLnBrk="0" hangingPunct="1">
+              <a:lnSpc>
+                <a:spcPct val="90000"/>
+              </a:lnSpc>
+              <a:spcBef>
+                <a:spcPts val="500"/>
+              </a:spcBef>
+              <a:buFont typeface="Arial" panose="020B0604020202020204" pitchFamily="34" charset="0"/>
+              <a:buChar char="•"/>
+              <a:defRPr sz="1800" kern="1200">
+                <a:solidFill>
+                  <a:schemeClr val="tx1"/>
+                </a:solidFill>
+                <a:latin typeface="+mn-lt"/>
+                <a:ea typeface="+mn-ea"/>
+                <a:cs typeface="+mn-cs"/>
+              </a:defRPr>
+            </a:lvl4pPr>
+            <a:lvl5pPr marL="2057400" indent="-228600" algn="l" defTabSz="914400" rtl="0" eaLnBrk="1" latinLnBrk="0" hangingPunct="1">
+              <a:lnSpc>
+                <a:spcPct val="90000"/>
+              </a:lnSpc>
+              <a:spcBef>
+                <a:spcPts val="500"/>
+              </a:spcBef>
+              <a:buFont typeface="Arial" panose="020B0604020202020204" pitchFamily="34" charset="0"/>
+              <a:buChar char="•"/>
+              <a:defRPr sz="1800" kern="1200">
+                <a:solidFill>
+                  <a:schemeClr val="tx1"/>
+                </a:solidFill>
+                <a:latin typeface="+mn-lt"/>
+                <a:ea typeface="+mn-ea"/>
+                <a:cs typeface="+mn-cs"/>
+              </a:defRPr>
+            </a:lvl5pPr>
+            <a:lvl6pPr marL="2514600" indent="-228600" algn="l" defTabSz="914400" rtl="0" eaLnBrk="1" latinLnBrk="0" hangingPunct="1">
+              <a:lnSpc>
+                <a:spcPct val="90000"/>
+              </a:lnSpc>
+              <a:spcBef>
+                <a:spcPts val="500"/>
+              </a:spcBef>
+              <a:buFont typeface="Arial" panose="020B0604020202020204" pitchFamily="34" charset="0"/>
+              <a:buChar char="•"/>
+              <a:defRPr sz="1800" kern="1200">
+                <a:solidFill>
+                  <a:schemeClr val="tx1"/>
+                </a:solidFill>
+                <a:latin typeface="+mn-lt"/>
+                <a:ea typeface="+mn-ea"/>
+                <a:cs typeface="+mn-cs"/>
+              </a:defRPr>
+            </a:lvl6pPr>
+            <a:lvl7pPr marL="2971800" indent="-228600" algn="l" defTabSz="914400" rtl="0" eaLnBrk="1" latinLnBrk="0" hangingPunct="1">
+              <a:lnSpc>
+                <a:spcPct val="90000"/>
+              </a:lnSpc>
+              <a:spcBef>
+                <a:spcPts val="500"/>
+              </a:spcBef>
+              <a:buFont typeface="Arial" panose="020B0604020202020204" pitchFamily="34" charset="0"/>
+              <a:buChar char="•"/>
+              <a:defRPr sz="1800" kern="1200">
+                <a:solidFill>
+                  <a:schemeClr val="tx1"/>
+                </a:solidFill>
+                <a:latin typeface="+mn-lt"/>
+                <a:ea typeface="+mn-ea"/>
+                <a:cs typeface="+mn-cs"/>
+              </a:defRPr>
+            </a:lvl7pPr>
+            <a:lvl8pPr marL="3429000" indent="-228600" algn="l" defTabSz="914400" rtl="0" eaLnBrk="1" latinLnBrk="0" hangingPunct="1">
+              <a:lnSpc>
+                <a:spcPct val="90000"/>
+              </a:lnSpc>
+              <a:spcBef>
+                <a:spcPts val="500"/>
+              </a:spcBef>
+              <a:buFont typeface="Arial" panose="020B0604020202020204" pitchFamily="34" charset="0"/>
+              <a:buChar char="•"/>
+              <a:defRPr sz="1800" kern="1200">
+                <a:solidFill>
+                  <a:schemeClr val="tx1"/>
+                </a:solidFill>
+                <a:latin typeface="+mn-lt"/>
+                <a:ea typeface="+mn-ea"/>
+                <a:cs typeface="+mn-cs"/>
+              </a:defRPr>
+            </a:lvl8pPr>
+            <a:lvl9pPr marL="3886200" indent="-228600" algn="l" defTabSz="914400" rtl="0" eaLnBrk="1" latinLnBrk="0" hangingPunct="1">
+              <a:lnSpc>
+                <a:spcPct val="90000"/>
+              </a:lnSpc>
+              <a:spcBef>
+                <a:spcPts val="500"/>
+              </a:spcBef>
+              <a:buFont typeface="Arial" panose="020B0604020202020204" pitchFamily="34" charset="0"/>
+              <a:buChar char="•"/>
+              <a:defRPr sz="1800" kern="1200">
+                <a:solidFill>
+                  <a:schemeClr val="tx1"/>
+                </a:solidFill>
+                <a:latin typeface="+mn-lt"/>
+                <a:ea typeface="+mn-ea"/>
+                <a:cs typeface="+mn-cs"/>
+              </a:defRPr>
+            </a:lvl9pPr>
+          </a:lstStyle>
           <a:p>
             <a:r>
               <a:rPr lang="en-US" dirty="0"/>
@@ -4592,6 +5227,12 @@
             </a:r>
           </a:p>
           <a:p>
+            <a:pPr marL="0" indent="0">
+              <a:buNone/>
+            </a:pPr>
+            <a:endParaRPr lang="en-US" dirty="0"/>
+          </a:p>
+          <a:p>
             <a:r>
               <a:rPr lang="en-US" dirty="0"/>
               <a:t>% will germinate in the trial (</a:t>
@@ -4606,6 +5247,12 @@
             </a:r>
           </a:p>
           <a:p>
+            <a:pPr marL="0" indent="0">
+              <a:buNone/>
+            </a:pPr>
+            <a:endParaRPr lang="en-US" dirty="0"/>
+          </a:p>
+          <a:p>
             <a:r>
               <a:rPr lang="en-US" dirty="0"/>
               <a:t>% will die during the trial (</a:t>
@@ -4624,6 +5271,12 @@
             </a:r>
           </a:p>
           <a:p>
+            <a:pPr marL="0" indent="0">
+              <a:buNone/>
+            </a:pPr>
+            <a:endParaRPr lang="en-US" dirty="0"/>
+          </a:p>
+          <a:p>
             <a:r>
               <a:rPr lang="en-US" dirty="0"/>
               <a:t>% will not germinate </a:t>
@@ -4643,315 +5296,10 @@
           </a:p>
         </p:txBody>
       </p:sp>
-      <p:cxnSp>
-        <p:nvCxnSpPr>
-          <p:cNvPr id="5" name="Straight Connector 4">
-            <a:extLst>
-              <a:ext uri="{FF2B5EF4-FFF2-40B4-BE49-F238E27FC236}">
-                <a16:creationId xmlns:a16="http://schemas.microsoft.com/office/drawing/2014/main" id="{12089E0C-F050-5840-A9A9-95D7C0215E0B}"/>
-              </a:ext>
-            </a:extLst>
-          </p:cNvPr>
-          <p:cNvCxnSpPr/>
-          <p:nvPr/>
-        </p:nvCxnSpPr>
-        <p:spPr>
-          <a:xfrm>
-            <a:off x="6486525" y="2643699"/>
-            <a:ext cx="0" cy="3814763"/>
-          </a:xfrm>
-          <a:prstGeom prst="line">
-            <a:avLst/>
-          </a:prstGeom>
-          <a:ln>
-            <a:solidFill>
-              <a:schemeClr val="tx1"/>
-            </a:solidFill>
-          </a:ln>
-        </p:spPr>
-        <p:style>
-          <a:lnRef idx="1">
-            <a:schemeClr val="accent1"/>
-          </a:lnRef>
-          <a:fillRef idx="0">
-            <a:schemeClr val="accent1"/>
-          </a:fillRef>
-          <a:effectRef idx="0">
-            <a:schemeClr val="accent1"/>
-          </a:effectRef>
-          <a:fontRef idx="minor">
-            <a:schemeClr val="tx1"/>
-          </a:fontRef>
-        </p:style>
-      </p:cxnSp>
-      <p:cxnSp>
-        <p:nvCxnSpPr>
-          <p:cNvPr id="7" name="Straight Connector 6">
-            <a:extLst>
-              <a:ext uri="{FF2B5EF4-FFF2-40B4-BE49-F238E27FC236}">
-                <a16:creationId xmlns:a16="http://schemas.microsoft.com/office/drawing/2014/main" id="{BBFA5703-6461-B949-A212-573353341589}"/>
-              </a:ext>
-            </a:extLst>
-          </p:cNvPr>
-          <p:cNvCxnSpPr>
-            <a:cxnSpLocks/>
-          </p:cNvCxnSpPr>
-          <p:nvPr/>
-        </p:nvCxnSpPr>
-        <p:spPr>
-          <a:xfrm flipH="1">
-            <a:off x="6486525" y="6467987"/>
-            <a:ext cx="3876675" cy="0"/>
-          </a:xfrm>
-          <a:prstGeom prst="line">
-            <a:avLst/>
-          </a:prstGeom>
-          <a:ln>
-            <a:solidFill>
-              <a:schemeClr val="tx1"/>
-            </a:solidFill>
-          </a:ln>
-        </p:spPr>
-        <p:style>
-          <a:lnRef idx="1">
-            <a:schemeClr val="accent1"/>
-          </a:lnRef>
-          <a:fillRef idx="0">
-            <a:schemeClr val="accent1"/>
-          </a:fillRef>
-          <a:effectRef idx="0">
-            <a:schemeClr val="accent1"/>
-          </a:effectRef>
-          <a:fontRef idx="minor">
-            <a:schemeClr val="tx1"/>
-          </a:fontRef>
-        </p:style>
-      </p:cxnSp>
-      <p:cxnSp>
-        <p:nvCxnSpPr>
-          <p:cNvPr id="8" name="Curved Connector 7">
-            <a:extLst>
-              <a:ext uri="{FF2B5EF4-FFF2-40B4-BE49-F238E27FC236}">
-                <a16:creationId xmlns:a16="http://schemas.microsoft.com/office/drawing/2014/main" id="{0F949C70-FEE4-EE4F-A4AC-856B2CE53D34}"/>
-              </a:ext>
-            </a:extLst>
-          </p:cNvPr>
-          <p:cNvCxnSpPr>
-            <a:cxnSpLocks/>
-          </p:cNvCxnSpPr>
-          <p:nvPr/>
-        </p:nvCxnSpPr>
-        <p:spPr>
-          <a:xfrm rot="10800000" flipV="1">
-            <a:off x="6937480" y="4186237"/>
-            <a:ext cx="3425720" cy="2281749"/>
-          </a:xfrm>
-          <a:prstGeom prst="curvedConnector3">
-            <a:avLst>
-              <a:gd name="adj1" fmla="val 50000"/>
-            </a:avLst>
-          </a:prstGeom>
-          <a:ln>
-            <a:solidFill>
-              <a:srgbClr val="FF0000"/>
-            </a:solidFill>
-          </a:ln>
-        </p:spPr>
-        <p:style>
-          <a:lnRef idx="1">
-            <a:schemeClr val="accent1"/>
-          </a:lnRef>
-          <a:fillRef idx="0">
-            <a:schemeClr val="accent1"/>
-          </a:fillRef>
-          <a:effectRef idx="0">
-            <a:schemeClr val="accent1"/>
-          </a:effectRef>
-          <a:fontRef idx="minor">
-            <a:schemeClr val="tx1"/>
-          </a:fontRef>
-        </p:style>
-      </p:cxnSp>
-      <p:cxnSp>
-        <p:nvCxnSpPr>
-          <p:cNvPr id="9" name="Curved Connector 8">
-            <a:extLst>
-              <a:ext uri="{FF2B5EF4-FFF2-40B4-BE49-F238E27FC236}">
-                <a16:creationId xmlns:a16="http://schemas.microsoft.com/office/drawing/2014/main" id="{BCD03782-D281-2349-AC9C-FA2C914E893D}"/>
-              </a:ext>
-            </a:extLst>
-          </p:cNvPr>
-          <p:cNvCxnSpPr>
-            <a:cxnSpLocks/>
-          </p:cNvCxnSpPr>
-          <p:nvPr/>
-        </p:nvCxnSpPr>
-        <p:spPr>
-          <a:xfrm rot="10800000" flipV="1">
-            <a:off x="6486528" y="3328987"/>
-            <a:ext cx="3228973" cy="3138999"/>
-          </a:xfrm>
-          <a:prstGeom prst="curvedConnector3">
-            <a:avLst>
-              <a:gd name="adj1" fmla="val 50000"/>
-            </a:avLst>
-          </a:prstGeom>
-          <a:ln>
-            <a:solidFill>
-              <a:srgbClr val="92D050"/>
-            </a:solidFill>
-          </a:ln>
-        </p:spPr>
-        <p:style>
-          <a:lnRef idx="1">
-            <a:schemeClr val="accent1"/>
-          </a:lnRef>
-          <a:fillRef idx="0">
-            <a:schemeClr val="accent1"/>
-          </a:fillRef>
-          <a:effectRef idx="0">
-            <a:schemeClr val="accent1"/>
-          </a:effectRef>
-          <a:fontRef idx="minor">
-            <a:schemeClr val="tx1"/>
-          </a:fontRef>
-        </p:style>
-      </p:cxnSp>
-      <p:cxnSp>
-        <p:nvCxnSpPr>
-          <p:cNvPr id="10" name="Curved Connector 9">
-            <a:extLst>
-              <a:ext uri="{FF2B5EF4-FFF2-40B4-BE49-F238E27FC236}">
-                <a16:creationId xmlns:a16="http://schemas.microsoft.com/office/drawing/2014/main" id="{1C016842-1EC5-F947-A3FA-EA427EEE7FF1}"/>
-              </a:ext>
-            </a:extLst>
-          </p:cNvPr>
-          <p:cNvCxnSpPr>
-            <a:cxnSpLocks/>
-          </p:cNvCxnSpPr>
-          <p:nvPr/>
-        </p:nvCxnSpPr>
-        <p:spPr>
-          <a:xfrm rot="10800000" flipV="1">
-            <a:off x="6972301" y="5229224"/>
-            <a:ext cx="1471613" cy="1229237"/>
-          </a:xfrm>
-          <a:prstGeom prst="curvedConnector3">
-            <a:avLst>
-              <a:gd name="adj1" fmla="val 50000"/>
-            </a:avLst>
-          </a:prstGeom>
-          <a:ln>
-            <a:solidFill>
-              <a:srgbClr val="7030A0"/>
-            </a:solidFill>
-          </a:ln>
-        </p:spPr>
-        <p:style>
-          <a:lnRef idx="1">
-            <a:schemeClr val="accent1"/>
-          </a:lnRef>
-          <a:fillRef idx="0">
-            <a:schemeClr val="accent1"/>
-          </a:fillRef>
-          <a:effectRef idx="0">
-            <a:schemeClr val="accent1"/>
-          </a:effectRef>
-          <a:fontRef idx="minor">
-            <a:schemeClr val="tx1"/>
-          </a:fontRef>
-        </p:style>
-      </p:cxnSp>
-      <p:cxnSp>
-        <p:nvCxnSpPr>
-          <p:cNvPr id="12" name="Straight Connector 11">
-            <a:extLst>
-              <a:ext uri="{FF2B5EF4-FFF2-40B4-BE49-F238E27FC236}">
-                <a16:creationId xmlns:a16="http://schemas.microsoft.com/office/drawing/2014/main" id="{9C22B2E6-ED22-2D48-B636-EBE9DE91AABF}"/>
-              </a:ext>
-            </a:extLst>
-          </p:cNvPr>
-          <p:cNvCxnSpPr>
-            <a:cxnSpLocks/>
-          </p:cNvCxnSpPr>
-          <p:nvPr/>
-        </p:nvCxnSpPr>
-        <p:spPr>
-          <a:xfrm>
-            <a:off x="8443914" y="5229224"/>
-            <a:ext cx="1919286" cy="0"/>
-          </a:xfrm>
-          <a:prstGeom prst="line">
-            <a:avLst/>
-          </a:prstGeom>
-          <a:ln>
-            <a:solidFill>
-              <a:srgbClr val="7030A0"/>
-            </a:solidFill>
-          </a:ln>
-        </p:spPr>
-        <p:style>
-          <a:lnRef idx="1">
-            <a:schemeClr val="accent1"/>
-          </a:lnRef>
-          <a:fillRef idx="0">
-            <a:schemeClr val="accent1"/>
-          </a:fillRef>
-          <a:effectRef idx="0">
-            <a:schemeClr val="accent1"/>
-          </a:effectRef>
-          <a:fontRef idx="minor">
-            <a:schemeClr val="tx1"/>
-          </a:fontRef>
-        </p:style>
-      </p:cxnSp>
-      <p:cxnSp>
-        <p:nvCxnSpPr>
-          <p:cNvPr id="17" name="Straight Connector 16">
-            <a:extLst>
-              <a:ext uri="{FF2B5EF4-FFF2-40B4-BE49-F238E27FC236}">
-                <a16:creationId xmlns:a16="http://schemas.microsoft.com/office/drawing/2014/main" id="{63C9283E-9713-994D-9FA4-FE62972EB079}"/>
-              </a:ext>
-            </a:extLst>
-          </p:cNvPr>
-          <p:cNvCxnSpPr>
-            <a:cxnSpLocks/>
-          </p:cNvCxnSpPr>
-          <p:nvPr/>
-        </p:nvCxnSpPr>
-        <p:spPr>
-          <a:xfrm flipV="1">
-            <a:off x="9715501" y="3328987"/>
-            <a:ext cx="647699" cy="1"/>
-          </a:xfrm>
-          <a:prstGeom prst="line">
-            <a:avLst/>
-          </a:prstGeom>
-          <a:ln>
-            <a:solidFill>
-              <a:srgbClr val="92D050"/>
-            </a:solidFill>
-          </a:ln>
-        </p:spPr>
-        <p:style>
-          <a:lnRef idx="1">
-            <a:schemeClr val="accent1"/>
-          </a:lnRef>
-          <a:fillRef idx="0">
-            <a:schemeClr val="accent1"/>
-          </a:fillRef>
-          <a:effectRef idx="0">
-            <a:schemeClr val="accent1"/>
-          </a:effectRef>
-          <a:fontRef idx="minor">
-            <a:schemeClr val="tx1"/>
-          </a:fontRef>
-        </p:style>
-      </p:cxnSp>
     </p:spTree>
     <p:extLst>
       <p:ext uri="{BB962C8B-B14F-4D97-AF65-F5344CB8AC3E}">
-        <p14:creationId xmlns:p14="http://schemas.microsoft.com/office/powerpoint/2010/main" val="3845122436"/>
+        <p14:creationId xmlns:p14="http://schemas.microsoft.com/office/powerpoint/2010/main" val="3104912391"/>
       </p:ext>
     </p:extLst>
   </p:cSld>
@@ -4961,7 +5309,7 @@
 </p:sld>
 </file>
 
-<file path=ppt/slides/slide4.xml><?xml version="1.0" encoding="utf-8"?>
+<file path=ppt/slides/slide7.xml><?xml version="1.0" encoding="utf-8"?>
 <p:sld xmlns:a="http://schemas.openxmlformats.org/drawingml/2006/main" xmlns:r="http://schemas.openxmlformats.org/officeDocument/2006/relationships" xmlns:p="http://schemas.openxmlformats.org/presentationml/2006/main">
   <p:cSld>
     <p:spTree>
@@ -4980,72 +5328,208 @@
       </p:grpSpPr>
       <p:sp>
         <p:nvSpPr>
-          <p:cNvPr id="2" name="Title 1">
-            <a:extLst>
-              <a:ext uri="{FF2B5EF4-FFF2-40B4-BE49-F238E27FC236}">
-                <a16:creationId xmlns:a16="http://schemas.microsoft.com/office/drawing/2014/main" id="{26293889-9145-C048-BE31-4EDF65EC1228}"/>
-              </a:ext>
-            </a:extLst>
-          </p:cNvPr>
-          <p:cNvSpPr>
-            <a:spLocks noGrp="1"/>
-          </p:cNvSpPr>
-          <p:nvPr>
-            <p:ph type="title"/>
-          </p:nvPr>
-        </p:nvSpPr>
-        <p:spPr/>
-        <p:txBody>
-          <a:bodyPr/>
-          <a:lstStyle/>
-          <a:p>
-            <a:r>
-              <a:rPr lang="en-US" dirty="0"/>
-              <a:t>Time to event analysis</a:t>
-            </a:r>
-          </a:p>
-        </p:txBody>
-      </p:sp>
-      <p:sp>
-        <p:nvSpPr>
-          <p:cNvPr id="3" name="Content Placeholder 2">
-            <a:extLst>
-              <a:ext uri="{FF2B5EF4-FFF2-40B4-BE49-F238E27FC236}">
-                <a16:creationId xmlns:a16="http://schemas.microsoft.com/office/drawing/2014/main" id="{1468DE28-01F2-0C40-A1A7-944E28D3D91C}"/>
-              </a:ext>
-            </a:extLst>
-          </p:cNvPr>
-          <p:cNvSpPr>
-            <a:spLocks noGrp="1"/>
-          </p:cNvSpPr>
-          <p:nvPr>
-            <p:ph idx="1"/>
-          </p:nvPr>
+          <p:cNvPr id="4" name="TextBox 3">
+            <a:extLst>
+              <a:ext uri="{FF2B5EF4-FFF2-40B4-BE49-F238E27FC236}">
+                <a16:creationId xmlns:a16="http://schemas.microsoft.com/office/drawing/2014/main" id="{4B153ECD-1AA0-8145-ADDB-BE62378D51C3}"/>
+              </a:ext>
+            </a:extLst>
+          </p:cNvPr>
+          <p:cNvSpPr txBox="1"/>
+          <p:nvPr/>
         </p:nvSpPr>
         <p:spPr>
           <a:xfrm>
-            <a:off x="838200" y="1825624"/>
-            <a:ext cx="10515600" cy="4403725"/>
+            <a:off x="1470991" y="304800"/>
+            <a:ext cx="8534400" cy="2585323"/>
           </a:xfrm>
+          <a:prstGeom prst="rect">
+            <a:avLst/>
+          </a:prstGeom>
+          <a:noFill/>
         </p:spPr>
         <p:txBody>
-          <a:bodyPr/>
-          <a:lstStyle/>
-          <a:p>
+          <a:bodyPr wrap="square" rtlCol="0">
+            <a:spAutoFit/>
+          </a:bodyPr>
+          <a:lstStyle/>
+          <a:p>
+            <a:r>
+              <a:rPr lang="en-US" b="1" dirty="0"/>
+              <a:t>Tradition nonlinear modeling:</a:t>
+            </a:r>
+          </a:p>
+          <a:p>
+            <a:pPr marL="285750" indent="-285750">
+              <a:buFont typeface="Arial" panose="020B0604020202020204" pitchFamily="34" charset="0"/>
+              <a:buChar char="•"/>
+            </a:pPr>
             <a:r>
               <a:rPr lang="en-US" dirty="0"/>
-              <a:t>A mix of biological and coding interaction</a:t>
-            </a:r>
-          </a:p>
-          <a:p>
-            <a:endParaRPr lang="en-US" dirty="0"/>
+              <a:t>Uses cumulative distribution counts</a:t>
+            </a:r>
+          </a:p>
+          <a:p>
+            <a:pPr marL="285750" indent="-285750">
+              <a:buFont typeface="Arial" panose="020B0604020202020204" pitchFamily="34" charset="0"/>
+              <a:buChar char="•"/>
+            </a:pPr>
+            <a:r>
+              <a:rPr lang="en-US" dirty="0"/>
+              <a:t>Violates assumptions of independence at each observation</a:t>
+            </a:r>
+          </a:p>
+          <a:p>
+            <a:r>
+              <a:rPr lang="en-US" b="1" dirty="0"/>
+              <a:t>Time to event analysis:</a:t>
+            </a:r>
+          </a:p>
+          <a:p>
+            <a:r>
+              <a:rPr lang="en-US" dirty="0"/>
+              <a:t>Survival models and dose-response curves</a:t>
+            </a:r>
+          </a:p>
+          <a:p>
+            <a:pPr marL="285750" indent="-285750">
+              <a:buFont typeface="Arial" panose="020B0604020202020204" pitchFamily="34" charset="0"/>
+              <a:buChar char="•"/>
+            </a:pPr>
+            <a:r>
+              <a:rPr lang="en-US" dirty="0"/>
+              <a:t>Assume all seeds can germinate</a:t>
+            </a:r>
+          </a:p>
+          <a:p>
+            <a:pPr marL="742950" lvl="1" indent="-285750">
+              <a:buFont typeface="Arial" panose="020B0604020202020204" pitchFamily="34" charset="0"/>
+              <a:buChar char="•"/>
+            </a:pPr>
+            <a:r>
+              <a:rPr lang="en-US" dirty="0"/>
+              <a:t>Estimates right censoring (maybe inappropriate for  seeds with dormancy)</a:t>
+            </a:r>
+          </a:p>
+          <a:p>
+            <a:pPr marL="742950" lvl="1" indent="-285750">
+              <a:buFont typeface="Arial" panose="020B0604020202020204" pitchFamily="34" charset="0"/>
+              <a:buChar char="•"/>
+            </a:pPr>
+            <a:r>
+              <a:rPr lang="en-US" dirty="0"/>
+              <a:t>The typical distributions used for germination can’t handle negative time values</a:t>
+            </a:r>
+          </a:p>
+          <a:p>
+            <a:r>
+              <a:rPr lang="en-US" b="1" dirty="0"/>
+              <a:t>Other metrics</a:t>
+            </a:r>
+          </a:p>
+        </p:txBody>
+      </p:sp>
+      <p:pic>
+        <p:nvPicPr>
+          <p:cNvPr id="7" name="Picture 6">
+            <a:extLst>
+              <a:ext uri="{FF2B5EF4-FFF2-40B4-BE49-F238E27FC236}">
+                <a16:creationId xmlns:a16="http://schemas.microsoft.com/office/drawing/2014/main" id="{8968CBF2-128A-9F4D-B5DF-DF5BC1544315}"/>
+              </a:ext>
+            </a:extLst>
+          </p:cNvPr>
+          <p:cNvPicPr>
+            <a:picLocks noChangeAspect="1"/>
+          </p:cNvPicPr>
+          <p:nvPr/>
+        </p:nvPicPr>
+        <p:blipFill>
+          <a:blip r:embed="rId3"/>
+          <a:stretch>
+            <a:fillRect/>
+          </a:stretch>
+        </p:blipFill>
+        <p:spPr>
+          <a:xfrm>
+            <a:off x="1192696" y="2890123"/>
+            <a:ext cx="9463433" cy="2674695"/>
+          </a:xfrm>
+          <a:prstGeom prst="rect">
+            <a:avLst/>
+          </a:prstGeom>
+        </p:spPr>
+      </p:pic>
+      <p:sp>
+        <p:nvSpPr>
+          <p:cNvPr id="8" name="TextBox 7">
+            <a:extLst>
+              <a:ext uri="{FF2B5EF4-FFF2-40B4-BE49-F238E27FC236}">
+                <a16:creationId xmlns:a16="http://schemas.microsoft.com/office/drawing/2014/main" id="{9CA93BCC-6E58-464D-9EE1-A4FECDAAAAAB}"/>
+              </a:ext>
+            </a:extLst>
+          </p:cNvPr>
+          <p:cNvSpPr txBox="1"/>
+          <p:nvPr/>
+        </p:nvSpPr>
+        <p:spPr>
+          <a:xfrm>
+            <a:off x="1470991" y="5186745"/>
+            <a:ext cx="8348870" cy="1477328"/>
+          </a:xfrm>
+          <a:prstGeom prst="rect">
+            <a:avLst/>
+          </a:prstGeom>
+          <a:noFill/>
+        </p:spPr>
+        <p:txBody>
+          <a:bodyPr wrap="square" rtlCol="0">
+            <a:spAutoFit/>
+          </a:bodyPr>
+          <a:lstStyle/>
+          <a:p>
+            <a:r>
+              <a:rPr lang="en-US" b="1" dirty="0"/>
+              <a:t>Hybrid:</a:t>
+            </a:r>
+          </a:p>
+          <a:p>
+            <a:r>
+              <a:rPr lang="en-US" dirty="0"/>
+              <a:t>A:  moldy seed # ~(chilling time, temp) + |species</a:t>
+            </a:r>
+          </a:p>
+          <a:p>
+            <a:r>
+              <a:rPr lang="en-US" dirty="0"/>
+              <a:t>B: Cold germ~ chilling time</a:t>
+            </a:r>
+          </a:p>
+          <a:p>
+            <a:r>
+              <a:rPr lang="en-US" dirty="0"/>
+              <a:t>C: germination model (</a:t>
+            </a:r>
+            <a:r>
+              <a:rPr lang="en-US" dirty="0" err="1"/>
+              <a:t>drc</a:t>
+            </a:r>
+            <a:r>
+              <a:rPr lang="en-US" dirty="0"/>
+              <a:t> or survival)</a:t>
+            </a:r>
+          </a:p>
+          <a:p>
+            <a:r>
+              <a:rPr lang="en-US" dirty="0"/>
+              <a:t>D*: Cure model- how many right censored will germination</a:t>
+            </a:r>
           </a:p>
         </p:txBody>
       </p:sp>
     </p:spTree>
     <p:extLst>
       <p:ext uri="{BB962C8B-B14F-4D97-AF65-F5344CB8AC3E}">
-        <p14:creationId xmlns:p14="http://schemas.microsoft.com/office/powerpoint/2010/main" val="3104912391"/>
+        <p14:creationId xmlns:p14="http://schemas.microsoft.com/office/powerpoint/2010/main" val="479286616"/>
       </p:ext>
     </p:extLst>
   </p:cSld>
@@ -5055,7 +5539,7 @@
 </p:sld>
 </file>
 
-<file path=ppt/slides/slide5.xml><?xml version="1.0" encoding="utf-8"?>
+<file path=ppt/slides/slide8.xml><?xml version="1.0" encoding="utf-8"?>
 <p:sld xmlns:a="http://schemas.openxmlformats.org/drawingml/2006/main" xmlns:r="http://schemas.openxmlformats.org/officeDocument/2006/relationships" xmlns:p="http://schemas.openxmlformats.org/presentationml/2006/main">
   <p:cSld>
     <p:spTree>
@@ -5074,10 +5558,10 @@
       </p:grpSpPr>
       <p:pic>
         <p:nvPicPr>
-          <p:cNvPr id="2" name="Picture 1">
-            <a:extLst>
-              <a:ext uri="{FF2B5EF4-FFF2-40B4-BE49-F238E27FC236}">
-                <a16:creationId xmlns:a16="http://schemas.microsoft.com/office/drawing/2014/main" id="{2BDD1A2E-F18E-BA4C-927C-D05BF9C125DB}"/>
+          <p:cNvPr id="12" name="Picture 11">
+            <a:extLst>
+              <a:ext uri="{FF2B5EF4-FFF2-40B4-BE49-F238E27FC236}">
+                <a16:creationId xmlns:a16="http://schemas.microsoft.com/office/drawing/2014/main" id="{FBB02E3E-0B8C-6742-86B4-F54D3C79EE7C}"/>
               </a:ext>
             </a:extLst>
           </p:cNvPr>
@@ -5094,8 +5578,8 @@
         </p:blipFill>
         <p:spPr>
           <a:xfrm>
-            <a:off x="377779" y="857250"/>
-            <a:ext cx="7395883" cy="5715000"/>
+            <a:off x="1132202" y="583021"/>
+            <a:ext cx="9337016" cy="5864162"/>
           </a:xfrm>
           <a:prstGeom prst="rect">
             <a:avLst/>
@@ -5104,134 +5588,112 @@
       </p:pic>
       <p:sp>
         <p:nvSpPr>
-          <p:cNvPr id="3" name="TextBox 2">
-            <a:extLst>
-              <a:ext uri="{FF2B5EF4-FFF2-40B4-BE49-F238E27FC236}">
-                <a16:creationId xmlns:a16="http://schemas.microsoft.com/office/drawing/2014/main" id="{15B0AB15-E1E4-FE4E-9BC4-B3B3A7F115B3}"/>
-              </a:ext>
-            </a:extLst>
-          </p:cNvPr>
-          <p:cNvSpPr txBox="1"/>
+          <p:cNvPr id="14" name="Rectangle 13">
+            <a:extLst>
+              <a:ext uri="{FF2B5EF4-FFF2-40B4-BE49-F238E27FC236}">
+                <a16:creationId xmlns:a16="http://schemas.microsoft.com/office/drawing/2014/main" id="{BFB2E6F4-645C-DE48-B7BA-4CFB4F1D5EA1}"/>
+              </a:ext>
+            </a:extLst>
+          </p:cNvPr>
+          <p:cNvSpPr/>
           <p:nvPr/>
         </p:nvSpPr>
         <p:spPr>
           <a:xfrm>
-            <a:off x="7773662" y="142875"/>
-            <a:ext cx="2818558" cy="5355312"/>
+            <a:off x="4903304" y="583021"/>
+            <a:ext cx="1408471" cy="2852529"/>
           </a:xfrm>
           <a:prstGeom prst="rect">
             <a:avLst/>
           </a:prstGeom>
           <a:noFill/>
+          <a:ln>
+            <a:solidFill>
+              <a:srgbClr val="FF0000"/>
+            </a:solidFill>
+          </a:ln>
         </p:spPr>
-        <p:txBody>
-          <a:bodyPr wrap="square" rtlCol="0">
-            <a:spAutoFit/>
-          </a:bodyPr>
-          <a:lstStyle/>
-          <a:p>
-            <a:r>
-              <a:rPr lang="en-US" u="sng" dirty="0" err="1"/>
-              <a:t>Paremetric</a:t>
-            </a:r>
-            <a:r>
-              <a:rPr lang="en-US" u="sng" dirty="0"/>
-              <a:t> survival models and DRC’s….</a:t>
-            </a:r>
-          </a:p>
-          <a:p>
-            <a:r>
-              <a:rPr lang="en-US" dirty="0"/>
-              <a:t>3 parameters:</a:t>
-            </a:r>
-          </a:p>
-          <a:p>
-            <a:r>
-              <a:rPr lang="en-US" dirty="0"/>
-              <a:t>e T50 (that what I want)</a:t>
-            </a:r>
-          </a:p>
-          <a:p>
-            <a:r>
-              <a:rPr lang="en-US" dirty="0"/>
-              <a:t>b Slope @ T50</a:t>
-            </a:r>
-          </a:p>
-          <a:p>
-            <a:r>
-              <a:rPr lang="en-US" dirty="0"/>
-              <a:t>d Upper limit (can fix, or estimate)</a:t>
-            </a:r>
-          </a:p>
-          <a:p>
-            <a:r>
-              <a:rPr lang="en-US" dirty="0"/>
-              <a:t>(could also estimate lower limit)</a:t>
-            </a:r>
-          </a:p>
-          <a:p>
-            <a:endParaRPr lang="en-US" dirty="0"/>
-          </a:p>
-          <a:p>
-            <a:r>
-              <a:rPr lang="en-US" dirty="0"/>
-              <a:t>Problem I : e changes with d</a:t>
-            </a:r>
-          </a:p>
-          <a:p>
-            <a:endParaRPr lang="en-US" dirty="0"/>
-          </a:p>
-          <a:p>
-            <a:r>
-              <a:rPr lang="en-US" dirty="0"/>
-              <a:t>Biologically wrong (I think) to project d to 100%.</a:t>
-            </a:r>
-          </a:p>
-          <a:p>
-            <a:endParaRPr lang="en-US" dirty="0"/>
-          </a:p>
-          <a:p>
-            <a:r>
-              <a:rPr lang="en-US" dirty="0"/>
-              <a:t>These distributions (lognormal, log) can’t handle negative or 0 time values. So… left censoring </a:t>
-            </a:r>
-          </a:p>
-        </p:txBody>
-      </p:sp>
-      <p:pic>
-        <p:nvPicPr>
-          <p:cNvPr id="5" name="Picture 4">
-            <a:extLst>
-              <a:ext uri="{FF2B5EF4-FFF2-40B4-BE49-F238E27FC236}">
-                <a16:creationId xmlns:a16="http://schemas.microsoft.com/office/drawing/2014/main" id="{9A093384-B564-E847-8683-77DA0FEE5244}"/>
-              </a:ext>
-            </a:extLst>
-          </p:cNvPr>
-          <p:cNvPicPr>
-            <a:picLocks noChangeAspect="1"/>
-          </p:cNvPicPr>
+        <p:style>
+          <a:lnRef idx="2">
+            <a:schemeClr val="accent1">
+              <a:shade val="50000"/>
+            </a:schemeClr>
+          </a:lnRef>
+          <a:fillRef idx="1">
+            <a:schemeClr val="accent1"/>
+          </a:fillRef>
+          <a:effectRef idx="0">
+            <a:schemeClr val="accent1"/>
+          </a:effectRef>
+          <a:fontRef idx="minor">
+            <a:schemeClr val="lt1"/>
+          </a:fontRef>
+        </p:style>
+        <p:txBody>
+          <a:bodyPr rtlCol="0" anchor="ctr"/>
+          <a:lstStyle/>
+          <a:p>
+            <a:pPr algn="ctr"/>
+            <a:endParaRPr lang="en-US"/>
+          </a:p>
+        </p:txBody>
+      </p:sp>
+      <p:sp>
+        <p:nvSpPr>
+          <p:cNvPr id="15" name="Rectangle 14">
+            <a:extLst>
+              <a:ext uri="{FF2B5EF4-FFF2-40B4-BE49-F238E27FC236}">
+                <a16:creationId xmlns:a16="http://schemas.microsoft.com/office/drawing/2014/main" id="{85EF45B4-C339-BF46-BBA2-D258E6763CC2}"/>
+              </a:ext>
+            </a:extLst>
+          </p:cNvPr>
+          <p:cNvSpPr/>
           <p:nvPr/>
-        </p:nvPicPr>
-        <p:blipFill>
-          <a:blip r:embed="rId3"/>
-          <a:stretch>
-            <a:fillRect/>
-          </a:stretch>
-        </p:blipFill>
+        </p:nvSpPr>
         <p:spPr>
           <a:xfrm>
-            <a:off x="1317534" y="0"/>
-            <a:ext cx="3660962" cy="2828925"/>
+            <a:off x="7630367" y="3435550"/>
+            <a:ext cx="649357" cy="2852529"/>
           </a:xfrm>
           <a:prstGeom prst="rect">
             <a:avLst/>
           </a:prstGeom>
+          <a:noFill/>
+          <a:ln>
+            <a:solidFill>
+              <a:srgbClr val="FF0000"/>
+            </a:solidFill>
+          </a:ln>
         </p:spPr>
-      </p:pic>
+        <p:style>
+          <a:lnRef idx="2">
+            <a:schemeClr val="accent1">
+              <a:shade val="50000"/>
+            </a:schemeClr>
+          </a:lnRef>
+          <a:fillRef idx="1">
+            <a:schemeClr val="accent1"/>
+          </a:fillRef>
+          <a:effectRef idx="0">
+            <a:schemeClr val="accent1"/>
+          </a:effectRef>
+          <a:fontRef idx="minor">
+            <a:schemeClr val="lt1"/>
+          </a:fontRef>
+        </p:style>
+        <p:txBody>
+          <a:bodyPr rtlCol="0" anchor="ctr"/>
+          <a:lstStyle/>
+          <a:p>
+            <a:pPr algn="ctr"/>
+            <a:endParaRPr lang="en-US"/>
+          </a:p>
+        </p:txBody>
+      </p:sp>
     </p:spTree>
     <p:extLst>
       <p:ext uri="{BB962C8B-B14F-4D97-AF65-F5344CB8AC3E}">
-        <p14:creationId xmlns:p14="http://schemas.microsoft.com/office/powerpoint/2010/main" val="479286616"/>
+        <p14:creationId xmlns:p14="http://schemas.microsoft.com/office/powerpoint/2010/main" val="1463307141"/>
       </p:ext>
     </p:extLst>
   </p:cSld>
@@ -5241,7 +5703,7 @@
 </p:sld>
 </file>
 
-<file path=ppt/slides/slide6.xml><?xml version="1.0" encoding="utf-8"?>
+<file path=ppt/slides/slide9.xml><?xml version="1.0" encoding="utf-8"?>
 <p:sld xmlns:a="http://schemas.openxmlformats.org/drawingml/2006/main" xmlns:r="http://schemas.openxmlformats.org/officeDocument/2006/relationships" xmlns:p="http://schemas.openxmlformats.org/presentationml/2006/main">
   <p:cSld>
     <p:spTree>
@@ -5258,102 +5720,40 @@
           <a:chExt cx="0" cy="0"/>
         </a:xfrm>
       </p:grpSpPr>
-      <p:sp>
-        <p:nvSpPr>
-          <p:cNvPr id="2" name="Title 1">
-            <a:extLst>
-              <a:ext uri="{FF2B5EF4-FFF2-40B4-BE49-F238E27FC236}">
-                <a16:creationId xmlns:a16="http://schemas.microsoft.com/office/drawing/2014/main" id="{E06A2047-F221-A545-B8AE-678C51D1C55A}"/>
-              </a:ext>
-            </a:extLst>
-          </p:cNvPr>
-          <p:cNvSpPr>
-            <a:spLocks noGrp="1"/>
-          </p:cNvSpPr>
-          <p:nvPr>
-            <p:ph type="title"/>
-          </p:nvPr>
-        </p:nvSpPr>
-        <p:spPr/>
-        <p:txBody>
-          <a:bodyPr/>
-          <a:lstStyle/>
-          <a:p>
-            <a:r>
-              <a:rPr lang="en-US" dirty="0"/>
-              <a:t>DRC vs Survival (They are related)</a:t>
-            </a:r>
-          </a:p>
-        </p:txBody>
-      </p:sp>
-      <p:sp>
-        <p:nvSpPr>
-          <p:cNvPr id="3" name="Content Placeholder 2">
-            <a:extLst>
-              <a:ext uri="{FF2B5EF4-FFF2-40B4-BE49-F238E27FC236}">
-                <a16:creationId xmlns:a16="http://schemas.microsoft.com/office/drawing/2014/main" id="{D84166C8-EDD7-1E49-89C9-D281FB69C81C}"/>
-              </a:ext>
-            </a:extLst>
-          </p:cNvPr>
-          <p:cNvSpPr>
-            <a:spLocks noGrp="1"/>
-          </p:cNvSpPr>
-          <p:nvPr>
-            <p:ph sz="half" idx="1"/>
-          </p:nvPr>
-        </p:nvSpPr>
-        <p:spPr/>
-        <p:txBody>
-          <a:bodyPr/>
-          <a:lstStyle/>
-          <a:p>
-            <a:r>
-              <a:rPr lang="en-US" dirty="0"/>
-              <a:t>Takes cohort level </a:t>
-            </a:r>
-            <a:r>
-              <a:rPr lang="en-US"/>
-              <a:t>and under </a:t>
-            </a:r>
-            <a:r>
-              <a:rPr lang="en-US" dirty="0"/>
-              <a:t>the hood transforms it</a:t>
-            </a:r>
-          </a:p>
-        </p:txBody>
-      </p:sp>
-      <p:sp>
-        <p:nvSpPr>
-          <p:cNvPr id="4" name="Content Placeholder 3">
-            <a:extLst>
-              <a:ext uri="{FF2B5EF4-FFF2-40B4-BE49-F238E27FC236}">
-                <a16:creationId xmlns:a16="http://schemas.microsoft.com/office/drawing/2014/main" id="{B618E1A4-AC99-D647-9F16-251CEEEB7781}"/>
-              </a:ext>
-            </a:extLst>
-          </p:cNvPr>
-          <p:cNvSpPr>
-            <a:spLocks noGrp="1"/>
-          </p:cNvSpPr>
-          <p:nvPr>
-            <p:ph sz="half" idx="2"/>
-          </p:nvPr>
-        </p:nvSpPr>
-        <p:spPr/>
-        <p:txBody>
-          <a:bodyPr/>
-          <a:lstStyle/>
-          <a:p>
-            <a:r>
-              <a:rPr lang="en-US" dirty="0"/>
-              <a:t>Takes data at individual seed level</a:t>
-            </a:r>
-          </a:p>
-        </p:txBody>
-      </p:sp>
+      <p:pic>
+        <p:nvPicPr>
+          <p:cNvPr id="3" name="Picture 2">
+            <a:extLst>
+              <a:ext uri="{FF2B5EF4-FFF2-40B4-BE49-F238E27FC236}">
+                <a16:creationId xmlns:a16="http://schemas.microsoft.com/office/drawing/2014/main" id="{36A47C26-3C56-394F-A797-C890129FCC1D}"/>
+              </a:ext>
+            </a:extLst>
+          </p:cNvPr>
+          <p:cNvPicPr>
+            <a:picLocks noChangeAspect="1"/>
+          </p:cNvPicPr>
+          <p:nvPr/>
+        </p:nvPicPr>
+        <p:blipFill>
+          <a:blip r:embed="rId2"/>
+          <a:stretch>
+            <a:fillRect/>
+          </a:stretch>
+        </p:blipFill>
+        <p:spPr>
+          <a:xfrm>
+            <a:off x="901148" y="289495"/>
+            <a:ext cx="10267088" cy="6210695"/>
+          </a:xfrm>
+          <a:prstGeom prst="rect">
+            <a:avLst/>
+          </a:prstGeom>
+        </p:spPr>
+      </p:pic>
     </p:spTree>
     <p:extLst>
       <p:ext uri="{BB962C8B-B14F-4D97-AF65-F5344CB8AC3E}">
-        <p14:creationId xmlns:p14="http://schemas.microsoft.com/office/powerpoint/2010/main" val="1463307141"/>
+        <p14:creationId xmlns:p14="http://schemas.microsoft.com/office/powerpoint/2010/main" val="1785461122"/>
       </p:ext>
     </p:extLst>
   </p:cSld>

</xml_diff>

<commit_message>
So much to no avail
</commit_message>
<xml_diff>
--- a/germination_trials/seed_update_labmeeting.pptx
+++ b/germination_trials/seed_update_labmeeting.pptx
@@ -5,18 +5,28 @@
     <p:sldMasterId id="2147483648" r:id="rId1"/>
   </p:sldMasterIdLst>
   <p:notesMasterIdLst>
-    <p:notesMasterId r:id="rId11"/>
+    <p:notesMasterId r:id="rId21"/>
   </p:notesMasterIdLst>
   <p:sldIdLst>
     <p:sldId id="263" r:id="rId2"/>
     <p:sldId id="265" r:id="rId3"/>
-    <p:sldId id="262" r:id="rId4"/>
-    <p:sldId id="257" r:id="rId5"/>
-    <p:sldId id="258" r:id="rId6"/>
-    <p:sldId id="259" r:id="rId7"/>
-    <p:sldId id="260" r:id="rId8"/>
-    <p:sldId id="261" r:id="rId9"/>
-    <p:sldId id="264" r:id="rId10"/>
+    <p:sldId id="266" r:id="rId4"/>
+    <p:sldId id="262" r:id="rId5"/>
+    <p:sldId id="257" r:id="rId6"/>
+    <p:sldId id="258" r:id="rId7"/>
+    <p:sldId id="259" r:id="rId8"/>
+    <p:sldId id="267" r:id="rId9"/>
+    <p:sldId id="260" r:id="rId10"/>
+    <p:sldId id="268" r:id="rId11"/>
+    <p:sldId id="261" r:id="rId12"/>
+    <p:sldId id="264" r:id="rId13"/>
+    <p:sldId id="269" r:id="rId14"/>
+    <p:sldId id="270" r:id="rId15"/>
+    <p:sldId id="271" r:id="rId16"/>
+    <p:sldId id="274" r:id="rId17"/>
+    <p:sldId id="275" r:id="rId18"/>
+    <p:sldId id="272" r:id="rId19"/>
+    <p:sldId id="273" r:id="rId20"/>
   </p:sldIdLst>
   <p:sldSz cx="12192000" cy="6858000"/>
   <p:notesSz cx="6858000" cy="9144000"/>
@@ -205,7 +215,7 @@
           <a:p>
             <a:fld id="{D4CF87E2-4DF1-AC4F-8672-7C737A70B6C5}" type="datetimeFigureOut">
               <a:rPr lang="en-US" smtClean="0"/>
-              <a:t>1/22/19</a:t>
+              <a:t>1/28/19</a:t>
             </a:fld>
             <a:endParaRPr lang="en-US"/>
           </a:p>
@@ -537,7 +547,7 @@
           <a:p>
             <a:fld id="{5C9C3A39-9915-0A4F-AB78-AFD769A447D1}" type="slidenum">
               <a:rPr lang="en-US" smtClean="0"/>
-              <a:t>4</a:t>
+              <a:t>2</a:t>
             </a:fld>
             <a:endParaRPr lang="en-US"/>
           </a:p>
@@ -546,7 +556,7 @@
     </p:spTree>
     <p:extLst>
       <p:ext uri="{BB962C8B-B14F-4D97-AF65-F5344CB8AC3E}">
-        <p14:creationId xmlns:p14="http://schemas.microsoft.com/office/powerpoint/2010/main" val="1756472968"/>
+        <p14:creationId xmlns:p14="http://schemas.microsoft.com/office/powerpoint/2010/main" val="692288836"/>
       </p:ext>
     </p:extLst>
   </p:cSld>
@@ -600,6 +610,18 @@
           <a:bodyPr/>
           <a:lstStyle/>
           <a:p>
+            <a:r>
+              <a:rPr lang="en-US" dirty="0"/>
+              <a:t>Assume same thermal time requirement for simplicity</a:t>
+            </a:r>
+          </a:p>
+          <a:p>
+            <a:r>
+              <a:rPr lang="en-US" dirty="0"/>
+              <a:t>Species with lower Tb will germinate first. If the they have differential sensitivity to stratification that might shift</a:t>
+            </a:r>
+          </a:p>
+          <a:p>
             <a:endParaRPr lang="en-US" dirty="0"/>
           </a:p>
         </p:txBody>
@@ -619,9 +641,9 @@
           <a:bodyPr/>
           <a:lstStyle/>
           <a:p>
-            <a:fld id="{5C9C3A39-9915-0A4F-AB78-AFD769A447D1}" type="slidenum">
+            <a:fld id="{5118BE63-793E-4A46-8DE4-B676FF388248}" type="slidenum">
               <a:rPr lang="en-US" smtClean="0"/>
-              <a:t>5</a:t>
+              <a:t>3</a:t>
             </a:fld>
             <a:endParaRPr lang="en-US"/>
           </a:p>
@@ -630,7 +652,7 @@
     </p:spTree>
     <p:extLst>
       <p:ext uri="{BB962C8B-B14F-4D97-AF65-F5344CB8AC3E}">
-        <p14:creationId xmlns:p14="http://schemas.microsoft.com/office/powerpoint/2010/main" val="1307203891"/>
+        <p14:creationId xmlns:p14="http://schemas.microsoft.com/office/powerpoint/2010/main" val="1240089985"/>
       </p:ext>
     </p:extLst>
   </p:cSld>
@@ -686,6 +708,348 @@
           <a:p>
             <a:r>
               <a:rPr lang="en-US" dirty="0"/>
+              <a:t>Describe experiment here</a:t>
+            </a:r>
+          </a:p>
+        </p:txBody>
+      </p:sp>
+      <p:sp>
+        <p:nvSpPr>
+          <p:cNvPr id="4" name="Slide Number Placeholder 3"/>
+          <p:cNvSpPr>
+            <a:spLocks noGrp="1"/>
+          </p:cNvSpPr>
+          <p:nvPr>
+            <p:ph type="sldNum" sz="quarter" idx="10"/>
+          </p:nvPr>
+        </p:nvSpPr>
+        <p:spPr/>
+        <p:txBody>
+          <a:bodyPr/>
+          <a:lstStyle/>
+          <a:p>
+            <a:fld id="{5C9C3A39-9915-0A4F-AB78-AFD769A447D1}" type="slidenum">
+              <a:rPr lang="en-US" smtClean="0"/>
+              <a:t>4</a:t>
+            </a:fld>
+            <a:endParaRPr lang="en-US"/>
+          </a:p>
+        </p:txBody>
+      </p:sp>
+    </p:spTree>
+    <p:extLst>
+      <p:ext uri="{BB962C8B-B14F-4D97-AF65-F5344CB8AC3E}">
+        <p14:creationId xmlns:p14="http://schemas.microsoft.com/office/powerpoint/2010/main" val="3293969956"/>
+      </p:ext>
+    </p:extLst>
+  </p:cSld>
+  <p:clrMapOvr>
+    <a:masterClrMapping/>
+  </p:clrMapOvr>
+</p:notes>
+</file>
+
+<file path=ppt/notesSlides/notesSlide4.xml><?xml version="1.0" encoding="utf-8"?>
+<p:notes xmlns:a="http://schemas.openxmlformats.org/drawingml/2006/main" xmlns:r="http://schemas.openxmlformats.org/officeDocument/2006/relationships" xmlns:p="http://schemas.openxmlformats.org/presentationml/2006/main">
+  <p:cSld>
+    <p:spTree>
+      <p:nvGrpSpPr>
+        <p:cNvPr id="1" name=""/>
+        <p:cNvGrpSpPr/>
+        <p:nvPr/>
+      </p:nvGrpSpPr>
+      <p:grpSpPr>
+        <a:xfrm>
+          <a:off x="0" y="0"/>
+          <a:ext cx="0" cy="0"/>
+          <a:chOff x="0" y="0"/>
+          <a:chExt cx="0" cy="0"/>
+        </a:xfrm>
+      </p:grpSpPr>
+      <p:sp>
+        <p:nvSpPr>
+          <p:cNvPr id="2" name="Slide Image Placeholder 1"/>
+          <p:cNvSpPr>
+            <a:spLocks noGrp="1" noRot="1" noChangeAspect="1"/>
+          </p:cNvSpPr>
+          <p:nvPr>
+            <p:ph type="sldImg"/>
+          </p:nvPr>
+        </p:nvSpPr>
+        <p:spPr/>
+      </p:sp>
+      <p:sp>
+        <p:nvSpPr>
+          <p:cNvPr id="3" name="Notes Placeholder 2"/>
+          <p:cNvSpPr>
+            <a:spLocks noGrp="1"/>
+          </p:cNvSpPr>
+          <p:nvPr>
+            <p:ph type="body" idx="1"/>
+          </p:nvPr>
+        </p:nvSpPr>
+        <p:spPr/>
+        <p:txBody>
+          <a:bodyPr/>
+          <a:lstStyle/>
+          <a:p>
+            <a:endParaRPr lang="en-US" dirty="0"/>
+          </a:p>
+        </p:txBody>
+      </p:sp>
+      <p:sp>
+        <p:nvSpPr>
+          <p:cNvPr id="4" name="Slide Number Placeholder 3"/>
+          <p:cNvSpPr>
+            <a:spLocks noGrp="1"/>
+          </p:cNvSpPr>
+          <p:nvPr>
+            <p:ph type="sldNum" sz="quarter" idx="10"/>
+          </p:nvPr>
+        </p:nvSpPr>
+        <p:spPr/>
+        <p:txBody>
+          <a:bodyPr/>
+          <a:lstStyle/>
+          <a:p>
+            <a:fld id="{5C9C3A39-9915-0A4F-AB78-AFD769A447D1}" type="slidenum">
+              <a:rPr lang="en-US" smtClean="0"/>
+              <a:t>5</a:t>
+            </a:fld>
+            <a:endParaRPr lang="en-US"/>
+          </a:p>
+        </p:txBody>
+      </p:sp>
+    </p:spTree>
+    <p:extLst>
+      <p:ext uri="{BB962C8B-B14F-4D97-AF65-F5344CB8AC3E}">
+        <p14:creationId xmlns:p14="http://schemas.microsoft.com/office/powerpoint/2010/main" val="1756472968"/>
+      </p:ext>
+    </p:extLst>
+  </p:cSld>
+  <p:clrMapOvr>
+    <a:masterClrMapping/>
+  </p:clrMapOvr>
+</p:notes>
+</file>
+
+<file path=ppt/notesSlides/notesSlide5.xml><?xml version="1.0" encoding="utf-8"?>
+<p:notes xmlns:a="http://schemas.openxmlformats.org/drawingml/2006/main" xmlns:r="http://schemas.openxmlformats.org/officeDocument/2006/relationships" xmlns:p="http://schemas.openxmlformats.org/presentationml/2006/main">
+  <p:cSld>
+    <p:spTree>
+      <p:nvGrpSpPr>
+        <p:cNvPr id="1" name=""/>
+        <p:cNvGrpSpPr/>
+        <p:nvPr/>
+      </p:nvGrpSpPr>
+      <p:grpSpPr>
+        <a:xfrm>
+          <a:off x="0" y="0"/>
+          <a:ext cx="0" cy="0"/>
+          <a:chOff x="0" y="0"/>
+          <a:chExt cx="0" cy="0"/>
+        </a:xfrm>
+      </p:grpSpPr>
+      <p:sp>
+        <p:nvSpPr>
+          <p:cNvPr id="2" name="Slide Image Placeholder 1"/>
+          <p:cNvSpPr>
+            <a:spLocks noGrp="1" noRot="1" noChangeAspect="1"/>
+          </p:cNvSpPr>
+          <p:nvPr>
+            <p:ph type="sldImg"/>
+          </p:nvPr>
+        </p:nvSpPr>
+        <p:spPr/>
+      </p:sp>
+      <p:sp>
+        <p:nvSpPr>
+          <p:cNvPr id="3" name="Notes Placeholder 2"/>
+          <p:cNvSpPr>
+            <a:spLocks noGrp="1"/>
+          </p:cNvSpPr>
+          <p:nvPr>
+            <p:ph type="body" idx="1"/>
+          </p:nvPr>
+        </p:nvSpPr>
+        <p:spPr/>
+        <p:txBody>
+          <a:bodyPr/>
+          <a:lstStyle/>
+          <a:p>
+            <a:endParaRPr lang="en-US" dirty="0"/>
+          </a:p>
+        </p:txBody>
+      </p:sp>
+      <p:sp>
+        <p:nvSpPr>
+          <p:cNvPr id="4" name="Slide Number Placeholder 3"/>
+          <p:cNvSpPr>
+            <a:spLocks noGrp="1"/>
+          </p:cNvSpPr>
+          <p:nvPr>
+            <p:ph type="sldNum" sz="quarter" idx="10"/>
+          </p:nvPr>
+        </p:nvSpPr>
+        <p:spPr/>
+        <p:txBody>
+          <a:bodyPr/>
+          <a:lstStyle/>
+          <a:p>
+            <a:fld id="{5C9C3A39-9915-0A4F-AB78-AFD769A447D1}" type="slidenum">
+              <a:rPr lang="en-US" smtClean="0"/>
+              <a:t>6</a:t>
+            </a:fld>
+            <a:endParaRPr lang="en-US"/>
+          </a:p>
+        </p:txBody>
+      </p:sp>
+    </p:spTree>
+    <p:extLst>
+      <p:ext uri="{BB962C8B-B14F-4D97-AF65-F5344CB8AC3E}">
+        <p14:creationId xmlns:p14="http://schemas.microsoft.com/office/powerpoint/2010/main" val="1307203891"/>
+      </p:ext>
+    </p:extLst>
+  </p:cSld>
+  <p:clrMapOvr>
+    <a:masterClrMapping/>
+  </p:clrMapOvr>
+</p:notes>
+</file>
+
+<file path=ppt/notesSlides/notesSlide6.xml><?xml version="1.0" encoding="utf-8"?>
+<p:notes xmlns:a="http://schemas.openxmlformats.org/drawingml/2006/main" xmlns:r="http://schemas.openxmlformats.org/officeDocument/2006/relationships" xmlns:p="http://schemas.openxmlformats.org/presentationml/2006/main">
+  <p:cSld>
+    <p:spTree>
+      <p:nvGrpSpPr>
+        <p:cNvPr id="1" name=""/>
+        <p:cNvGrpSpPr/>
+        <p:nvPr/>
+      </p:nvGrpSpPr>
+      <p:grpSpPr>
+        <a:xfrm>
+          <a:off x="0" y="0"/>
+          <a:ext cx="0" cy="0"/>
+          <a:chOff x="0" y="0"/>
+          <a:chExt cx="0" cy="0"/>
+        </a:xfrm>
+      </p:grpSpPr>
+      <p:sp>
+        <p:nvSpPr>
+          <p:cNvPr id="2" name="Slide Image Placeholder 1"/>
+          <p:cNvSpPr>
+            <a:spLocks noGrp="1" noRot="1" noChangeAspect="1"/>
+          </p:cNvSpPr>
+          <p:nvPr>
+            <p:ph type="sldImg"/>
+          </p:nvPr>
+        </p:nvSpPr>
+        <p:spPr/>
+      </p:sp>
+      <p:sp>
+        <p:nvSpPr>
+          <p:cNvPr id="3" name="Notes Placeholder 2"/>
+          <p:cNvSpPr>
+            <a:spLocks noGrp="1"/>
+          </p:cNvSpPr>
+          <p:nvPr>
+            <p:ph type="body" idx="1"/>
+          </p:nvPr>
+        </p:nvSpPr>
+        <p:spPr/>
+        <p:txBody>
+          <a:bodyPr/>
+          <a:lstStyle/>
+          <a:p>
+            <a:r>
+              <a:rPr lang="en-US" dirty="0"/>
+              <a:t>GI also can handle pre-germ and moldiness, though not explicitly</a:t>
+            </a:r>
+          </a:p>
+        </p:txBody>
+      </p:sp>
+      <p:sp>
+        <p:nvSpPr>
+          <p:cNvPr id="4" name="Slide Number Placeholder 3"/>
+          <p:cNvSpPr>
+            <a:spLocks noGrp="1"/>
+          </p:cNvSpPr>
+          <p:nvPr>
+            <p:ph type="sldNum" sz="quarter" idx="10"/>
+          </p:nvPr>
+        </p:nvSpPr>
+        <p:spPr/>
+        <p:txBody>
+          <a:bodyPr/>
+          <a:lstStyle/>
+          <a:p>
+            <a:fld id="{5C9C3A39-9915-0A4F-AB78-AFD769A447D1}" type="slidenum">
+              <a:rPr lang="en-US" smtClean="0"/>
+              <a:t>8</a:t>
+            </a:fld>
+            <a:endParaRPr lang="en-US"/>
+          </a:p>
+        </p:txBody>
+      </p:sp>
+    </p:spTree>
+    <p:extLst>
+      <p:ext uri="{BB962C8B-B14F-4D97-AF65-F5344CB8AC3E}">
+        <p14:creationId xmlns:p14="http://schemas.microsoft.com/office/powerpoint/2010/main" val="4235042402"/>
+      </p:ext>
+    </p:extLst>
+  </p:cSld>
+  <p:clrMapOvr>
+    <a:masterClrMapping/>
+  </p:clrMapOvr>
+</p:notes>
+</file>
+
+<file path=ppt/notesSlides/notesSlide7.xml><?xml version="1.0" encoding="utf-8"?>
+<p:notes xmlns:a="http://schemas.openxmlformats.org/drawingml/2006/main" xmlns:r="http://schemas.openxmlformats.org/officeDocument/2006/relationships" xmlns:p="http://schemas.openxmlformats.org/presentationml/2006/main">
+  <p:cSld>
+    <p:spTree>
+      <p:nvGrpSpPr>
+        <p:cNvPr id="1" name=""/>
+        <p:cNvGrpSpPr/>
+        <p:nvPr/>
+      </p:nvGrpSpPr>
+      <p:grpSpPr>
+        <a:xfrm>
+          <a:off x="0" y="0"/>
+          <a:ext cx="0" cy="0"/>
+          <a:chOff x="0" y="0"/>
+          <a:chExt cx="0" cy="0"/>
+        </a:xfrm>
+      </p:grpSpPr>
+      <p:sp>
+        <p:nvSpPr>
+          <p:cNvPr id="2" name="Slide Image Placeholder 1"/>
+          <p:cNvSpPr>
+            <a:spLocks noGrp="1" noRot="1" noChangeAspect="1"/>
+          </p:cNvSpPr>
+          <p:nvPr>
+            <p:ph type="sldImg"/>
+          </p:nvPr>
+        </p:nvSpPr>
+        <p:spPr/>
+      </p:sp>
+      <p:sp>
+        <p:nvSpPr>
+          <p:cNvPr id="3" name="Notes Placeholder 2"/>
+          <p:cNvSpPr>
+            <a:spLocks noGrp="1"/>
+          </p:cNvSpPr>
+          <p:nvPr>
+            <p:ph type="body" idx="1"/>
+          </p:nvPr>
+        </p:nvSpPr>
+        <p:spPr/>
+        <p:txBody>
+          <a:bodyPr/>
+          <a:lstStyle/>
+          <a:p>
+            <a:r>
+              <a:rPr lang="en-US" dirty="0"/>
               <a:t>Germination index is hard to think of in real </a:t>
             </a:r>
             <a:r>
@@ -713,7 +1077,7 @@
           <a:p>
             <a:fld id="{5C9C3A39-9915-0A4F-AB78-AFD769A447D1}" type="slidenum">
               <a:rPr lang="en-US" smtClean="0"/>
-              <a:t>7</a:t>
+              <a:t>9</a:t>
             </a:fld>
             <a:endParaRPr lang="en-US"/>
           </a:p>
@@ -723,6 +1087,177 @@
     <p:extLst>
       <p:ext uri="{BB962C8B-B14F-4D97-AF65-F5344CB8AC3E}">
         <p14:creationId xmlns:p14="http://schemas.microsoft.com/office/powerpoint/2010/main" val="3508592378"/>
+      </p:ext>
+    </p:extLst>
+  </p:cSld>
+  <p:clrMapOvr>
+    <a:masterClrMapping/>
+  </p:clrMapOvr>
+</p:notes>
+</file>
+
+<file path=ppt/notesSlides/notesSlide8.xml><?xml version="1.0" encoding="utf-8"?>
+<p:notes xmlns:a="http://schemas.openxmlformats.org/drawingml/2006/main" xmlns:r="http://schemas.openxmlformats.org/officeDocument/2006/relationships" xmlns:p="http://schemas.openxmlformats.org/presentationml/2006/main">
+  <p:cSld>
+    <p:spTree>
+      <p:nvGrpSpPr>
+        <p:cNvPr id="1" name=""/>
+        <p:cNvGrpSpPr/>
+        <p:nvPr/>
+      </p:nvGrpSpPr>
+      <p:grpSpPr>
+        <a:xfrm>
+          <a:off x="0" y="0"/>
+          <a:ext cx="0" cy="0"/>
+          <a:chOff x="0" y="0"/>
+          <a:chExt cx="0" cy="0"/>
+        </a:xfrm>
+      </p:grpSpPr>
+      <p:sp>
+        <p:nvSpPr>
+          <p:cNvPr id="2" name="Slide Image Placeholder 1"/>
+          <p:cNvSpPr>
+            <a:spLocks noGrp="1" noRot="1" noChangeAspect="1"/>
+          </p:cNvSpPr>
+          <p:nvPr>
+            <p:ph type="sldImg"/>
+          </p:nvPr>
+        </p:nvSpPr>
+        <p:spPr/>
+      </p:sp>
+      <p:sp>
+        <p:nvSpPr>
+          <p:cNvPr id="3" name="Notes Placeholder 2"/>
+          <p:cNvSpPr>
+            <a:spLocks noGrp="1"/>
+          </p:cNvSpPr>
+          <p:nvPr>
+            <p:ph type="body" idx="1"/>
+          </p:nvPr>
+        </p:nvSpPr>
+        <p:spPr/>
+        <p:txBody>
+          <a:bodyPr/>
+          <a:lstStyle/>
+          <a:p>
+            <a:endParaRPr lang="en-US" dirty="0"/>
+          </a:p>
+        </p:txBody>
+      </p:sp>
+      <p:sp>
+        <p:nvSpPr>
+          <p:cNvPr id="4" name="Slide Number Placeholder 3"/>
+          <p:cNvSpPr>
+            <a:spLocks noGrp="1"/>
+          </p:cNvSpPr>
+          <p:nvPr>
+            <p:ph type="sldNum" sz="quarter" idx="10"/>
+          </p:nvPr>
+        </p:nvSpPr>
+        <p:spPr/>
+        <p:txBody>
+          <a:bodyPr/>
+          <a:lstStyle/>
+          <a:p>
+            <a:fld id="{5C9C3A39-9915-0A4F-AB78-AFD769A447D1}" type="slidenum">
+              <a:rPr lang="en-US" smtClean="0"/>
+              <a:t>13</a:t>
+            </a:fld>
+            <a:endParaRPr lang="en-US"/>
+          </a:p>
+        </p:txBody>
+      </p:sp>
+    </p:spTree>
+    <p:extLst>
+      <p:ext uri="{BB962C8B-B14F-4D97-AF65-F5344CB8AC3E}">
+        <p14:creationId xmlns:p14="http://schemas.microsoft.com/office/powerpoint/2010/main" val="164221242"/>
+      </p:ext>
+    </p:extLst>
+  </p:cSld>
+  <p:clrMapOvr>
+    <a:masterClrMapping/>
+  </p:clrMapOvr>
+</p:notes>
+</file>
+
+<file path=ppt/notesSlides/notesSlide9.xml><?xml version="1.0" encoding="utf-8"?>
+<p:notes xmlns:a="http://schemas.openxmlformats.org/drawingml/2006/main" xmlns:r="http://schemas.openxmlformats.org/officeDocument/2006/relationships" xmlns:p="http://schemas.openxmlformats.org/presentationml/2006/main">
+  <p:cSld>
+    <p:spTree>
+      <p:nvGrpSpPr>
+        <p:cNvPr id="1" name=""/>
+        <p:cNvGrpSpPr/>
+        <p:nvPr/>
+      </p:nvGrpSpPr>
+      <p:grpSpPr>
+        <a:xfrm>
+          <a:off x="0" y="0"/>
+          <a:ext cx="0" cy="0"/>
+          <a:chOff x="0" y="0"/>
+          <a:chExt cx="0" cy="0"/>
+        </a:xfrm>
+      </p:grpSpPr>
+      <p:sp>
+        <p:nvSpPr>
+          <p:cNvPr id="2" name="Slide Image Placeholder 1"/>
+          <p:cNvSpPr>
+            <a:spLocks noGrp="1" noRot="1" noChangeAspect="1"/>
+          </p:cNvSpPr>
+          <p:nvPr>
+            <p:ph type="sldImg"/>
+          </p:nvPr>
+        </p:nvSpPr>
+        <p:spPr/>
+      </p:sp>
+      <p:sp>
+        <p:nvSpPr>
+          <p:cNvPr id="3" name="Notes Placeholder 2"/>
+          <p:cNvSpPr>
+            <a:spLocks noGrp="1"/>
+          </p:cNvSpPr>
+          <p:nvPr>
+            <p:ph type="body" idx="1"/>
+          </p:nvPr>
+        </p:nvSpPr>
+        <p:spPr/>
+        <p:txBody>
+          <a:bodyPr/>
+          <a:lstStyle/>
+          <a:p>
+            <a:r>
+              <a:rPr lang="en-US" dirty="0"/>
+              <a:t>Hard to trouble shoot why some treatments won’t converge.</a:t>
+            </a:r>
+          </a:p>
+        </p:txBody>
+      </p:sp>
+      <p:sp>
+        <p:nvSpPr>
+          <p:cNvPr id="4" name="Slide Number Placeholder 3"/>
+          <p:cNvSpPr>
+            <a:spLocks noGrp="1"/>
+          </p:cNvSpPr>
+          <p:nvPr>
+            <p:ph type="sldNum" sz="quarter" idx="10"/>
+          </p:nvPr>
+        </p:nvSpPr>
+        <p:spPr/>
+        <p:txBody>
+          <a:bodyPr/>
+          <a:lstStyle/>
+          <a:p>
+            <a:fld id="{5C9C3A39-9915-0A4F-AB78-AFD769A447D1}" type="slidenum">
+              <a:rPr lang="en-US" smtClean="0"/>
+              <a:t>15</a:t>
+            </a:fld>
+            <a:endParaRPr lang="en-US"/>
+          </a:p>
+        </p:txBody>
+      </p:sp>
+    </p:spTree>
+    <p:extLst>
+      <p:ext uri="{BB962C8B-B14F-4D97-AF65-F5344CB8AC3E}">
+        <p14:creationId xmlns:p14="http://schemas.microsoft.com/office/powerpoint/2010/main" val="2873980140"/>
       </p:ext>
     </p:extLst>
   </p:cSld>
@@ -879,7 +1414,7 @@
           <a:p>
             <a:fld id="{4F1BA5B5-647B-EF49-A2C5-BE1321D4BC46}" type="datetimeFigureOut">
               <a:rPr lang="en-US" smtClean="0"/>
-              <a:t>1/22/19</a:t>
+              <a:t>1/28/19</a:t>
             </a:fld>
             <a:endParaRPr lang="en-US"/>
           </a:p>
@@ -1077,7 +1612,7 @@
           <a:p>
             <a:fld id="{4F1BA5B5-647B-EF49-A2C5-BE1321D4BC46}" type="datetimeFigureOut">
               <a:rPr lang="en-US" smtClean="0"/>
-              <a:t>1/22/19</a:t>
+              <a:t>1/28/19</a:t>
             </a:fld>
             <a:endParaRPr lang="en-US"/>
           </a:p>
@@ -1285,7 +1820,7 @@
           <a:p>
             <a:fld id="{4F1BA5B5-647B-EF49-A2C5-BE1321D4BC46}" type="datetimeFigureOut">
               <a:rPr lang="en-US" smtClean="0"/>
-              <a:t>1/22/19</a:t>
+              <a:t>1/28/19</a:t>
             </a:fld>
             <a:endParaRPr lang="en-US"/>
           </a:p>
@@ -1349,6 +1884,302 @@
     <p:extLst>
       <p:ext uri="{BB962C8B-B14F-4D97-AF65-F5344CB8AC3E}">
         <p14:creationId xmlns:p14="http://schemas.microsoft.com/office/powerpoint/2010/main" val="889228080"/>
+      </p:ext>
+    </p:extLst>
+  </p:cSld>
+  <p:clrMapOvr>
+    <a:masterClrMapping/>
+  </p:clrMapOvr>
+</p:sldLayout>
+</file>
+
+<file path=ppt/slideLayouts/slideLayout12.xml><?xml version="1.0" encoding="utf-8"?>
+<p:sldLayout xmlns:a="http://schemas.openxmlformats.org/drawingml/2006/main" xmlns:r="http://schemas.openxmlformats.org/officeDocument/2006/relationships" xmlns:p="http://schemas.openxmlformats.org/presentationml/2006/main" userDrawn="1">
+  <p:cSld name="4_Title and Content">
+    <p:spTree>
+      <p:nvGrpSpPr>
+        <p:cNvPr id="1" name=""/>
+        <p:cNvGrpSpPr/>
+        <p:nvPr/>
+      </p:nvGrpSpPr>
+      <p:grpSpPr>
+        <a:xfrm>
+          <a:off x="0" y="0"/>
+          <a:ext cx="0" cy="0"/>
+          <a:chOff x="0" y="0"/>
+          <a:chExt cx="0" cy="0"/>
+        </a:xfrm>
+      </p:grpSpPr>
+      <p:sp>
+        <p:nvSpPr>
+          <p:cNvPr id="3" name="Content Placeholder 2"/>
+          <p:cNvSpPr>
+            <a:spLocks noGrp="1"/>
+          </p:cNvSpPr>
+          <p:nvPr>
+            <p:ph idx="1"/>
+          </p:nvPr>
+        </p:nvSpPr>
+        <p:spPr>
+          <a:ln>
+            <a:solidFill>
+              <a:srgbClr val="000000"/>
+            </a:solidFill>
+          </a:ln>
+        </p:spPr>
+        <p:txBody>
+          <a:bodyPr>
+            <a:normAutofit/>
+          </a:bodyPr>
+          <a:lstStyle>
+            <a:lvl1pPr>
+              <a:defRPr sz="2000">
+                <a:latin typeface="Helvetica"/>
+                <a:cs typeface="Helvetica"/>
+              </a:defRPr>
+            </a:lvl1pPr>
+            <a:lvl2pPr>
+              <a:defRPr sz="2000">
+                <a:latin typeface="Helvetica"/>
+                <a:cs typeface="Helvetica"/>
+              </a:defRPr>
+            </a:lvl2pPr>
+            <a:lvl3pPr>
+              <a:defRPr sz="1600">
+                <a:latin typeface="Helvetica"/>
+                <a:cs typeface="Helvetica"/>
+              </a:defRPr>
+            </a:lvl3pPr>
+            <a:lvl4pPr>
+              <a:defRPr sz="1600">
+                <a:latin typeface="Helvetica"/>
+                <a:cs typeface="Helvetica"/>
+              </a:defRPr>
+            </a:lvl4pPr>
+            <a:lvl5pPr>
+              <a:defRPr sz="1600">
+                <a:latin typeface="Helvetica"/>
+                <a:cs typeface="Helvetica"/>
+              </a:defRPr>
+            </a:lvl5pPr>
+          </a:lstStyle>
+          <a:p>
+            <a:pPr lvl="0"/>
+            <a:r>
+              <a:rPr lang="en-US" dirty="0"/>
+              <a:t>Click to edit Master text styles</a:t>
+            </a:r>
+          </a:p>
+          <a:p>
+            <a:pPr lvl="1"/>
+            <a:r>
+              <a:rPr lang="en-US" dirty="0"/>
+              <a:t>Second level</a:t>
+            </a:r>
+          </a:p>
+          <a:p>
+            <a:pPr lvl="2"/>
+            <a:r>
+              <a:rPr lang="en-US" dirty="0"/>
+              <a:t>Third level</a:t>
+            </a:r>
+          </a:p>
+          <a:p>
+            <a:pPr lvl="3"/>
+            <a:r>
+              <a:rPr lang="en-US" dirty="0"/>
+              <a:t>Fourth level</a:t>
+            </a:r>
+          </a:p>
+          <a:p>
+            <a:pPr lvl="4"/>
+            <a:r>
+              <a:rPr lang="en-US" dirty="0"/>
+              <a:t>Fifth level</a:t>
+            </a:r>
+          </a:p>
+        </p:txBody>
+      </p:sp>
+      <p:sp>
+        <p:nvSpPr>
+          <p:cNvPr id="4" name="Date Placeholder 3"/>
+          <p:cNvSpPr>
+            <a:spLocks noGrp="1"/>
+          </p:cNvSpPr>
+          <p:nvPr>
+            <p:ph type="dt" sz="half" idx="10"/>
+          </p:nvPr>
+        </p:nvSpPr>
+        <p:spPr/>
+        <p:txBody>
+          <a:bodyPr/>
+          <a:lstStyle/>
+          <a:p>
+            <a:fld id="{3737F87F-7A13-AB4F-816E-A50305B7DDDA}" type="datetimeFigureOut">
+              <a:rPr lang="en-US" smtClean="0"/>
+              <a:t>1/29/19</a:t>
+            </a:fld>
+            <a:endParaRPr lang="en-US" dirty="0"/>
+          </a:p>
+        </p:txBody>
+      </p:sp>
+      <p:sp>
+        <p:nvSpPr>
+          <p:cNvPr id="5" name="Footer Placeholder 4"/>
+          <p:cNvSpPr>
+            <a:spLocks noGrp="1"/>
+          </p:cNvSpPr>
+          <p:nvPr>
+            <p:ph type="ftr" sz="quarter" idx="11"/>
+          </p:nvPr>
+        </p:nvSpPr>
+        <p:spPr/>
+        <p:txBody>
+          <a:bodyPr/>
+          <a:lstStyle/>
+          <a:p>
+            <a:endParaRPr lang="en-US" dirty="0"/>
+          </a:p>
+        </p:txBody>
+      </p:sp>
+      <p:sp>
+        <p:nvSpPr>
+          <p:cNvPr id="6" name="Slide Number Placeholder 5"/>
+          <p:cNvSpPr>
+            <a:spLocks noGrp="1"/>
+          </p:cNvSpPr>
+          <p:nvPr>
+            <p:ph type="sldNum" sz="quarter" idx="12"/>
+          </p:nvPr>
+        </p:nvSpPr>
+        <p:spPr/>
+        <p:txBody>
+          <a:bodyPr/>
+          <a:lstStyle/>
+          <a:p>
+            <a:fld id="{4165CED2-2196-2D46-9A0E-77B7034BF2F8}" type="slidenum">
+              <a:rPr lang="en-US" smtClean="0"/>
+              <a:t>‹#›</a:t>
+            </a:fld>
+            <a:endParaRPr lang="en-US" dirty="0"/>
+          </a:p>
+        </p:txBody>
+      </p:sp>
+      <p:sp>
+        <p:nvSpPr>
+          <p:cNvPr id="7" name="Title 6"/>
+          <p:cNvSpPr>
+            <a:spLocks noGrp="1"/>
+          </p:cNvSpPr>
+          <p:nvPr>
+            <p:ph type="title" hasCustomPrompt="1"/>
+          </p:nvPr>
+        </p:nvSpPr>
+        <p:spPr>
+          <a:xfrm>
+            <a:off x="60703" y="344528"/>
+            <a:ext cx="5591525" cy="487365"/>
+          </a:xfrm>
+          <a:ln w="38100" cmpd="sng">
+            <a:solidFill>
+              <a:srgbClr val="000000"/>
+            </a:solidFill>
+          </a:ln>
+        </p:spPr>
+        <p:txBody>
+          <a:bodyPr>
+            <a:normAutofit/>
+          </a:bodyPr>
+          <a:lstStyle>
+            <a:lvl1pPr algn="l">
+              <a:defRPr sz="2400" baseline="0">
+                <a:latin typeface="Helvetica"/>
+                <a:cs typeface="Helvetica"/>
+              </a:defRPr>
+            </a:lvl1pPr>
+          </a:lstStyle>
+          <a:p>
+            <a:r>
+              <a:rPr lang="en-US" dirty="0"/>
+              <a:t>Text here</a:t>
+            </a:r>
+          </a:p>
+        </p:txBody>
+      </p:sp>
+      <p:sp>
+        <p:nvSpPr>
+          <p:cNvPr id="8" name="TextBox 7"/>
+          <p:cNvSpPr txBox="1"/>
+          <p:nvPr userDrawn="1"/>
+        </p:nvSpPr>
+        <p:spPr>
+          <a:xfrm>
+            <a:off x="0" y="1"/>
+            <a:ext cx="12192000" cy="307777"/>
+          </a:xfrm>
+          <a:prstGeom prst="rect">
+            <a:avLst/>
+          </a:prstGeom>
+          <a:solidFill>
+            <a:schemeClr val="tx1"/>
+          </a:solidFill>
+          <a:ln>
+            <a:solidFill>
+              <a:schemeClr val="tx1"/>
+            </a:solidFill>
+          </a:ln>
+        </p:spPr>
+        <p:txBody>
+          <a:bodyPr wrap="square" rtlCol="0">
+            <a:spAutoFit/>
+          </a:bodyPr>
+          <a:lstStyle/>
+          <a:p>
+            <a:pPr algn="r"/>
+            <a:r>
+              <a:rPr lang="en-US" sz="1400" dirty="0">
+                <a:solidFill>
+                  <a:schemeClr val="bg1"/>
+                </a:solidFill>
+              </a:rPr>
+              <a:t>[ Background</a:t>
+            </a:r>
+            <a:r>
+              <a:rPr lang="en-US" sz="1400" baseline="0" dirty="0">
+                <a:solidFill>
+                  <a:schemeClr val="bg1"/>
+                </a:solidFill>
+              </a:rPr>
+              <a:t> | Chapter I | Chapter II | Chapter III | </a:t>
+            </a:r>
+            <a:r>
+              <a:rPr lang="en-US" sz="1400" baseline="0" dirty="0">
+                <a:solidFill>
+                  <a:srgbClr val="FFFF00"/>
+                </a:solidFill>
+              </a:rPr>
+              <a:t>Chapter IV </a:t>
+            </a:r>
+            <a:r>
+              <a:rPr lang="en-US" sz="1400" baseline="0" dirty="0">
+                <a:solidFill>
+                  <a:schemeClr val="bg1"/>
+                </a:solidFill>
+              </a:rPr>
+              <a:t>| Timeline | Conclusions ]</a:t>
+            </a:r>
+            <a:endParaRPr lang="en-US" sz="1400" dirty="0">
+              <a:solidFill>
+                <a:schemeClr val="bg1"/>
+              </a:solidFill>
+            </a:endParaRPr>
+          </a:p>
+        </p:txBody>
+      </p:sp>
+    </p:spTree>
+    <p:extLst>
+      <p:ext uri="{BB962C8B-B14F-4D97-AF65-F5344CB8AC3E}">
+        <p14:creationId xmlns:p14="http://schemas.microsoft.com/office/powerpoint/2010/main" val="250518820"/>
       </p:ext>
     </p:extLst>
   </p:cSld>
@@ -1483,7 +2314,7 @@
           <a:p>
             <a:fld id="{4F1BA5B5-647B-EF49-A2C5-BE1321D4BC46}" type="datetimeFigureOut">
               <a:rPr lang="en-US" smtClean="0"/>
-              <a:t>1/22/19</a:t>
+              <a:t>1/28/19</a:t>
             </a:fld>
             <a:endParaRPr lang="en-US"/>
           </a:p>
@@ -1758,7 +2589,7 @@
           <a:p>
             <a:fld id="{4F1BA5B5-647B-EF49-A2C5-BE1321D4BC46}" type="datetimeFigureOut">
               <a:rPr lang="en-US" smtClean="0"/>
-              <a:t>1/22/19</a:t>
+              <a:t>1/28/19</a:t>
             </a:fld>
             <a:endParaRPr lang="en-US"/>
           </a:p>
@@ -2023,7 +2854,7 @@
           <a:p>
             <a:fld id="{4F1BA5B5-647B-EF49-A2C5-BE1321D4BC46}" type="datetimeFigureOut">
               <a:rPr lang="en-US" smtClean="0"/>
-              <a:t>1/22/19</a:t>
+              <a:t>1/28/19</a:t>
             </a:fld>
             <a:endParaRPr lang="en-US"/>
           </a:p>
@@ -2435,7 +3266,7 @@
           <a:p>
             <a:fld id="{4F1BA5B5-647B-EF49-A2C5-BE1321D4BC46}" type="datetimeFigureOut">
               <a:rPr lang="en-US" smtClean="0"/>
-              <a:t>1/22/19</a:t>
+              <a:t>1/28/19</a:t>
             </a:fld>
             <a:endParaRPr lang="en-US"/>
           </a:p>
@@ -2576,7 +3407,7 @@
           <a:p>
             <a:fld id="{4F1BA5B5-647B-EF49-A2C5-BE1321D4BC46}" type="datetimeFigureOut">
               <a:rPr lang="en-US" smtClean="0"/>
-              <a:t>1/22/19</a:t>
+              <a:t>1/28/19</a:t>
             </a:fld>
             <a:endParaRPr lang="en-US"/>
           </a:p>
@@ -2689,7 +3520,7 @@
           <a:p>
             <a:fld id="{4F1BA5B5-647B-EF49-A2C5-BE1321D4BC46}" type="datetimeFigureOut">
               <a:rPr lang="en-US" smtClean="0"/>
-              <a:t>1/22/19</a:t>
+              <a:t>1/28/19</a:t>
             </a:fld>
             <a:endParaRPr lang="en-US"/>
           </a:p>
@@ -3000,7 +3831,7 @@
           <a:p>
             <a:fld id="{4F1BA5B5-647B-EF49-A2C5-BE1321D4BC46}" type="datetimeFigureOut">
               <a:rPr lang="en-US" smtClean="0"/>
-              <a:t>1/22/19</a:t>
+              <a:t>1/28/19</a:t>
             </a:fld>
             <a:endParaRPr lang="en-US"/>
           </a:p>
@@ -3288,7 +4119,7 @@
           <a:p>
             <a:fld id="{4F1BA5B5-647B-EF49-A2C5-BE1321D4BC46}" type="datetimeFigureOut">
               <a:rPr lang="en-US" smtClean="0"/>
-              <a:t>1/22/19</a:t>
+              <a:t>1/28/19</a:t>
             </a:fld>
             <a:endParaRPr lang="en-US"/>
           </a:p>
@@ -3529,7 +4360,7 @@
           <a:p>
             <a:fld id="{4F1BA5B5-647B-EF49-A2C5-BE1321D4BC46}" type="datetimeFigureOut">
               <a:rPr lang="en-US" smtClean="0"/>
-              <a:t>1/22/19</a:t>
+              <a:t>1/28/19</a:t>
             </a:fld>
             <a:endParaRPr lang="en-US"/>
           </a:p>
@@ -3645,6 +4476,7 @@
     <p:sldLayoutId id="2147483657" r:id="rId9"/>
     <p:sldLayoutId id="2147483658" r:id="rId10"/>
     <p:sldLayoutId id="2147483659" r:id="rId11"/>
+    <p:sldLayoutId id="2147483660" r:id="rId12"/>
   </p:sldLayoutIdLst>
   <p:txStyles>
     <p:titleStyle>
@@ -3995,7 +4827,10 @@
           <a:bodyPr/>
           <a:lstStyle/>
           <a:p>
-            <a:endParaRPr lang="en-US"/>
+            <a:r>
+              <a:rPr lang="en-US" dirty="0"/>
+              <a:t>30-January-2019</a:t>
+            </a:r>
           </a:p>
         </p:txBody>
       </p:sp>
@@ -4003,6 +4838,997 @@
     <p:extLst>
       <p:ext uri="{BB962C8B-B14F-4D97-AF65-F5344CB8AC3E}">
         <p14:creationId xmlns:p14="http://schemas.microsoft.com/office/powerpoint/2010/main" val="3182189343"/>
+      </p:ext>
+    </p:extLst>
+  </p:cSld>
+  <p:clrMapOvr>
+    <a:masterClrMapping/>
+  </p:clrMapOvr>
+</p:sld>
+</file>
+
+<file path=ppt/slides/slide10.xml><?xml version="1.0" encoding="utf-8"?>
+<p:sld xmlns:a="http://schemas.openxmlformats.org/drawingml/2006/main" xmlns:r="http://schemas.openxmlformats.org/officeDocument/2006/relationships" xmlns:p="http://schemas.openxmlformats.org/presentationml/2006/main">
+  <p:cSld>
+    <p:spTree>
+      <p:nvGrpSpPr>
+        <p:cNvPr id="1" name=""/>
+        <p:cNvGrpSpPr/>
+        <p:nvPr/>
+      </p:nvGrpSpPr>
+      <p:grpSpPr>
+        <a:xfrm>
+          <a:off x="0" y="0"/>
+          <a:ext cx="0" cy="0"/>
+          <a:chOff x="0" y="0"/>
+          <a:chExt cx="0" cy="0"/>
+        </a:xfrm>
+      </p:grpSpPr>
+      <p:pic>
+        <p:nvPicPr>
+          <p:cNvPr id="3" name="Picture 2">
+            <a:extLst>
+              <a:ext uri="{FF2B5EF4-FFF2-40B4-BE49-F238E27FC236}">
+                <a16:creationId xmlns:a16="http://schemas.microsoft.com/office/drawing/2014/main" id="{F8665513-1E89-A641-B81F-DE90455669AE}"/>
+              </a:ext>
+            </a:extLst>
+          </p:cNvPr>
+          <p:cNvPicPr>
+            <a:picLocks noChangeAspect="1"/>
+          </p:cNvPicPr>
+          <p:nvPr/>
+        </p:nvPicPr>
+        <p:blipFill>
+          <a:blip r:embed="rId2"/>
+          <a:stretch>
+            <a:fillRect/>
+          </a:stretch>
+        </p:blipFill>
+        <p:spPr>
+          <a:xfrm>
+            <a:off x="0" y="0"/>
+            <a:ext cx="12192000" cy="6657254"/>
+          </a:xfrm>
+          <a:prstGeom prst="rect">
+            <a:avLst/>
+          </a:prstGeom>
+        </p:spPr>
+      </p:pic>
+    </p:spTree>
+    <p:extLst>
+      <p:ext uri="{BB962C8B-B14F-4D97-AF65-F5344CB8AC3E}">
+        <p14:creationId xmlns:p14="http://schemas.microsoft.com/office/powerpoint/2010/main" val="585642016"/>
+      </p:ext>
+    </p:extLst>
+  </p:cSld>
+  <p:clrMapOvr>
+    <a:masterClrMapping/>
+  </p:clrMapOvr>
+</p:sld>
+</file>
+
+<file path=ppt/slides/slide11.xml><?xml version="1.0" encoding="utf-8"?>
+<p:sld xmlns:a="http://schemas.openxmlformats.org/drawingml/2006/main" xmlns:r="http://schemas.openxmlformats.org/officeDocument/2006/relationships" xmlns:p="http://schemas.openxmlformats.org/presentationml/2006/main">
+  <p:cSld>
+    <p:spTree>
+      <p:nvGrpSpPr>
+        <p:cNvPr id="1" name=""/>
+        <p:cNvGrpSpPr/>
+        <p:nvPr/>
+      </p:nvGrpSpPr>
+      <p:grpSpPr>
+        <a:xfrm>
+          <a:off x="0" y="0"/>
+          <a:ext cx="0" cy="0"/>
+          <a:chOff x="0" y="0"/>
+          <a:chExt cx="0" cy="0"/>
+        </a:xfrm>
+      </p:grpSpPr>
+      <p:pic>
+        <p:nvPicPr>
+          <p:cNvPr id="3" name="Picture 2">
+            <a:extLst>
+              <a:ext uri="{FF2B5EF4-FFF2-40B4-BE49-F238E27FC236}">
+                <a16:creationId xmlns:a16="http://schemas.microsoft.com/office/drawing/2014/main" id="{387FBEE0-BE2E-4545-8FD1-CC0A551E5367}"/>
+              </a:ext>
+            </a:extLst>
+          </p:cNvPr>
+          <p:cNvPicPr>
+            <a:picLocks noChangeAspect="1"/>
+          </p:cNvPicPr>
+          <p:nvPr/>
+        </p:nvPicPr>
+        <p:blipFill>
+          <a:blip r:embed="rId2"/>
+          <a:stretch>
+            <a:fillRect/>
+          </a:stretch>
+        </p:blipFill>
+        <p:spPr>
+          <a:xfrm>
+            <a:off x="0" y="55651"/>
+            <a:ext cx="12192000" cy="6746697"/>
+          </a:xfrm>
+          <a:prstGeom prst="rect">
+            <a:avLst/>
+          </a:prstGeom>
+        </p:spPr>
+      </p:pic>
+      <p:sp>
+        <p:nvSpPr>
+          <p:cNvPr id="4" name="Rectangle 3">
+            <a:extLst>
+              <a:ext uri="{FF2B5EF4-FFF2-40B4-BE49-F238E27FC236}">
+                <a16:creationId xmlns:a16="http://schemas.microsoft.com/office/drawing/2014/main" id="{B83F2AD9-5223-5144-A546-91A993D0859E}"/>
+              </a:ext>
+            </a:extLst>
+          </p:cNvPr>
+          <p:cNvSpPr/>
+          <p:nvPr/>
+        </p:nvSpPr>
+        <p:spPr>
+          <a:xfrm>
+            <a:off x="6970643" y="3472070"/>
+            <a:ext cx="2796209" cy="2968487"/>
+          </a:xfrm>
+          <a:prstGeom prst="rect">
+            <a:avLst/>
+          </a:prstGeom>
+          <a:noFill/>
+          <a:ln>
+            <a:solidFill>
+              <a:srgbClr val="FF0000"/>
+            </a:solidFill>
+          </a:ln>
+        </p:spPr>
+        <p:style>
+          <a:lnRef idx="2">
+            <a:schemeClr val="accent1">
+              <a:shade val="50000"/>
+            </a:schemeClr>
+          </a:lnRef>
+          <a:fillRef idx="1">
+            <a:schemeClr val="accent1"/>
+          </a:fillRef>
+          <a:effectRef idx="0">
+            <a:schemeClr val="accent1"/>
+          </a:effectRef>
+          <a:fontRef idx="minor">
+            <a:schemeClr val="lt1"/>
+          </a:fontRef>
+        </p:style>
+        <p:txBody>
+          <a:bodyPr rtlCol="0" anchor="ctr"/>
+          <a:lstStyle/>
+          <a:p>
+            <a:pPr algn="ctr"/>
+            <a:endParaRPr lang="en-US"/>
+          </a:p>
+        </p:txBody>
+      </p:sp>
+      <p:sp>
+        <p:nvSpPr>
+          <p:cNvPr id="8" name="Rectangle 7">
+            <a:extLst>
+              <a:ext uri="{FF2B5EF4-FFF2-40B4-BE49-F238E27FC236}">
+                <a16:creationId xmlns:a16="http://schemas.microsoft.com/office/drawing/2014/main" id="{2E3D9118-B176-AE4D-BF91-A3FA93007582}"/>
+              </a:ext>
+            </a:extLst>
+          </p:cNvPr>
+          <p:cNvSpPr/>
+          <p:nvPr/>
+        </p:nvSpPr>
+        <p:spPr>
+          <a:xfrm>
+            <a:off x="5135217" y="279617"/>
+            <a:ext cx="2796209" cy="2968487"/>
+          </a:xfrm>
+          <a:prstGeom prst="rect">
+            <a:avLst/>
+          </a:prstGeom>
+          <a:noFill/>
+          <a:ln>
+            <a:solidFill>
+              <a:srgbClr val="FF0000"/>
+            </a:solidFill>
+          </a:ln>
+        </p:spPr>
+        <p:style>
+          <a:lnRef idx="2">
+            <a:schemeClr val="accent1">
+              <a:shade val="50000"/>
+            </a:schemeClr>
+          </a:lnRef>
+          <a:fillRef idx="1">
+            <a:schemeClr val="accent1"/>
+          </a:fillRef>
+          <a:effectRef idx="0">
+            <a:schemeClr val="accent1"/>
+          </a:effectRef>
+          <a:fontRef idx="minor">
+            <a:schemeClr val="lt1"/>
+          </a:fontRef>
+        </p:style>
+        <p:txBody>
+          <a:bodyPr rtlCol="0" anchor="ctr"/>
+          <a:lstStyle/>
+          <a:p>
+            <a:pPr algn="ctr"/>
+            <a:endParaRPr lang="en-US"/>
+          </a:p>
+        </p:txBody>
+      </p:sp>
+    </p:spTree>
+    <p:extLst>
+      <p:ext uri="{BB962C8B-B14F-4D97-AF65-F5344CB8AC3E}">
+        <p14:creationId xmlns:p14="http://schemas.microsoft.com/office/powerpoint/2010/main" val="1463307141"/>
+      </p:ext>
+    </p:extLst>
+  </p:cSld>
+  <p:clrMapOvr>
+    <a:masterClrMapping/>
+  </p:clrMapOvr>
+</p:sld>
+</file>
+
+<file path=ppt/slides/slide12.xml><?xml version="1.0" encoding="utf-8"?>
+<p:sld xmlns:a="http://schemas.openxmlformats.org/drawingml/2006/main" xmlns:r="http://schemas.openxmlformats.org/officeDocument/2006/relationships" xmlns:p="http://schemas.openxmlformats.org/presentationml/2006/main">
+  <p:cSld>
+    <p:spTree>
+      <p:nvGrpSpPr>
+        <p:cNvPr id="1" name=""/>
+        <p:cNvGrpSpPr/>
+        <p:nvPr/>
+      </p:nvGrpSpPr>
+      <p:grpSpPr>
+        <a:xfrm>
+          <a:off x="0" y="0"/>
+          <a:ext cx="0" cy="0"/>
+          <a:chOff x="0" y="0"/>
+          <a:chExt cx="0" cy="0"/>
+        </a:xfrm>
+      </p:grpSpPr>
+      <p:pic>
+        <p:nvPicPr>
+          <p:cNvPr id="6" name="Picture 5">
+            <a:extLst>
+              <a:ext uri="{FF2B5EF4-FFF2-40B4-BE49-F238E27FC236}">
+                <a16:creationId xmlns:a16="http://schemas.microsoft.com/office/drawing/2014/main" id="{C15C825E-4E16-E14A-A516-4182FC63DC4A}"/>
+              </a:ext>
+            </a:extLst>
+          </p:cNvPr>
+          <p:cNvPicPr>
+            <a:picLocks noChangeAspect="1"/>
+          </p:cNvPicPr>
+          <p:nvPr/>
+        </p:nvPicPr>
+        <p:blipFill>
+          <a:blip r:embed="rId2"/>
+          <a:stretch>
+            <a:fillRect/>
+          </a:stretch>
+        </p:blipFill>
+        <p:spPr>
+          <a:xfrm>
+            <a:off x="579775" y="193962"/>
+            <a:ext cx="11286065" cy="6431973"/>
+          </a:xfrm>
+          <a:prstGeom prst="rect">
+            <a:avLst/>
+          </a:prstGeom>
+        </p:spPr>
+      </p:pic>
+      <p:sp>
+        <p:nvSpPr>
+          <p:cNvPr id="7" name="Rectangle 6">
+            <a:extLst>
+              <a:ext uri="{FF2B5EF4-FFF2-40B4-BE49-F238E27FC236}">
+                <a16:creationId xmlns:a16="http://schemas.microsoft.com/office/drawing/2014/main" id="{64069A67-87C9-2947-9D07-C5D901E34B7B}"/>
+              </a:ext>
+            </a:extLst>
+          </p:cNvPr>
+          <p:cNvSpPr/>
+          <p:nvPr/>
+        </p:nvSpPr>
+        <p:spPr>
+          <a:xfrm>
+            <a:off x="6289964" y="193962"/>
+            <a:ext cx="969818" cy="6234547"/>
+          </a:xfrm>
+          <a:prstGeom prst="rect">
+            <a:avLst/>
+          </a:prstGeom>
+          <a:noFill/>
+          <a:ln>
+            <a:solidFill>
+              <a:srgbClr val="FF0000"/>
+            </a:solidFill>
+          </a:ln>
+        </p:spPr>
+        <p:style>
+          <a:lnRef idx="2">
+            <a:schemeClr val="accent1">
+              <a:shade val="50000"/>
+            </a:schemeClr>
+          </a:lnRef>
+          <a:fillRef idx="1">
+            <a:schemeClr val="accent1"/>
+          </a:fillRef>
+          <a:effectRef idx="0">
+            <a:schemeClr val="accent1"/>
+          </a:effectRef>
+          <a:fontRef idx="minor">
+            <a:schemeClr val="lt1"/>
+          </a:fontRef>
+        </p:style>
+        <p:txBody>
+          <a:bodyPr rtlCol="0" anchor="ctr"/>
+          <a:lstStyle/>
+          <a:p>
+            <a:pPr algn="ctr"/>
+            <a:endParaRPr lang="en-US"/>
+          </a:p>
+        </p:txBody>
+      </p:sp>
+      <p:sp>
+        <p:nvSpPr>
+          <p:cNvPr id="9" name="Rectangle 8">
+            <a:extLst>
+              <a:ext uri="{FF2B5EF4-FFF2-40B4-BE49-F238E27FC236}">
+                <a16:creationId xmlns:a16="http://schemas.microsoft.com/office/drawing/2014/main" id="{C9B4318D-991D-9B44-B440-F73645A356AC}"/>
+              </a:ext>
+            </a:extLst>
+          </p:cNvPr>
+          <p:cNvSpPr/>
+          <p:nvPr/>
+        </p:nvSpPr>
+        <p:spPr>
+          <a:xfrm>
+            <a:off x="1980143" y="193961"/>
+            <a:ext cx="969818" cy="6234547"/>
+          </a:xfrm>
+          <a:prstGeom prst="rect">
+            <a:avLst/>
+          </a:prstGeom>
+          <a:noFill/>
+          <a:ln>
+            <a:solidFill>
+              <a:srgbClr val="FF0000"/>
+            </a:solidFill>
+          </a:ln>
+        </p:spPr>
+        <p:style>
+          <a:lnRef idx="2">
+            <a:schemeClr val="accent1">
+              <a:shade val="50000"/>
+            </a:schemeClr>
+          </a:lnRef>
+          <a:fillRef idx="1">
+            <a:schemeClr val="accent1"/>
+          </a:fillRef>
+          <a:effectRef idx="0">
+            <a:schemeClr val="accent1"/>
+          </a:effectRef>
+          <a:fontRef idx="minor">
+            <a:schemeClr val="lt1"/>
+          </a:fontRef>
+        </p:style>
+        <p:txBody>
+          <a:bodyPr rtlCol="0" anchor="ctr"/>
+          <a:lstStyle/>
+          <a:p>
+            <a:pPr algn="ctr"/>
+            <a:endParaRPr lang="en-US"/>
+          </a:p>
+        </p:txBody>
+      </p:sp>
+    </p:spTree>
+    <p:extLst>
+      <p:ext uri="{BB962C8B-B14F-4D97-AF65-F5344CB8AC3E}">
+        <p14:creationId xmlns:p14="http://schemas.microsoft.com/office/powerpoint/2010/main" val="1785461122"/>
+      </p:ext>
+    </p:extLst>
+  </p:cSld>
+  <p:clrMapOvr>
+    <a:masterClrMapping/>
+  </p:clrMapOvr>
+</p:sld>
+</file>
+
+<file path=ppt/slides/slide13.xml><?xml version="1.0" encoding="utf-8"?>
+<p:sld xmlns:a="http://schemas.openxmlformats.org/drawingml/2006/main" xmlns:r="http://schemas.openxmlformats.org/officeDocument/2006/relationships" xmlns:p="http://schemas.openxmlformats.org/presentationml/2006/main">
+  <p:cSld>
+    <p:spTree>
+      <p:nvGrpSpPr>
+        <p:cNvPr id="1" name=""/>
+        <p:cNvGrpSpPr/>
+        <p:nvPr/>
+      </p:nvGrpSpPr>
+      <p:grpSpPr>
+        <a:xfrm>
+          <a:off x="0" y="0"/>
+          <a:ext cx="0" cy="0"/>
+          <a:chOff x="0" y="0"/>
+          <a:chExt cx="0" cy="0"/>
+        </a:xfrm>
+      </p:grpSpPr>
+      <p:pic>
+        <p:nvPicPr>
+          <p:cNvPr id="3" name="Picture 2">
+            <a:extLst>
+              <a:ext uri="{FF2B5EF4-FFF2-40B4-BE49-F238E27FC236}">
+                <a16:creationId xmlns:a16="http://schemas.microsoft.com/office/drawing/2014/main" id="{961C4E5C-322E-1A43-9F6B-A9B4A7F046B7}"/>
+              </a:ext>
+            </a:extLst>
+          </p:cNvPr>
+          <p:cNvPicPr>
+            <a:picLocks noChangeAspect="1"/>
+          </p:cNvPicPr>
+          <p:nvPr/>
+        </p:nvPicPr>
+        <p:blipFill>
+          <a:blip r:embed="rId3"/>
+          <a:stretch>
+            <a:fillRect/>
+          </a:stretch>
+        </p:blipFill>
+        <p:spPr>
+          <a:xfrm>
+            <a:off x="0" y="263625"/>
+            <a:ext cx="10978035" cy="6287420"/>
+          </a:xfrm>
+          <a:prstGeom prst="rect">
+            <a:avLst/>
+          </a:prstGeom>
+        </p:spPr>
+      </p:pic>
+    </p:spTree>
+    <p:extLst>
+      <p:ext uri="{BB962C8B-B14F-4D97-AF65-F5344CB8AC3E}">
+        <p14:creationId xmlns:p14="http://schemas.microsoft.com/office/powerpoint/2010/main" val="2108297257"/>
+      </p:ext>
+    </p:extLst>
+  </p:cSld>
+  <p:clrMapOvr>
+    <a:masterClrMapping/>
+  </p:clrMapOvr>
+</p:sld>
+</file>
+
+<file path=ppt/slides/slide14.xml><?xml version="1.0" encoding="utf-8"?>
+<p:sld xmlns:a="http://schemas.openxmlformats.org/drawingml/2006/main" xmlns:r="http://schemas.openxmlformats.org/officeDocument/2006/relationships" xmlns:p="http://schemas.openxmlformats.org/presentationml/2006/main">
+  <p:cSld>
+    <p:spTree>
+      <p:nvGrpSpPr>
+        <p:cNvPr id="1" name=""/>
+        <p:cNvGrpSpPr/>
+        <p:nvPr/>
+      </p:nvGrpSpPr>
+      <p:grpSpPr>
+        <a:xfrm>
+          <a:off x="0" y="0"/>
+          <a:ext cx="0" cy="0"/>
+          <a:chOff x="0" y="0"/>
+          <a:chExt cx="0" cy="0"/>
+        </a:xfrm>
+      </p:grpSpPr>
+      <p:pic>
+        <p:nvPicPr>
+          <p:cNvPr id="3" name="Picture 2">
+            <a:extLst>
+              <a:ext uri="{FF2B5EF4-FFF2-40B4-BE49-F238E27FC236}">
+                <a16:creationId xmlns:a16="http://schemas.microsoft.com/office/drawing/2014/main" id="{00BDC30B-194E-FB40-9F88-70A3AE0FDC94}"/>
+              </a:ext>
+            </a:extLst>
+          </p:cNvPr>
+          <p:cNvPicPr>
+            <a:picLocks noChangeAspect="1"/>
+          </p:cNvPicPr>
+          <p:nvPr/>
+        </p:nvPicPr>
+        <p:blipFill>
+          <a:blip r:embed="rId2"/>
+          <a:stretch>
+            <a:fillRect/>
+          </a:stretch>
+        </p:blipFill>
+        <p:spPr>
+          <a:xfrm>
+            <a:off x="7841673" y="142010"/>
+            <a:ext cx="4211781" cy="2897510"/>
+          </a:xfrm>
+          <a:prstGeom prst="rect">
+            <a:avLst/>
+          </a:prstGeom>
+        </p:spPr>
+      </p:pic>
+      <p:pic>
+        <p:nvPicPr>
+          <p:cNvPr id="5" name="Picture 4">
+            <a:extLst>
+              <a:ext uri="{FF2B5EF4-FFF2-40B4-BE49-F238E27FC236}">
+                <a16:creationId xmlns:a16="http://schemas.microsoft.com/office/drawing/2014/main" id="{7A260E06-2C28-4347-8C7C-4583A2C1860F}"/>
+              </a:ext>
+            </a:extLst>
+          </p:cNvPr>
+          <p:cNvPicPr>
+            <a:picLocks noChangeAspect="1"/>
+          </p:cNvPicPr>
+          <p:nvPr/>
+        </p:nvPicPr>
+        <p:blipFill>
+          <a:blip r:embed="rId3"/>
+          <a:stretch>
+            <a:fillRect/>
+          </a:stretch>
+        </p:blipFill>
+        <p:spPr>
+          <a:xfrm>
+            <a:off x="140277" y="850519"/>
+            <a:ext cx="8047759" cy="6007482"/>
+          </a:xfrm>
+          <a:prstGeom prst="rect">
+            <a:avLst/>
+          </a:prstGeom>
+        </p:spPr>
+      </p:pic>
+    </p:spTree>
+    <p:extLst>
+      <p:ext uri="{BB962C8B-B14F-4D97-AF65-F5344CB8AC3E}">
+        <p14:creationId xmlns:p14="http://schemas.microsoft.com/office/powerpoint/2010/main" val="784184752"/>
+      </p:ext>
+    </p:extLst>
+  </p:cSld>
+  <p:clrMapOvr>
+    <a:masterClrMapping/>
+  </p:clrMapOvr>
+</p:sld>
+</file>
+
+<file path=ppt/slides/slide15.xml><?xml version="1.0" encoding="utf-8"?>
+<p:sld xmlns:a="http://schemas.openxmlformats.org/drawingml/2006/main" xmlns:r="http://schemas.openxmlformats.org/officeDocument/2006/relationships" xmlns:p="http://schemas.openxmlformats.org/presentationml/2006/main">
+  <p:cSld>
+    <p:spTree>
+      <p:nvGrpSpPr>
+        <p:cNvPr id="1" name=""/>
+        <p:cNvGrpSpPr/>
+        <p:nvPr/>
+      </p:nvGrpSpPr>
+      <p:grpSpPr>
+        <a:xfrm>
+          <a:off x="0" y="0"/>
+          <a:ext cx="0" cy="0"/>
+          <a:chOff x="0" y="0"/>
+          <a:chExt cx="0" cy="0"/>
+        </a:xfrm>
+      </p:grpSpPr>
+      <p:pic>
+        <p:nvPicPr>
+          <p:cNvPr id="3" name="Picture 2">
+            <a:extLst>
+              <a:ext uri="{FF2B5EF4-FFF2-40B4-BE49-F238E27FC236}">
+                <a16:creationId xmlns:a16="http://schemas.microsoft.com/office/drawing/2014/main" id="{EAB3EB3B-E562-C744-AE2F-580F4A6994DE}"/>
+              </a:ext>
+            </a:extLst>
+          </p:cNvPr>
+          <p:cNvPicPr>
+            <a:picLocks noChangeAspect="1"/>
+          </p:cNvPicPr>
+          <p:nvPr/>
+        </p:nvPicPr>
+        <p:blipFill>
+          <a:blip r:embed="rId3"/>
+          <a:stretch>
+            <a:fillRect/>
+          </a:stretch>
+        </p:blipFill>
+        <p:spPr>
+          <a:xfrm>
+            <a:off x="457200" y="3325091"/>
+            <a:ext cx="4889881" cy="3532909"/>
+          </a:xfrm>
+          <a:prstGeom prst="rect">
+            <a:avLst/>
+          </a:prstGeom>
+        </p:spPr>
+      </p:pic>
+      <p:pic>
+        <p:nvPicPr>
+          <p:cNvPr id="5" name="Picture 4">
+            <a:extLst>
+              <a:ext uri="{FF2B5EF4-FFF2-40B4-BE49-F238E27FC236}">
+                <a16:creationId xmlns:a16="http://schemas.microsoft.com/office/drawing/2014/main" id="{08EFD13B-8195-AA42-A6DA-F7D9D66C3B9B}"/>
+              </a:ext>
+            </a:extLst>
+          </p:cNvPr>
+          <p:cNvPicPr>
+            <a:picLocks noChangeAspect="1"/>
+          </p:cNvPicPr>
+          <p:nvPr/>
+        </p:nvPicPr>
+        <p:blipFill>
+          <a:blip r:embed="rId4"/>
+          <a:stretch>
+            <a:fillRect/>
+          </a:stretch>
+        </p:blipFill>
+        <p:spPr>
+          <a:xfrm>
+            <a:off x="1894031" y="0"/>
+            <a:ext cx="7683500" cy="3568700"/>
+          </a:xfrm>
+          <a:prstGeom prst="rect">
+            <a:avLst/>
+          </a:prstGeom>
+        </p:spPr>
+      </p:pic>
+    </p:spTree>
+    <p:extLst>
+      <p:ext uri="{BB962C8B-B14F-4D97-AF65-F5344CB8AC3E}">
+        <p14:creationId xmlns:p14="http://schemas.microsoft.com/office/powerpoint/2010/main" val="485993903"/>
+      </p:ext>
+    </p:extLst>
+  </p:cSld>
+  <p:clrMapOvr>
+    <a:masterClrMapping/>
+  </p:clrMapOvr>
+</p:sld>
+</file>
+
+<file path=ppt/slides/slide16.xml><?xml version="1.0" encoding="utf-8"?>
+<p:sld xmlns:a="http://schemas.openxmlformats.org/drawingml/2006/main" xmlns:r="http://schemas.openxmlformats.org/officeDocument/2006/relationships" xmlns:p="http://schemas.openxmlformats.org/presentationml/2006/main">
+  <p:cSld>
+    <p:spTree>
+      <p:nvGrpSpPr>
+        <p:cNvPr id="1" name=""/>
+        <p:cNvGrpSpPr/>
+        <p:nvPr/>
+      </p:nvGrpSpPr>
+      <p:grpSpPr>
+        <a:xfrm>
+          <a:off x="0" y="0"/>
+          <a:ext cx="0" cy="0"/>
+          <a:chOff x="0" y="0"/>
+          <a:chExt cx="0" cy="0"/>
+        </a:xfrm>
+      </p:grpSpPr>
+      <p:pic>
+        <p:nvPicPr>
+          <p:cNvPr id="7" name="Picture 6">
+            <a:extLst>
+              <a:ext uri="{FF2B5EF4-FFF2-40B4-BE49-F238E27FC236}">
+                <a16:creationId xmlns:a16="http://schemas.microsoft.com/office/drawing/2014/main" id="{CA06C638-CC28-934D-BA03-99C237369B84}"/>
+              </a:ext>
+            </a:extLst>
+          </p:cNvPr>
+          <p:cNvPicPr>
+            <a:picLocks noChangeAspect="1"/>
+          </p:cNvPicPr>
+          <p:nvPr/>
+        </p:nvPicPr>
+        <p:blipFill>
+          <a:blip r:embed="rId2"/>
+          <a:stretch>
+            <a:fillRect/>
+          </a:stretch>
+        </p:blipFill>
+        <p:spPr>
+          <a:xfrm>
+            <a:off x="52069" y="275165"/>
+            <a:ext cx="5418667" cy="5418667"/>
+          </a:xfrm>
+          <a:prstGeom prst="rect">
+            <a:avLst/>
+          </a:prstGeom>
+        </p:spPr>
+      </p:pic>
+      <p:pic>
+        <p:nvPicPr>
+          <p:cNvPr id="9" name="Picture 8">
+            <a:extLst>
+              <a:ext uri="{FF2B5EF4-FFF2-40B4-BE49-F238E27FC236}">
+                <a16:creationId xmlns:a16="http://schemas.microsoft.com/office/drawing/2014/main" id="{FC3FF5A5-F051-8C47-9A8E-061AA2609C80}"/>
+              </a:ext>
+            </a:extLst>
+          </p:cNvPr>
+          <p:cNvPicPr>
+            <a:picLocks noChangeAspect="1"/>
+          </p:cNvPicPr>
+          <p:nvPr/>
+        </p:nvPicPr>
+        <p:blipFill>
+          <a:blip r:embed="rId3"/>
+          <a:stretch>
+            <a:fillRect/>
+          </a:stretch>
+        </p:blipFill>
+        <p:spPr>
+          <a:xfrm>
+            <a:off x="3768088" y="275165"/>
+            <a:ext cx="5576995" cy="5576995"/>
+          </a:xfrm>
+          <a:prstGeom prst="rect">
+            <a:avLst/>
+          </a:prstGeom>
+        </p:spPr>
+      </p:pic>
+    </p:spTree>
+    <p:extLst>
+      <p:ext uri="{BB962C8B-B14F-4D97-AF65-F5344CB8AC3E}">
+        <p14:creationId xmlns:p14="http://schemas.microsoft.com/office/powerpoint/2010/main" val="1466086098"/>
+      </p:ext>
+    </p:extLst>
+  </p:cSld>
+  <p:clrMapOvr>
+    <a:masterClrMapping/>
+  </p:clrMapOvr>
+</p:sld>
+</file>
+
+<file path=ppt/slides/slide17.xml><?xml version="1.0" encoding="utf-8"?>
+<p:sld xmlns:a="http://schemas.openxmlformats.org/drawingml/2006/main" xmlns:r="http://schemas.openxmlformats.org/officeDocument/2006/relationships" xmlns:p="http://schemas.openxmlformats.org/presentationml/2006/main">
+  <p:cSld>
+    <p:spTree>
+      <p:nvGrpSpPr>
+        <p:cNvPr id="1" name=""/>
+        <p:cNvGrpSpPr/>
+        <p:nvPr/>
+      </p:nvGrpSpPr>
+      <p:grpSpPr>
+        <a:xfrm>
+          <a:off x="0" y="0"/>
+          <a:ext cx="0" cy="0"/>
+          <a:chOff x="0" y="0"/>
+          <a:chExt cx="0" cy="0"/>
+        </a:xfrm>
+      </p:grpSpPr>
+      <p:pic>
+        <p:nvPicPr>
+          <p:cNvPr id="2" name="Picture 1">
+            <a:extLst>
+              <a:ext uri="{FF2B5EF4-FFF2-40B4-BE49-F238E27FC236}">
+                <a16:creationId xmlns:a16="http://schemas.microsoft.com/office/drawing/2014/main" id="{26EF2E95-B4B4-E841-BE87-B45E53D6D5BA}"/>
+              </a:ext>
+            </a:extLst>
+          </p:cNvPr>
+          <p:cNvPicPr>
+            <a:picLocks noChangeAspect="1"/>
+          </p:cNvPicPr>
+          <p:nvPr/>
+        </p:nvPicPr>
+        <p:blipFill>
+          <a:blip r:embed="rId2"/>
+          <a:stretch>
+            <a:fillRect/>
+          </a:stretch>
+        </p:blipFill>
+        <p:spPr>
+          <a:xfrm>
+            <a:off x="94828" y="400047"/>
+            <a:ext cx="5492753" cy="5492753"/>
+          </a:xfrm>
+          <a:prstGeom prst="rect">
+            <a:avLst/>
+          </a:prstGeom>
+        </p:spPr>
+      </p:pic>
+      <p:pic>
+        <p:nvPicPr>
+          <p:cNvPr id="3" name="Picture 2">
+            <a:extLst>
+              <a:ext uri="{FF2B5EF4-FFF2-40B4-BE49-F238E27FC236}">
+                <a16:creationId xmlns:a16="http://schemas.microsoft.com/office/drawing/2014/main" id="{352E6E04-DA96-4649-BD46-623A6FEDB4F9}"/>
+              </a:ext>
+            </a:extLst>
+          </p:cNvPr>
+          <p:cNvPicPr>
+            <a:picLocks noChangeAspect="1"/>
+          </p:cNvPicPr>
+          <p:nvPr/>
+        </p:nvPicPr>
+        <p:blipFill>
+          <a:blip r:embed="rId3"/>
+          <a:stretch>
+            <a:fillRect/>
+          </a:stretch>
+        </p:blipFill>
+        <p:spPr>
+          <a:xfrm>
+            <a:off x="3781998" y="400047"/>
+            <a:ext cx="5549781" cy="5549781"/>
+          </a:xfrm>
+          <a:prstGeom prst="rect">
+            <a:avLst/>
+          </a:prstGeom>
+        </p:spPr>
+      </p:pic>
+    </p:spTree>
+    <p:extLst>
+      <p:ext uri="{BB962C8B-B14F-4D97-AF65-F5344CB8AC3E}">
+        <p14:creationId xmlns:p14="http://schemas.microsoft.com/office/powerpoint/2010/main" val="1548068694"/>
+      </p:ext>
+    </p:extLst>
+  </p:cSld>
+  <p:clrMapOvr>
+    <a:masterClrMapping/>
+  </p:clrMapOvr>
+</p:sld>
+</file>
+
+<file path=ppt/slides/slide18.xml><?xml version="1.0" encoding="utf-8"?>
+<p:sld xmlns:a="http://schemas.openxmlformats.org/drawingml/2006/main" xmlns:r="http://schemas.openxmlformats.org/officeDocument/2006/relationships" xmlns:p="http://schemas.openxmlformats.org/presentationml/2006/main">
+  <p:cSld>
+    <p:spTree>
+      <p:nvGrpSpPr>
+        <p:cNvPr id="1" name=""/>
+        <p:cNvGrpSpPr/>
+        <p:nvPr/>
+      </p:nvGrpSpPr>
+      <p:grpSpPr>
+        <a:xfrm>
+          <a:off x="0" y="0"/>
+          <a:ext cx="0" cy="0"/>
+          <a:chOff x="0" y="0"/>
+          <a:chExt cx="0" cy="0"/>
+        </a:xfrm>
+      </p:grpSpPr>
+      <p:pic>
+        <p:nvPicPr>
+          <p:cNvPr id="3" name="Picture 2">
+            <a:extLst>
+              <a:ext uri="{FF2B5EF4-FFF2-40B4-BE49-F238E27FC236}">
+                <a16:creationId xmlns:a16="http://schemas.microsoft.com/office/drawing/2014/main" id="{915830DF-8B1F-5047-8C80-9BC9DF03C590}"/>
+              </a:ext>
+            </a:extLst>
+          </p:cNvPr>
+          <p:cNvPicPr>
+            <a:picLocks noChangeAspect="1"/>
+          </p:cNvPicPr>
+          <p:nvPr/>
+        </p:nvPicPr>
+        <p:blipFill>
+          <a:blip r:embed="rId2"/>
+          <a:stretch>
+            <a:fillRect/>
+          </a:stretch>
+        </p:blipFill>
+        <p:spPr>
+          <a:xfrm>
+            <a:off x="222281" y="331893"/>
+            <a:ext cx="3553164" cy="6194213"/>
+          </a:xfrm>
+          <a:prstGeom prst="rect">
+            <a:avLst/>
+          </a:prstGeom>
+        </p:spPr>
+      </p:pic>
+      <p:sp>
+        <p:nvSpPr>
+          <p:cNvPr id="4" name="TextBox 3">
+            <a:extLst>
+              <a:ext uri="{FF2B5EF4-FFF2-40B4-BE49-F238E27FC236}">
+                <a16:creationId xmlns:a16="http://schemas.microsoft.com/office/drawing/2014/main" id="{599136E8-EEEA-C545-A861-C1FB06D0B99C}"/>
+              </a:ext>
+            </a:extLst>
+          </p:cNvPr>
+          <p:cNvSpPr txBox="1"/>
+          <p:nvPr/>
+        </p:nvSpPr>
+        <p:spPr>
+          <a:xfrm>
+            <a:off x="4490720" y="1286933"/>
+            <a:ext cx="5655733" cy="923330"/>
+          </a:xfrm>
+          <a:prstGeom prst="rect">
+            <a:avLst/>
+          </a:prstGeom>
+          <a:noFill/>
+        </p:spPr>
+        <p:txBody>
+          <a:bodyPr wrap="square" rtlCol="0">
+            <a:spAutoFit/>
+          </a:bodyPr>
+          <a:lstStyle/>
+          <a:p>
+            <a:r>
+              <a:rPr lang="en-US" dirty="0"/>
+              <a:t>This is a model for how T50 (e) is affected by treatments.</a:t>
+            </a:r>
+          </a:p>
+          <a:p>
+            <a:r>
+              <a:rPr lang="en-US" dirty="0"/>
+              <a:t>As you can see, it seem like not really, but I think that because of the covariance of d (upper limit), and e</a:t>
+            </a:r>
+          </a:p>
+        </p:txBody>
+      </p:sp>
+    </p:spTree>
+    <p:extLst>
+      <p:ext uri="{BB962C8B-B14F-4D97-AF65-F5344CB8AC3E}">
+        <p14:creationId xmlns:p14="http://schemas.microsoft.com/office/powerpoint/2010/main" val="1930072249"/>
+      </p:ext>
+    </p:extLst>
+  </p:cSld>
+  <p:clrMapOvr>
+    <a:masterClrMapping/>
+  </p:clrMapOvr>
+</p:sld>
+</file>
+
+<file path=ppt/slides/slide19.xml><?xml version="1.0" encoding="utf-8"?>
+<p:sld xmlns:a="http://schemas.openxmlformats.org/drawingml/2006/main" xmlns:r="http://schemas.openxmlformats.org/officeDocument/2006/relationships" xmlns:p="http://schemas.openxmlformats.org/presentationml/2006/main">
+  <p:cSld>
+    <p:spTree>
+      <p:nvGrpSpPr>
+        <p:cNvPr id="1" name=""/>
+        <p:cNvGrpSpPr/>
+        <p:nvPr/>
+      </p:nvGrpSpPr>
+      <p:grpSpPr>
+        <a:xfrm>
+          <a:off x="0" y="0"/>
+          <a:ext cx="0" cy="0"/>
+          <a:chOff x="0" y="0"/>
+          <a:chExt cx="0" cy="0"/>
+        </a:xfrm>
+      </p:grpSpPr>
+      <p:sp>
+        <p:nvSpPr>
+          <p:cNvPr id="2" name="TextBox 1">
+            <a:extLst>
+              <a:ext uri="{FF2B5EF4-FFF2-40B4-BE49-F238E27FC236}">
+                <a16:creationId xmlns:a16="http://schemas.microsoft.com/office/drawing/2014/main" id="{7ACA87DB-13EF-6440-A9F2-F9F0EB02AC4E}"/>
+              </a:ext>
+            </a:extLst>
+          </p:cNvPr>
+          <p:cNvSpPr txBox="1"/>
+          <p:nvPr/>
+        </p:nvSpPr>
+        <p:spPr>
+          <a:xfrm>
+            <a:off x="2309706" y="1483359"/>
+            <a:ext cx="8304107" cy="923330"/>
+          </a:xfrm>
+          <a:prstGeom prst="rect">
+            <a:avLst/>
+          </a:prstGeom>
+          <a:noFill/>
+        </p:spPr>
+        <p:txBody>
+          <a:bodyPr wrap="square" rtlCol="0">
+            <a:spAutoFit/>
+          </a:bodyPr>
+          <a:lstStyle/>
+          <a:p>
+            <a:r>
+              <a:rPr lang="en-US" dirty="0"/>
+              <a:t>Other concerns:</a:t>
+            </a:r>
+          </a:p>
+          <a:p>
+            <a:pPr marL="285750" indent="-285750">
+              <a:buFont typeface="Arial" panose="020B0604020202020204" pitchFamily="34" charset="0"/>
+              <a:buChar char="•"/>
+            </a:pPr>
+            <a:r>
+              <a:rPr lang="en-US" dirty="0"/>
+              <a:t>Usefulness of/methods for chilling thresh holds?</a:t>
+            </a:r>
+          </a:p>
+          <a:p>
+            <a:pPr marL="285750" indent="-285750">
+              <a:buFont typeface="Arial" panose="020B0604020202020204" pitchFamily="34" charset="0"/>
+              <a:buChar char="•"/>
+            </a:pPr>
+            <a:endParaRPr lang="en-US" dirty="0"/>
+          </a:p>
+        </p:txBody>
+      </p:sp>
+    </p:spTree>
+    <p:extLst>
+      <p:ext uri="{BB962C8B-B14F-4D97-AF65-F5344CB8AC3E}">
+        <p14:creationId xmlns:p14="http://schemas.microsoft.com/office/powerpoint/2010/main" val="893228309"/>
       </p:ext>
     </p:extLst>
   </p:cSld>
@@ -4069,7 +5895,7 @@
             </a:pPr>
             <a:r>
               <a:rPr lang="en-US" dirty="0"/>
-              <a:t>Species selection for competition trial</a:t>
+              <a:t>Select species for competition trial</a:t>
             </a:r>
           </a:p>
           <a:p>
@@ -4114,6 +5940,1162 @@
           <a:chExt cx="0" cy="0"/>
         </a:xfrm>
       </p:grpSpPr>
+      <p:sp>
+        <p:nvSpPr>
+          <p:cNvPr id="3" name="Title 2"/>
+          <p:cNvSpPr>
+            <a:spLocks noGrp="1"/>
+          </p:cNvSpPr>
+          <p:nvPr>
+            <p:ph type="title"/>
+          </p:nvPr>
+        </p:nvSpPr>
+        <p:spPr>
+          <a:xfrm>
+            <a:off x="1569527" y="344528"/>
+            <a:ext cx="7183949" cy="487365"/>
+          </a:xfrm>
+        </p:spPr>
+        <p:txBody>
+          <a:bodyPr>
+            <a:normAutofit fontScale="90000"/>
+          </a:bodyPr>
+          <a:lstStyle/>
+          <a:p>
+            <a:r>
+              <a:rPr lang="en-US" dirty="0"/>
+              <a:t>Seasonal Priority Effects and </a:t>
+            </a:r>
+            <a:r>
+              <a:rPr lang="en-US" dirty="0" err="1"/>
+              <a:t>phenological</a:t>
+            </a:r>
+            <a:r>
+              <a:rPr lang="en-US" dirty="0"/>
+              <a:t> sensitivity</a:t>
+            </a:r>
+          </a:p>
+        </p:txBody>
+      </p:sp>
+      <p:cxnSp>
+        <p:nvCxnSpPr>
+          <p:cNvPr id="6" name="Straight Connector 5"/>
+          <p:cNvCxnSpPr>
+            <a:cxnSpLocks/>
+          </p:cNvCxnSpPr>
+          <p:nvPr/>
+        </p:nvCxnSpPr>
+        <p:spPr>
+          <a:xfrm>
+            <a:off x="2855204" y="936668"/>
+            <a:ext cx="7393696" cy="2833385"/>
+          </a:xfrm>
+          <a:prstGeom prst="line">
+            <a:avLst/>
+          </a:prstGeom>
+          <a:ln w="28575"/>
+        </p:spPr>
+        <p:style>
+          <a:lnRef idx="2">
+            <a:schemeClr val="accent1"/>
+          </a:lnRef>
+          <a:fillRef idx="0">
+            <a:schemeClr val="accent1"/>
+          </a:fillRef>
+          <a:effectRef idx="1">
+            <a:schemeClr val="accent1"/>
+          </a:effectRef>
+          <a:fontRef idx="minor">
+            <a:schemeClr val="tx1"/>
+          </a:fontRef>
+        </p:style>
+      </p:cxnSp>
+      <p:cxnSp>
+        <p:nvCxnSpPr>
+          <p:cNvPr id="8" name="Straight Connector 7"/>
+          <p:cNvCxnSpPr>
+            <a:cxnSpLocks/>
+          </p:cNvCxnSpPr>
+          <p:nvPr/>
+        </p:nvCxnSpPr>
+        <p:spPr>
+          <a:xfrm>
+            <a:off x="2493254" y="2166002"/>
+            <a:ext cx="7755646" cy="1189913"/>
+          </a:xfrm>
+          <a:prstGeom prst="line">
+            <a:avLst/>
+          </a:prstGeom>
+          <a:ln w="28575"/>
+        </p:spPr>
+        <p:style>
+          <a:lnRef idx="2">
+            <a:schemeClr val="accent2"/>
+          </a:lnRef>
+          <a:fillRef idx="0">
+            <a:schemeClr val="accent2"/>
+          </a:fillRef>
+          <a:effectRef idx="1">
+            <a:schemeClr val="accent2"/>
+          </a:effectRef>
+          <a:fontRef idx="minor">
+            <a:schemeClr val="tx1"/>
+          </a:fontRef>
+        </p:style>
+      </p:cxnSp>
+      <p:sp>
+        <p:nvSpPr>
+          <p:cNvPr id="10" name="Parallelogram 9">
+            <a:extLst>
+              <a:ext uri="{FF2B5EF4-FFF2-40B4-BE49-F238E27FC236}">
+                <a16:creationId xmlns:a16="http://schemas.microsoft.com/office/drawing/2014/main" id="{68F193E0-17BE-354F-9C73-7798D07C8ABC}"/>
+              </a:ext>
+            </a:extLst>
+          </p:cNvPr>
+          <p:cNvSpPr/>
+          <p:nvPr/>
+        </p:nvSpPr>
+        <p:spPr>
+          <a:xfrm>
+            <a:off x="3861004" y="5468183"/>
+            <a:ext cx="205905" cy="1285465"/>
+          </a:xfrm>
+          <a:prstGeom prst="parallelogram">
+            <a:avLst>
+              <a:gd name="adj" fmla="val 58482"/>
+            </a:avLst>
+          </a:prstGeom>
+          <a:solidFill>
+            <a:schemeClr val="accent2"/>
+          </a:solidFill>
+          <a:ln>
+            <a:solidFill>
+              <a:srgbClr val="9BBB59"/>
+            </a:solidFill>
+          </a:ln>
+        </p:spPr>
+        <p:style>
+          <a:lnRef idx="1">
+            <a:schemeClr val="accent1"/>
+          </a:lnRef>
+          <a:fillRef idx="3">
+            <a:schemeClr val="accent1"/>
+          </a:fillRef>
+          <a:effectRef idx="2">
+            <a:schemeClr val="accent1"/>
+          </a:effectRef>
+          <a:fontRef idx="minor">
+            <a:schemeClr val="lt1"/>
+          </a:fontRef>
+        </p:style>
+        <p:txBody>
+          <a:bodyPr rtlCol="0" anchor="ctr"/>
+          <a:lstStyle/>
+          <a:p>
+            <a:pPr algn="ctr"/>
+            <a:endParaRPr lang="en-US"/>
+          </a:p>
+        </p:txBody>
+      </p:sp>
+      <p:sp>
+        <p:nvSpPr>
+          <p:cNvPr id="11" name="Teardrop 10">
+            <a:extLst>
+              <a:ext uri="{FF2B5EF4-FFF2-40B4-BE49-F238E27FC236}">
+                <a16:creationId xmlns:a16="http://schemas.microsoft.com/office/drawing/2014/main" id="{D878F709-736E-2744-A8F0-D955B398548B}"/>
+              </a:ext>
+            </a:extLst>
+          </p:cNvPr>
+          <p:cNvSpPr/>
+          <p:nvPr/>
+        </p:nvSpPr>
+        <p:spPr>
+          <a:xfrm rot="1274459">
+            <a:off x="4048208" y="4604837"/>
+            <a:ext cx="542048" cy="1135090"/>
+          </a:xfrm>
+          <a:prstGeom prst="teardrop">
+            <a:avLst>
+              <a:gd name="adj" fmla="val 113077"/>
+            </a:avLst>
+          </a:prstGeom>
+          <a:solidFill>
+            <a:schemeClr val="accent2"/>
+          </a:solidFill>
+          <a:ln>
+            <a:solidFill>
+              <a:schemeClr val="accent3"/>
+            </a:solidFill>
+          </a:ln>
+        </p:spPr>
+        <p:style>
+          <a:lnRef idx="1">
+            <a:schemeClr val="accent1"/>
+          </a:lnRef>
+          <a:fillRef idx="3">
+            <a:schemeClr val="accent1"/>
+          </a:fillRef>
+          <a:effectRef idx="2">
+            <a:schemeClr val="accent1"/>
+          </a:effectRef>
+          <a:fontRef idx="minor">
+            <a:schemeClr val="lt1"/>
+          </a:fontRef>
+        </p:style>
+        <p:txBody>
+          <a:bodyPr/>
+          <a:lstStyle/>
+          <a:p>
+            <a:endParaRPr lang="en-US"/>
+          </a:p>
+        </p:txBody>
+      </p:sp>
+      <p:sp>
+        <p:nvSpPr>
+          <p:cNvPr id="12" name="Teardrop 11">
+            <a:extLst>
+              <a:ext uri="{FF2B5EF4-FFF2-40B4-BE49-F238E27FC236}">
+                <a16:creationId xmlns:a16="http://schemas.microsoft.com/office/drawing/2014/main" id="{3160296C-C113-8B4D-9C97-F0551BC91275}"/>
+              </a:ext>
+            </a:extLst>
+          </p:cNvPr>
+          <p:cNvSpPr/>
+          <p:nvPr/>
+        </p:nvSpPr>
+        <p:spPr>
+          <a:xfrm rot="15175870">
+            <a:off x="3208589" y="4896278"/>
+            <a:ext cx="1135090" cy="542048"/>
+          </a:xfrm>
+          <a:prstGeom prst="teardrop">
+            <a:avLst/>
+          </a:prstGeom>
+          <a:solidFill>
+            <a:schemeClr val="accent2"/>
+          </a:solidFill>
+          <a:ln>
+            <a:solidFill>
+              <a:schemeClr val="accent3"/>
+            </a:solidFill>
+          </a:ln>
+        </p:spPr>
+        <p:style>
+          <a:lnRef idx="1">
+            <a:schemeClr val="accent1"/>
+          </a:lnRef>
+          <a:fillRef idx="3">
+            <a:schemeClr val="accent1"/>
+          </a:fillRef>
+          <a:effectRef idx="2">
+            <a:schemeClr val="accent1"/>
+          </a:effectRef>
+          <a:fontRef idx="minor">
+            <a:schemeClr val="lt1"/>
+          </a:fontRef>
+        </p:style>
+        <p:txBody>
+          <a:bodyPr/>
+          <a:lstStyle/>
+          <a:p>
+            <a:endParaRPr lang="en-US"/>
+          </a:p>
+        </p:txBody>
+      </p:sp>
+      <p:sp>
+        <p:nvSpPr>
+          <p:cNvPr id="13" name="Parallelogram 12">
+            <a:extLst>
+              <a:ext uri="{FF2B5EF4-FFF2-40B4-BE49-F238E27FC236}">
+                <a16:creationId xmlns:a16="http://schemas.microsoft.com/office/drawing/2014/main" id="{006C8DCA-166A-1848-95AB-A2E2918B928A}"/>
+              </a:ext>
+            </a:extLst>
+          </p:cNvPr>
+          <p:cNvSpPr/>
+          <p:nvPr/>
+        </p:nvSpPr>
+        <p:spPr>
+          <a:xfrm>
+            <a:off x="5249460" y="6232556"/>
+            <a:ext cx="69739" cy="459743"/>
+          </a:xfrm>
+          <a:prstGeom prst="parallelogram">
+            <a:avLst>
+              <a:gd name="adj" fmla="val 58482"/>
+            </a:avLst>
+          </a:prstGeom>
+          <a:solidFill>
+            <a:schemeClr val="accent1"/>
+          </a:solidFill>
+          <a:ln>
+            <a:solidFill>
+              <a:srgbClr val="9BBB59"/>
+            </a:solidFill>
+          </a:ln>
+        </p:spPr>
+        <p:style>
+          <a:lnRef idx="1">
+            <a:schemeClr val="accent1"/>
+          </a:lnRef>
+          <a:fillRef idx="3">
+            <a:schemeClr val="accent1"/>
+          </a:fillRef>
+          <a:effectRef idx="2">
+            <a:schemeClr val="accent1"/>
+          </a:effectRef>
+          <a:fontRef idx="minor">
+            <a:schemeClr val="lt1"/>
+          </a:fontRef>
+        </p:style>
+        <p:txBody>
+          <a:bodyPr rtlCol="0" anchor="ctr"/>
+          <a:lstStyle/>
+          <a:p>
+            <a:pPr algn="ctr"/>
+            <a:endParaRPr lang="en-US"/>
+          </a:p>
+        </p:txBody>
+      </p:sp>
+      <p:sp>
+        <p:nvSpPr>
+          <p:cNvPr id="14" name="Teardrop 13">
+            <a:extLst>
+              <a:ext uri="{FF2B5EF4-FFF2-40B4-BE49-F238E27FC236}">
+                <a16:creationId xmlns:a16="http://schemas.microsoft.com/office/drawing/2014/main" id="{9AB9BD61-AFF8-1740-9B18-E9FA134DD8AB}"/>
+              </a:ext>
+            </a:extLst>
+          </p:cNvPr>
+          <p:cNvSpPr/>
+          <p:nvPr/>
+        </p:nvSpPr>
+        <p:spPr>
+          <a:xfrm rot="1274459">
+            <a:off x="5277471" y="5882657"/>
+            <a:ext cx="183590" cy="405962"/>
+          </a:xfrm>
+          <a:prstGeom prst="teardrop">
+            <a:avLst>
+              <a:gd name="adj" fmla="val 113077"/>
+            </a:avLst>
+          </a:prstGeom>
+          <a:solidFill>
+            <a:schemeClr val="accent1"/>
+          </a:solidFill>
+          <a:ln>
+            <a:solidFill>
+              <a:schemeClr val="accent3"/>
+            </a:solidFill>
+          </a:ln>
+        </p:spPr>
+        <p:style>
+          <a:lnRef idx="1">
+            <a:schemeClr val="accent1"/>
+          </a:lnRef>
+          <a:fillRef idx="3">
+            <a:schemeClr val="accent1"/>
+          </a:fillRef>
+          <a:effectRef idx="2">
+            <a:schemeClr val="accent1"/>
+          </a:effectRef>
+          <a:fontRef idx="minor">
+            <a:schemeClr val="lt1"/>
+          </a:fontRef>
+        </p:style>
+        <p:txBody>
+          <a:bodyPr/>
+          <a:lstStyle/>
+          <a:p>
+            <a:endParaRPr lang="en-US"/>
+          </a:p>
+        </p:txBody>
+      </p:sp>
+      <p:sp>
+        <p:nvSpPr>
+          <p:cNvPr id="15" name="Teardrop 14">
+            <a:extLst>
+              <a:ext uri="{FF2B5EF4-FFF2-40B4-BE49-F238E27FC236}">
+                <a16:creationId xmlns:a16="http://schemas.microsoft.com/office/drawing/2014/main" id="{A0CA9A75-C87B-DB46-BF8D-D1C067E41491}"/>
+              </a:ext>
+            </a:extLst>
+          </p:cNvPr>
+          <p:cNvSpPr/>
+          <p:nvPr/>
+        </p:nvSpPr>
+        <p:spPr>
+          <a:xfrm rot="15175870">
+            <a:off x="5045761" y="6009071"/>
+            <a:ext cx="405962" cy="183590"/>
+          </a:xfrm>
+          <a:prstGeom prst="teardrop">
+            <a:avLst/>
+          </a:prstGeom>
+          <a:solidFill>
+            <a:schemeClr val="accent1"/>
+          </a:solidFill>
+          <a:ln>
+            <a:solidFill>
+              <a:schemeClr val="accent3"/>
+            </a:solidFill>
+          </a:ln>
+        </p:spPr>
+        <p:style>
+          <a:lnRef idx="1">
+            <a:schemeClr val="accent1"/>
+          </a:lnRef>
+          <a:fillRef idx="3">
+            <a:schemeClr val="accent1"/>
+          </a:fillRef>
+          <a:effectRef idx="2">
+            <a:schemeClr val="accent1"/>
+          </a:effectRef>
+          <a:fontRef idx="minor">
+            <a:schemeClr val="lt1"/>
+          </a:fontRef>
+        </p:style>
+        <p:txBody>
+          <a:bodyPr/>
+          <a:lstStyle/>
+          <a:p>
+            <a:endParaRPr lang="en-US"/>
+          </a:p>
+        </p:txBody>
+      </p:sp>
+      <p:sp>
+        <p:nvSpPr>
+          <p:cNvPr id="25" name="Parallelogram 24">
+            <a:extLst>
+              <a:ext uri="{FF2B5EF4-FFF2-40B4-BE49-F238E27FC236}">
+                <a16:creationId xmlns:a16="http://schemas.microsoft.com/office/drawing/2014/main" id="{A338B9B2-5CD6-4148-A7C0-916023383721}"/>
+              </a:ext>
+            </a:extLst>
+          </p:cNvPr>
+          <p:cNvSpPr/>
+          <p:nvPr/>
+        </p:nvSpPr>
+        <p:spPr>
+          <a:xfrm>
+            <a:off x="9142055" y="5888087"/>
+            <a:ext cx="103305" cy="830750"/>
+          </a:xfrm>
+          <a:prstGeom prst="parallelogram">
+            <a:avLst>
+              <a:gd name="adj" fmla="val 58482"/>
+            </a:avLst>
+          </a:prstGeom>
+          <a:solidFill>
+            <a:schemeClr val="accent2"/>
+          </a:solidFill>
+          <a:ln>
+            <a:solidFill>
+              <a:schemeClr val="accent3"/>
+            </a:solidFill>
+          </a:ln>
+        </p:spPr>
+        <p:style>
+          <a:lnRef idx="1">
+            <a:schemeClr val="accent1"/>
+          </a:lnRef>
+          <a:fillRef idx="3">
+            <a:schemeClr val="accent1"/>
+          </a:fillRef>
+          <a:effectRef idx="2">
+            <a:schemeClr val="accent1"/>
+          </a:effectRef>
+          <a:fontRef idx="minor">
+            <a:schemeClr val="lt1"/>
+          </a:fontRef>
+        </p:style>
+        <p:txBody>
+          <a:bodyPr rtlCol="0" anchor="ctr"/>
+          <a:lstStyle/>
+          <a:p>
+            <a:pPr algn="ctr"/>
+            <a:endParaRPr lang="en-US"/>
+          </a:p>
+        </p:txBody>
+      </p:sp>
+      <p:sp>
+        <p:nvSpPr>
+          <p:cNvPr id="26" name="Teardrop 25">
+            <a:extLst>
+              <a:ext uri="{FF2B5EF4-FFF2-40B4-BE49-F238E27FC236}">
+                <a16:creationId xmlns:a16="http://schemas.microsoft.com/office/drawing/2014/main" id="{5A091536-9BEC-E34E-B702-62C089374F7F}"/>
+              </a:ext>
+            </a:extLst>
+          </p:cNvPr>
+          <p:cNvSpPr/>
+          <p:nvPr/>
+        </p:nvSpPr>
+        <p:spPr>
+          <a:xfrm rot="1274459">
+            <a:off x="9272789" y="5198774"/>
+            <a:ext cx="271951" cy="733568"/>
+          </a:xfrm>
+          <a:prstGeom prst="teardrop">
+            <a:avLst>
+              <a:gd name="adj" fmla="val 113077"/>
+            </a:avLst>
+          </a:prstGeom>
+          <a:solidFill>
+            <a:schemeClr val="accent2"/>
+          </a:solidFill>
+          <a:ln>
+            <a:solidFill>
+              <a:schemeClr val="accent3"/>
+            </a:solidFill>
+          </a:ln>
+        </p:spPr>
+        <p:style>
+          <a:lnRef idx="1">
+            <a:schemeClr val="accent1"/>
+          </a:lnRef>
+          <a:fillRef idx="3">
+            <a:schemeClr val="accent1"/>
+          </a:fillRef>
+          <a:effectRef idx="2">
+            <a:schemeClr val="accent1"/>
+          </a:effectRef>
+          <a:fontRef idx="minor">
+            <a:schemeClr val="lt1"/>
+          </a:fontRef>
+        </p:style>
+        <p:txBody>
+          <a:bodyPr/>
+          <a:lstStyle/>
+          <a:p>
+            <a:endParaRPr lang="en-US"/>
+          </a:p>
+        </p:txBody>
+      </p:sp>
+      <p:sp>
+        <p:nvSpPr>
+          <p:cNvPr id="27" name="Teardrop 26">
+            <a:extLst>
+              <a:ext uri="{FF2B5EF4-FFF2-40B4-BE49-F238E27FC236}">
+                <a16:creationId xmlns:a16="http://schemas.microsoft.com/office/drawing/2014/main" id="{D3DF2040-90E3-4641-B9B9-E9C5BCB339FB}"/>
+              </a:ext>
+            </a:extLst>
+          </p:cNvPr>
+          <p:cNvSpPr/>
+          <p:nvPr/>
+        </p:nvSpPr>
+        <p:spPr>
+          <a:xfrm rot="15175870">
+            <a:off x="8736622" y="5441098"/>
+            <a:ext cx="733568" cy="271951"/>
+          </a:xfrm>
+          <a:prstGeom prst="teardrop">
+            <a:avLst/>
+          </a:prstGeom>
+          <a:solidFill>
+            <a:schemeClr val="accent2"/>
+          </a:solidFill>
+          <a:ln>
+            <a:solidFill>
+              <a:schemeClr val="accent3"/>
+            </a:solidFill>
+          </a:ln>
+        </p:spPr>
+        <p:style>
+          <a:lnRef idx="1">
+            <a:schemeClr val="accent1"/>
+          </a:lnRef>
+          <a:fillRef idx="3">
+            <a:schemeClr val="accent1"/>
+          </a:fillRef>
+          <a:effectRef idx="2">
+            <a:schemeClr val="accent1"/>
+          </a:effectRef>
+          <a:fontRef idx="minor">
+            <a:schemeClr val="lt1"/>
+          </a:fontRef>
+        </p:style>
+        <p:txBody>
+          <a:bodyPr/>
+          <a:lstStyle/>
+          <a:p>
+            <a:endParaRPr lang="en-US" dirty="0"/>
+          </a:p>
+        </p:txBody>
+      </p:sp>
+      <p:sp>
+        <p:nvSpPr>
+          <p:cNvPr id="28" name="Parallelogram 27">
+            <a:extLst>
+              <a:ext uri="{FF2B5EF4-FFF2-40B4-BE49-F238E27FC236}">
+                <a16:creationId xmlns:a16="http://schemas.microsoft.com/office/drawing/2014/main" id="{32F98EEB-31FB-8C4F-BDC8-1DBDA070F2D3}"/>
+              </a:ext>
+            </a:extLst>
+          </p:cNvPr>
+          <p:cNvSpPr/>
+          <p:nvPr/>
+        </p:nvSpPr>
+        <p:spPr>
+          <a:xfrm>
+            <a:off x="8453653" y="5824834"/>
+            <a:ext cx="129966" cy="956437"/>
+          </a:xfrm>
+          <a:prstGeom prst="parallelogram">
+            <a:avLst>
+              <a:gd name="adj" fmla="val 58482"/>
+            </a:avLst>
+          </a:prstGeom>
+          <a:solidFill>
+            <a:schemeClr val="accent1"/>
+          </a:solidFill>
+          <a:ln>
+            <a:solidFill>
+              <a:schemeClr val="accent3"/>
+            </a:solidFill>
+          </a:ln>
+        </p:spPr>
+        <p:style>
+          <a:lnRef idx="1">
+            <a:schemeClr val="accent1"/>
+          </a:lnRef>
+          <a:fillRef idx="3">
+            <a:schemeClr val="accent1"/>
+          </a:fillRef>
+          <a:effectRef idx="2">
+            <a:schemeClr val="accent1"/>
+          </a:effectRef>
+          <a:fontRef idx="minor">
+            <a:schemeClr val="lt1"/>
+          </a:fontRef>
+        </p:style>
+        <p:txBody>
+          <a:bodyPr rtlCol="0" anchor="ctr"/>
+          <a:lstStyle/>
+          <a:p>
+            <a:pPr algn="ctr"/>
+            <a:endParaRPr lang="en-US"/>
+          </a:p>
+        </p:txBody>
+      </p:sp>
+      <p:sp>
+        <p:nvSpPr>
+          <p:cNvPr id="29" name="Teardrop 28">
+            <a:extLst>
+              <a:ext uri="{FF2B5EF4-FFF2-40B4-BE49-F238E27FC236}">
+                <a16:creationId xmlns:a16="http://schemas.microsoft.com/office/drawing/2014/main" id="{0FACB55D-F1DA-0641-9742-AF1128DFC694}"/>
+              </a:ext>
+            </a:extLst>
+          </p:cNvPr>
+          <p:cNvSpPr/>
+          <p:nvPr/>
+        </p:nvSpPr>
+        <p:spPr>
+          <a:xfrm rot="1274459">
+            <a:off x="8547962" y="5031325"/>
+            <a:ext cx="342137" cy="844552"/>
+          </a:xfrm>
+          <a:prstGeom prst="teardrop">
+            <a:avLst>
+              <a:gd name="adj" fmla="val 113077"/>
+            </a:avLst>
+          </a:prstGeom>
+          <a:solidFill>
+            <a:schemeClr val="accent1"/>
+          </a:solidFill>
+          <a:ln>
+            <a:solidFill>
+              <a:schemeClr val="accent3"/>
+            </a:solidFill>
+          </a:ln>
+        </p:spPr>
+        <p:style>
+          <a:lnRef idx="1">
+            <a:schemeClr val="accent1"/>
+          </a:lnRef>
+          <a:fillRef idx="3">
+            <a:schemeClr val="accent1"/>
+          </a:fillRef>
+          <a:effectRef idx="2">
+            <a:schemeClr val="accent1"/>
+          </a:effectRef>
+          <a:fontRef idx="minor">
+            <a:schemeClr val="lt1"/>
+          </a:fontRef>
+        </p:style>
+        <p:txBody>
+          <a:bodyPr/>
+          <a:lstStyle/>
+          <a:p>
+            <a:endParaRPr lang="en-US"/>
+          </a:p>
+        </p:txBody>
+      </p:sp>
+      <p:sp>
+        <p:nvSpPr>
+          <p:cNvPr id="30" name="Teardrop 29">
+            <a:extLst>
+              <a:ext uri="{FF2B5EF4-FFF2-40B4-BE49-F238E27FC236}">
+                <a16:creationId xmlns:a16="http://schemas.microsoft.com/office/drawing/2014/main" id="{4501E061-A43D-E841-A000-96DF0769F6F7}"/>
+              </a:ext>
+            </a:extLst>
+          </p:cNvPr>
+          <p:cNvSpPr/>
+          <p:nvPr/>
+        </p:nvSpPr>
+        <p:spPr>
+          <a:xfrm rot="15175870">
+            <a:off x="8009272" y="5297704"/>
+            <a:ext cx="844552" cy="342137"/>
+          </a:xfrm>
+          <a:prstGeom prst="teardrop">
+            <a:avLst/>
+          </a:prstGeom>
+          <a:solidFill>
+            <a:schemeClr val="accent1"/>
+          </a:solidFill>
+          <a:ln>
+            <a:solidFill>
+              <a:schemeClr val="accent3"/>
+            </a:solidFill>
+          </a:ln>
+        </p:spPr>
+        <p:style>
+          <a:lnRef idx="1">
+            <a:schemeClr val="accent1"/>
+          </a:lnRef>
+          <a:fillRef idx="3">
+            <a:schemeClr val="accent1"/>
+          </a:fillRef>
+          <a:effectRef idx="2">
+            <a:schemeClr val="accent1"/>
+          </a:effectRef>
+          <a:fontRef idx="minor">
+            <a:schemeClr val="lt1"/>
+          </a:fontRef>
+        </p:style>
+        <p:txBody>
+          <a:bodyPr/>
+          <a:lstStyle/>
+          <a:p>
+            <a:endParaRPr lang="en-US"/>
+          </a:p>
+        </p:txBody>
+      </p:sp>
+      <p:cxnSp>
+        <p:nvCxnSpPr>
+          <p:cNvPr id="31" name="Straight Connector 30">
+            <a:extLst>
+              <a:ext uri="{FF2B5EF4-FFF2-40B4-BE49-F238E27FC236}">
+                <a16:creationId xmlns:a16="http://schemas.microsoft.com/office/drawing/2014/main" id="{1C072FB5-4557-CF41-8B62-BF9CD41E432F}"/>
+              </a:ext>
+            </a:extLst>
+          </p:cNvPr>
+          <p:cNvCxnSpPr>
+            <a:cxnSpLocks/>
+          </p:cNvCxnSpPr>
+          <p:nvPr/>
+        </p:nvCxnSpPr>
+        <p:spPr>
+          <a:xfrm flipV="1">
+            <a:off x="6994587" y="1633139"/>
+            <a:ext cx="0" cy="1"/>
+          </a:xfrm>
+          <a:prstGeom prst="line">
+            <a:avLst/>
+          </a:prstGeom>
+          <a:ln w="76200">
+            <a:solidFill>
+              <a:schemeClr val="bg1">
+                <a:lumMod val="75000"/>
+              </a:schemeClr>
+            </a:solidFill>
+          </a:ln>
+        </p:spPr>
+        <p:style>
+          <a:lnRef idx="2">
+            <a:schemeClr val="accent1"/>
+          </a:lnRef>
+          <a:fillRef idx="0">
+            <a:schemeClr val="accent1"/>
+          </a:fillRef>
+          <a:effectRef idx="1">
+            <a:schemeClr val="accent1"/>
+          </a:effectRef>
+          <a:fontRef idx="minor">
+            <a:schemeClr val="tx1"/>
+          </a:fontRef>
+        </p:style>
+      </p:cxnSp>
+      <p:sp>
+        <p:nvSpPr>
+          <p:cNvPr id="38" name="TextBox 37">
+            <a:extLst>
+              <a:ext uri="{FF2B5EF4-FFF2-40B4-BE49-F238E27FC236}">
+                <a16:creationId xmlns:a16="http://schemas.microsoft.com/office/drawing/2014/main" id="{E3EE636B-E823-4046-8310-AA5F6313542C}"/>
+              </a:ext>
+            </a:extLst>
+          </p:cNvPr>
+          <p:cNvSpPr txBox="1"/>
+          <p:nvPr/>
+        </p:nvSpPr>
+        <p:spPr>
+          <a:xfrm>
+            <a:off x="2151502" y="2093685"/>
+            <a:ext cx="683504" cy="369332"/>
+          </a:xfrm>
+          <a:prstGeom prst="rect">
+            <a:avLst/>
+          </a:prstGeom>
+          <a:noFill/>
+        </p:spPr>
+        <p:txBody>
+          <a:bodyPr wrap="square" rtlCol="0">
+            <a:spAutoFit/>
+          </a:bodyPr>
+          <a:lstStyle/>
+          <a:p>
+            <a:r>
+              <a:rPr lang="en-US" dirty="0">
+                <a:latin typeface="Helvetica" pitchFamily="2" charset="0"/>
+              </a:rPr>
+              <a:t>T</a:t>
+            </a:r>
+            <a:r>
+              <a:rPr lang="en-US" baseline="-25000" dirty="0">
+                <a:latin typeface="Helvetica" pitchFamily="2" charset="0"/>
+              </a:rPr>
+              <a:t>b(j)</a:t>
+            </a:r>
+            <a:endParaRPr lang="en-US" dirty="0">
+              <a:latin typeface="Helvetica" pitchFamily="2" charset="0"/>
+            </a:endParaRPr>
+          </a:p>
+        </p:txBody>
+      </p:sp>
+      <p:sp>
+        <p:nvSpPr>
+          <p:cNvPr id="39" name="Rectangle 38">
+            <a:extLst>
+              <a:ext uri="{FF2B5EF4-FFF2-40B4-BE49-F238E27FC236}">
+                <a16:creationId xmlns:a16="http://schemas.microsoft.com/office/drawing/2014/main" id="{A4CC3B8E-D74B-754A-B132-7B060AF00BF4}"/>
+              </a:ext>
+            </a:extLst>
+          </p:cNvPr>
+          <p:cNvSpPr/>
+          <p:nvPr/>
+        </p:nvSpPr>
+        <p:spPr>
+          <a:xfrm>
+            <a:off x="2400758" y="831892"/>
+            <a:ext cx="546945" cy="369332"/>
+          </a:xfrm>
+          <a:prstGeom prst="rect">
+            <a:avLst/>
+          </a:prstGeom>
+        </p:spPr>
+        <p:txBody>
+          <a:bodyPr wrap="none">
+            <a:spAutoFit/>
+          </a:bodyPr>
+          <a:lstStyle/>
+          <a:p>
+            <a:r>
+              <a:rPr lang="en-US" dirty="0">
+                <a:latin typeface="Helvetica" pitchFamily="2" charset="0"/>
+              </a:rPr>
+              <a:t>T</a:t>
+            </a:r>
+            <a:r>
+              <a:rPr lang="en-US" baseline="-25000" dirty="0">
+                <a:latin typeface="Helvetica" pitchFamily="2" charset="0"/>
+              </a:rPr>
+              <a:t>b(</a:t>
+            </a:r>
+            <a:r>
+              <a:rPr lang="en-US" baseline="-25000" dirty="0" err="1">
+                <a:latin typeface="Helvetica" pitchFamily="2" charset="0"/>
+              </a:rPr>
+              <a:t>i</a:t>
+            </a:r>
+            <a:r>
+              <a:rPr lang="en-US" baseline="-25000" dirty="0">
+                <a:latin typeface="Helvetica" pitchFamily="2" charset="0"/>
+              </a:rPr>
+              <a:t>)</a:t>
+            </a:r>
+            <a:endParaRPr lang="en-US" dirty="0">
+              <a:latin typeface="Helvetica" pitchFamily="2" charset="0"/>
+            </a:endParaRPr>
+          </a:p>
+        </p:txBody>
+      </p:sp>
+      <p:cxnSp>
+        <p:nvCxnSpPr>
+          <p:cNvPr id="4" name="Straight Connector 3">
+            <a:extLst>
+              <a:ext uri="{FF2B5EF4-FFF2-40B4-BE49-F238E27FC236}">
+                <a16:creationId xmlns:a16="http://schemas.microsoft.com/office/drawing/2014/main" id="{9FE7347F-45F9-3740-A8EC-CD826EB6E7A1}"/>
+              </a:ext>
+            </a:extLst>
+          </p:cNvPr>
+          <p:cNvCxnSpPr>
+            <a:cxnSpLocks/>
+          </p:cNvCxnSpPr>
+          <p:nvPr/>
+        </p:nvCxnSpPr>
+        <p:spPr>
+          <a:xfrm flipH="1">
+            <a:off x="1957953" y="4095749"/>
+            <a:ext cx="8539566" cy="0"/>
+          </a:xfrm>
+          <a:prstGeom prst="line">
+            <a:avLst/>
+          </a:prstGeom>
+          <a:ln>
+            <a:solidFill>
+              <a:schemeClr val="tx1"/>
+            </a:solidFill>
+          </a:ln>
+        </p:spPr>
+        <p:style>
+          <a:lnRef idx="2">
+            <a:schemeClr val="accent1"/>
+          </a:lnRef>
+          <a:fillRef idx="0">
+            <a:schemeClr val="accent1"/>
+          </a:fillRef>
+          <a:effectRef idx="1">
+            <a:schemeClr val="accent1"/>
+          </a:effectRef>
+          <a:fontRef idx="minor">
+            <a:schemeClr val="tx1"/>
+          </a:fontRef>
+        </p:style>
+      </p:cxnSp>
+      <p:cxnSp>
+        <p:nvCxnSpPr>
+          <p:cNvPr id="7" name="Straight Connector 6">
+            <a:extLst>
+              <a:ext uri="{FF2B5EF4-FFF2-40B4-BE49-F238E27FC236}">
+                <a16:creationId xmlns:a16="http://schemas.microsoft.com/office/drawing/2014/main" id="{E216DAB4-AB12-5F4B-A5D4-4733603A0064}"/>
+              </a:ext>
+            </a:extLst>
+          </p:cNvPr>
+          <p:cNvCxnSpPr/>
+          <p:nvPr/>
+        </p:nvCxnSpPr>
+        <p:spPr>
+          <a:xfrm flipV="1">
+            <a:off x="1957953" y="831893"/>
+            <a:ext cx="0" cy="3263857"/>
+          </a:xfrm>
+          <a:prstGeom prst="line">
+            <a:avLst/>
+          </a:prstGeom>
+          <a:ln>
+            <a:solidFill>
+              <a:schemeClr val="tx1"/>
+            </a:solidFill>
+          </a:ln>
+        </p:spPr>
+        <p:style>
+          <a:lnRef idx="2">
+            <a:schemeClr val="accent1"/>
+          </a:lnRef>
+          <a:fillRef idx="0">
+            <a:schemeClr val="accent1"/>
+          </a:fillRef>
+          <a:effectRef idx="1">
+            <a:schemeClr val="accent1"/>
+          </a:effectRef>
+          <a:fontRef idx="minor">
+            <a:schemeClr val="tx1"/>
+          </a:fontRef>
+        </p:style>
+      </p:cxnSp>
+      <p:sp>
+        <p:nvSpPr>
+          <p:cNvPr id="18" name="TextBox 17">
+            <a:extLst>
+              <a:ext uri="{FF2B5EF4-FFF2-40B4-BE49-F238E27FC236}">
+                <a16:creationId xmlns:a16="http://schemas.microsoft.com/office/drawing/2014/main" id="{11D13961-4F1D-AA47-8234-98B028AC3501}"/>
+              </a:ext>
+            </a:extLst>
+          </p:cNvPr>
+          <p:cNvSpPr txBox="1"/>
+          <p:nvPr/>
+        </p:nvSpPr>
+        <p:spPr>
+          <a:xfrm>
+            <a:off x="5520066" y="4215916"/>
+            <a:ext cx="2063972" cy="369332"/>
+          </a:xfrm>
+          <a:prstGeom prst="rect">
+            <a:avLst/>
+          </a:prstGeom>
+          <a:noFill/>
+        </p:spPr>
+        <p:txBody>
+          <a:bodyPr wrap="square" rtlCol="0">
+            <a:spAutoFit/>
+          </a:bodyPr>
+          <a:lstStyle/>
+          <a:p>
+            <a:r>
+              <a:rPr lang="en-US" dirty="0"/>
+              <a:t>Stratification time</a:t>
+            </a:r>
+          </a:p>
+        </p:txBody>
+      </p:sp>
+      <p:sp>
+        <p:nvSpPr>
+          <p:cNvPr id="33" name="TextBox 32">
+            <a:extLst>
+              <a:ext uri="{FF2B5EF4-FFF2-40B4-BE49-F238E27FC236}">
+                <a16:creationId xmlns:a16="http://schemas.microsoft.com/office/drawing/2014/main" id="{3C2B7C17-C119-B544-B940-80F5D763FC4B}"/>
+              </a:ext>
+            </a:extLst>
+          </p:cNvPr>
+          <p:cNvSpPr txBox="1"/>
+          <p:nvPr/>
+        </p:nvSpPr>
+        <p:spPr>
+          <a:xfrm rot="16200000">
+            <a:off x="1312331" y="1799952"/>
+            <a:ext cx="781092" cy="369332"/>
+          </a:xfrm>
+          <a:prstGeom prst="rect">
+            <a:avLst/>
+          </a:prstGeom>
+          <a:noFill/>
+        </p:spPr>
+        <p:txBody>
+          <a:bodyPr wrap="square" rtlCol="0">
+            <a:spAutoFit/>
+          </a:bodyPr>
+          <a:lstStyle/>
+          <a:p>
+            <a:r>
+              <a:rPr lang="en-US" dirty="0"/>
+              <a:t>T</a:t>
+            </a:r>
+            <a:r>
+              <a:rPr lang="en-US" baseline="-25000" dirty="0"/>
+              <a:t>b</a:t>
+            </a:r>
+            <a:endParaRPr lang="en-US" dirty="0"/>
+          </a:p>
+        </p:txBody>
+      </p:sp>
+      <p:cxnSp>
+        <p:nvCxnSpPr>
+          <p:cNvPr id="21" name="Straight Connector 20">
+            <a:extLst>
+              <a:ext uri="{FF2B5EF4-FFF2-40B4-BE49-F238E27FC236}">
+                <a16:creationId xmlns:a16="http://schemas.microsoft.com/office/drawing/2014/main" id="{79A80E82-AA55-F947-A089-2E27952D85DB}"/>
+              </a:ext>
+            </a:extLst>
+          </p:cNvPr>
+          <p:cNvCxnSpPr/>
+          <p:nvPr/>
+        </p:nvCxnSpPr>
+        <p:spPr>
+          <a:xfrm flipV="1">
+            <a:off x="4066908" y="936667"/>
+            <a:ext cx="0" cy="3159082"/>
+          </a:xfrm>
+          <a:prstGeom prst="line">
+            <a:avLst/>
+          </a:prstGeom>
+          <a:ln>
+            <a:solidFill>
+              <a:schemeClr val="tx1"/>
+            </a:solidFill>
+            <a:prstDash val="dash"/>
+          </a:ln>
+        </p:spPr>
+        <p:style>
+          <a:lnRef idx="2">
+            <a:schemeClr val="accent1"/>
+          </a:lnRef>
+          <a:fillRef idx="0">
+            <a:schemeClr val="accent1"/>
+          </a:fillRef>
+          <a:effectRef idx="1">
+            <a:schemeClr val="accent1"/>
+          </a:effectRef>
+          <a:fontRef idx="minor">
+            <a:schemeClr val="tx1"/>
+          </a:fontRef>
+        </p:style>
+      </p:cxnSp>
+      <p:cxnSp>
+        <p:nvCxnSpPr>
+          <p:cNvPr id="34" name="Straight Connector 33">
+            <a:extLst>
+              <a:ext uri="{FF2B5EF4-FFF2-40B4-BE49-F238E27FC236}">
+                <a16:creationId xmlns:a16="http://schemas.microsoft.com/office/drawing/2014/main" id="{4255C5CA-B7BA-FB49-A6B5-E47118A508CD}"/>
+              </a:ext>
+            </a:extLst>
+          </p:cNvPr>
+          <p:cNvCxnSpPr/>
+          <p:nvPr/>
+        </p:nvCxnSpPr>
+        <p:spPr>
+          <a:xfrm flipV="1">
+            <a:off x="9407366" y="936667"/>
+            <a:ext cx="0" cy="3159082"/>
+          </a:xfrm>
+          <a:prstGeom prst="line">
+            <a:avLst/>
+          </a:prstGeom>
+          <a:ln>
+            <a:solidFill>
+              <a:schemeClr val="tx1"/>
+            </a:solidFill>
+            <a:prstDash val="dash"/>
+          </a:ln>
+        </p:spPr>
+        <p:style>
+          <a:lnRef idx="2">
+            <a:schemeClr val="accent1"/>
+          </a:lnRef>
+          <a:fillRef idx="0">
+            <a:schemeClr val="accent1"/>
+          </a:fillRef>
+          <a:effectRef idx="1">
+            <a:schemeClr val="accent1"/>
+          </a:effectRef>
+          <a:fontRef idx="minor">
+            <a:schemeClr val="tx1"/>
+          </a:fontRef>
+        </p:style>
+      </p:cxnSp>
+    </p:spTree>
+    <p:extLst>
+      <p:ext uri="{BB962C8B-B14F-4D97-AF65-F5344CB8AC3E}">
+        <p14:creationId xmlns:p14="http://schemas.microsoft.com/office/powerpoint/2010/main" val="456004412"/>
+      </p:ext>
+    </p:extLst>
+  </p:cSld>
+  <p:clrMapOvr>
+    <a:masterClrMapping/>
+  </p:clrMapOvr>
+</p:sld>
+</file>
+
+<file path=ppt/slides/slide4.xml><?xml version="1.0" encoding="utf-8"?>
+<p:sld xmlns:a="http://schemas.openxmlformats.org/drawingml/2006/main" xmlns:r="http://schemas.openxmlformats.org/officeDocument/2006/relationships" xmlns:p="http://schemas.openxmlformats.org/presentationml/2006/main">
+  <p:cSld>
+    <p:spTree>
+      <p:nvGrpSpPr>
+        <p:cNvPr id="1" name=""/>
+        <p:cNvGrpSpPr/>
+        <p:nvPr/>
+      </p:nvGrpSpPr>
+      <p:grpSpPr>
+        <a:xfrm>
+          <a:off x="0" y="0"/>
+          <a:ext cx="0" cy="0"/>
+          <a:chOff x="0" y="0"/>
+          <a:chExt cx="0" cy="0"/>
+        </a:xfrm>
+      </p:grpSpPr>
       <p:pic>
         <p:nvPicPr>
           <p:cNvPr id="2" name="Content Placeholder 5">
@@ -4129,7 +7111,7 @@
           <p:nvPr/>
         </p:nvPicPr>
         <p:blipFill rotWithShape="1">
-          <a:blip r:embed="rId2" cstate="print">
+          <a:blip r:embed="rId3" cstate="print">
             <a:extLst>
               <a:ext uri="{28A0092B-C50C-407E-A947-70E740481C1C}">
                 <a14:useLocalDpi xmlns:a14="http://schemas.microsoft.com/office/drawing/2010/main"/>
@@ -4141,8 +7123,8 @@
         </p:blipFill>
         <p:spPr>
           <a:xfrm rot="19686489">
-            <a:off x="3453097" y="744814"/>
-            <a:ext cx="5125563" cy="4653568"/>
+            <a:off x="3066086" y="656545"/>
+            <a:ext cx="5351048" cy="4858289"/>
           </a:xfrm>
           <a:prstGeom prst="ellipse">
             <a:avLst/>
@@ -4186,7 +7168,7 @@
 </p:sld>
 </file>
 
-<file path=ppt/slides/slide4.xml><?xml version="1.0" encoding="utf-8"?>
+<file path=ppt/slides/slide5.xml><?xml version="1.0" encoding="utf-8"?>
 <p:sld xmlns:a="http://schemas.openxmlformats.org/drawingml/2006/main" xmlns:r="http://schemas.openxmlformats.org/officeDocument/2006/relationships" xmlns:p="http://schemas.openxmlformats.org/presentationml/2006/main">
   <p:cSld>
     <p:spTree>
@@ -4697,7 +7679,7 @@
         </p:blipFill>
         <p:spPr>
           <a:xfrm>
-            <a:off x="-60431" y="-4"/>
+            <a:off x="-55563" y="0"/>
             <a:ext cx="5371539" cy="6858003"/>
           </a:xfrm>
           <a:prstGeom prst="rect">
@@ -4754,7 +7736,7 @@
         </p:nvSpPr>
         <p:spPr>
           <a:xfrm>
-            <a:off x="442913" y="3957638"/>
+            <a:off x="447781" y="3957642"/>
             <a:ext cx="4214812" cy="226676"/>
           </a:xfrm>
           <a:prstGeom prst="rect">
@@ -4853,7 +7835,7 @@
 </p:sld>
 </file>
 
-<file path=ppt/slides/slide5.xml><?xml version="1.0" encoding="utf-8"?>
+<file path=ppt/slides/slide6.xml><?xml version="1.0" encoding="utf-8"?>
 <p:sld xmlns:a="http://schemas.openxmlformats.org/drawingml/2006/main" xmlns:r="http://schemas.openxmlformats.org/officeDocument/2006/relationships" xmlns:p="http://schemas.openxmlformats.org/presentationml/2006/main">
   <p:cSld>
     <p:spTree>
@@ -4930,6 +7912,106 @@
           </a:prstGeom>
         </p:spPr>
       </p:pic>
+      <p:sp>
+        <p:nvSpPr>
+          <p:cNvPr id="7" name="Rectangle 6">
+            <a:extLst>
+              <a:ext uri="{FF2B5EF4-FFF2-40B4-BE49-F238E27FC236}">
+                <a16:creationId xmlns:a16="http://schemas.microsoft.com/office/drawing/2014/main" id="{8CD95878-1B33-9044-9668-24B00FB4984C}"/>
+              </a:ext>
+            </a:extLst>
+          </p:cNvPr>
+          <p:cNvSpPr/>
+          <p:nvPr/>
+        </p:nvSpPr>
+        <p:spPr>
+          <a:xfrm>
+            <a:off x="474873" y="3788310"/>
+            <a:ext cx="4214812" cy="226676"/>
+          </a:xfrm>
+          <a:prstGeom prst="rect">
+            <a:avLst/>
+          </a:prstGeom>
+          <a:noFill/>
+          <a:ln>
+            <a:solidFill>
+              <a:schemeClr val="accent1"/>
+            </a:solidFill>
+          </a:ln>
+        </p:spPr>
+        <p:style>
+          <a:lnRef idx="2">
+            <a:schemeClr val="accent6"/>
+          </a:lnRef>
+          <a:fillRef idx="1">
+            <a:schemeClr val="lt1"/>
+          </a:fillRef>
+          <a:effectRef idx="0">
+            <a:schemeClr val="accent6"/>
+          </a:effectRef>
+          <a:fontRef idx="minor">
+            <a:schemeClr val="dk1"/>
+          </a:fontRef>
+        </p:style>
+        <p:txBody>
+          <a:bodyPr rtlCol="0" anchor="ctr"/>
+          <a:lstStyle/>
+          <a:p>
+            <a:pPr algn="ctr"/>
+            <a:endParaRPr lang="en-US" dirty="0"/>
+          </a:p>
+        </p:txBody>
+      </p:sp>
+      <p:sp>
+        <p:nvSpPr>
+          <p:cNvPr id="8" name="Rectangle 7">
+            <a:extLst>
+              <a:ext uri="{FF2B5EF4-FFF2-40B4-BE49-F238E27FC236}">
+                <a16:creationId xmlns:a16="http://schemas.microsoft.com/office/drawing/2014/main" id="{2F84BAF9-5AB9-0947-9570-2582A4EDECCC}"/>
+              </a:ext>
+            </a:extLst>
+          </p:cNvPr>
+          <p:cNvSpPr/>
+          <p:nvPr/>
+        </p:nvSpPr>
+        <p:spPr>
+          <a:xfrm>
+            <a:off x="450128" y="4086478"/>
+            <a:ext cx="4214812" cy="226676"/>
+          </a:xfrm>
+          <a:prstGeom prst="rect">
+            <a:avLst/>
+          </a:prstGeom>
+          <a:noFill/>
+          <a:ln>
+            <a:solidFill>
+              <a:srgbClr val="FF0000"/>
+            </a:solidFill>
+          </a:ln>
+        </p:spPr>
+        <p:style>
+          <a:lnRef idx="2">
+            <a:schemeClr val="accent6"/>
+          </a:lnRef>
+          <a:fillRef idx="1">
+            <a:schemeClr val="lt1"/>
+          </a:fillRef>
+          <a:effectRef idx="0">
+            <a:schemeClr val="accent6"/>
+          </a:effectRef>
+          <a:fontRef idx="minor">
+            <a:schemeClr val="dk1"/>
+          </a:fontRef>
+        </p:style>
+        <p:txBody>
+          <a:bodyPr rtlCol="0" anchor="ctr"/>
+          <a:lstStyle/>
+          <a:p>
+            <a:pPr algn="ctr"/>
+            <a:endParaRPr lang="en-US" dirty="0"/>
+          </a:p>
+        </p:txBody>
+      </p:sp>
     </p:spTree>
     <p:extLst>
       <p:ext uri="{BB962C8B-B14F-4D97-AF65-F5344CB8AC3E}">
@@ -4943,7 +8025,7 @@
 </p:sld>
 </file>
 
-<file path=ppt/slides/slide6.xml><?xml version="1.0" encoding="utf-8"?>
+<file path=ppt/slides/slide7.xml><?xml version="1.0" encoding="utf-8"?>
 <p:sld xmlns:a="http://schemas.openxmlformats.org/drawingml/2006/main" xmlns:r="http://schemas.openxmlformats.org/officeDocument/2006/relationships" xmlns:p="http://schemas.openxmlformats.org/presentationml/2006/main">
   <p:cSld>
     <p:spTree>
@@ -5309,236 +8391,6 @@
 </p:sld>
 </file>
 
-<file path=ppt/slides/slide7.xml><?xml version="1.0" encoding="utf-8"?>
-<p:sld xmlns:a="http://schemas.openxmlformats.org/drawingml/2006/main" xmlns:r="http://schemas.openxmlformats.org/officeDocument/2006/relationships" xmlns:p="http://schemas.openxmlformats.org/presentationml/2006/main">
-  <p:cSld>
-    <p:spTree>
-      <p:nvGrpSpPr>
-        <p:cNvPr id="1" name=""/>
-        <p:cNvGrpSpPr/>
-        <p:nvPr/>
-      </p:nvGrpSpPr>
-      <p:grpSpPr>
-        <a:xfrm>
-          <a:off x="0" y="0"/>
-          <a:ext cx="0" cy="0"/>
-          <a:chOff x="0" y="0"/>
-          <a:chExt cx="0" cy="0"/>
-        </a:xfrm>
-      </p:grpSpPr>
-      <p:sp>
-        <p:nvSpPr>
-          <p:cNvPr id="4" name="TextBox 3">
-            <a:extLst>
-              <a:ext uri="{FF2B5EF4-FFF2-40B4-BE49-F238E27FC236}">
-                <a16:creationId xmlns:a16="http://schemas.microsoft.com/office/drawing/2014/main" id="{4B153ECD-1AA0-8145-ADDB-BE62378D51C3}"/>
-              </a:ext>
-            </a:extLst>
-          </p:cNvPr>
-          <p:cNvSpPr txBox="1"/>
-          <p:nvPr/>
-        </p:nvSpPr>
-        <p:spPr>
-          <a:xfrm>
-            <a:off x="1470991" y="304800"/>
-            <a:ext cx="8534400" cy="2585323"/>
-          </a:xfrm>
-          <a:prstGeom prst="rect">
-            <a:avLst/>
-          </a:prstGeom>
-          <a:noFill/>
-        </p:spPr>
-        <p:txBody>
-          <a:bodyPr wrap="square" rtlCol="0">
-            <a:spAutoFit/>
-          </a:bodyPr>
-          <a:lstStyle/>
-          <a:p>
-            <a:r>
-              <a:rPr lang="en-US" b="1" dirty="0"/>
-              <a:t>Tradition nonlinear modeling:</a:t>
-            </a:r>
-          </a:p>
-          <a:p>
-            <a:pPr marL="285750" indent="-285750">
-              <a:buFont typeface="Arial" panose="020B0604020202020204" pitchFamily="34" charset="0"/>
-              <a:buChar char="•"/>
-            </a:pPr>
-            <a:r>
-              <a:rPr lang="en-US" dirty="0"/>
-              <a:t>Uses cumulative distribution counts</a:t>
-            </a:r>
-          </a:p>
-          <a:p>
-            <a:pPr marL="285750" indent="-285750">
-              <a:buFont typeface="Arial" panose="020B0604020202020204" pitchFamily="34" charset="0"/>
-              <a:buChar char="•"/>
-            </a:pPr>
-            <a:r>
-              <a:rPr lang="en-US" dirty="0"/>
-              <a:t>Violates assumptions of independence at each observation</a:t>
-            </a:r>
-          </a:p>
-          <a:p>
-            <a:r>
-              <a:rPr lang="en-US" b="1" dirty="0"/>
-              <a:t>Time to event analysis:</a:t>
-            </a:r>
-          </a:p>
-          <a:p>
-            <a:r>
-              <a:rPr lang="en-US" dirty="0"/>
-              <a:t>Survival models and dose-response curves</a:t>
-            </a:r>
-          </a:p>
-          <a:p>
-            <a:pPr marL="285750" indent="-285750">
-              <a:buFont typeface="Arial" panose="020B0604020202020204" pitchFamily="34" charset="0"/>
-              <a:buChar char="•"/>
-            </a:pPr>
-            <a:r>
-              <a:rPr lang="en-US" dirty="0"/>
-              <a:t>Assume all seeds can germinate</a:t>
-            </a:r>
-          </a:p>
-          <a:p>
-            <a:pPr marL="742950" lvl="1" indent="-285750">
-              <a:buFont typeface="Arial" panose="020B0604020202020204" pitchFamily="34" charset="0"/>
-              <a:buChar char="•"/>
-            </a:pPr>
-            <a:r>
-              <a:rPr lang="en-US" dirty="0"/>
-              <a:t>Estimates right censoring (maybe inappropriate for  seeds with dormancy)</a:t>
-            </a:r>
-          </a:p>
-          <a:p>
-            <a:pPr marL="742950" lvl="1" indent="-285750">
-              <a:buFont typeface="Arial" panose="020B0604020202020204" pitchFamily="34" charset="0"/>
-              <a:buChar char="•"/>
-            </a:pPr>
-            <a:r>
-              <a:rPr lang="en-US" dirty="0"/>
-              <a:t>The typical distributions used for germination can’t handle negative time values</a:t>
-            </a:r>
-          </a:p>
-          <a:p>
-            <a:r>
-              <a:rPr lang="en-US" b="1" dirty="0"/>
-              <a:t>Other metrics</a:t>
-            </a:r>
-          </a:p>
-        </p:txBody>
-      </p:sp>
-      <p:pic>
-        <p:nvPicPr>
-          <p:cNvPr id="7" name="Picture 6">
-            <a:extLst>
-              <a:ext uri="{FF2B5EF4-FFF2-40B4-BE49-F238E27FC236}">
-                <a16:creationId xmlns:a16="http://schemas.microsoft.com/office/drawing/2014/main" id="{8968CBF2-128A-9F4D-B5DF-DF5BC1544315}"/>
-              </a:ext>
-            </a:extLst>
-          </p:cNvPr>
-          <p:cNvPicPr>
-            <a:picLocks noChangeAspect="1"/>
-          </p:cNvPicPr>
-          <p:nvPr/>
-        </p:nvPicPr>
-        <p:blipFill>
-          <a:blip r:embed="rId3"/>
-          <a:stretch>
-            <a:fillRect/>
-          </a:stretch>
-        </p:blipFill>
-        <p:spPr>
-          <a:xfrm>
-            <a:off x="1192696" y="2890123"/>
-            <a:ext cx="9463433" cy="2674695"/>
-          </a:xfrm>
-          <a:prstGeom prst="rect">
-            <a:avLst/>
-          </a:prstGeom>
-        </p:spPr>
-      </p:pic>
-      <p:sp>
-        <p:nvSpPr>
-          <p:cNvPr id="8" name="TextBox 7">
-            <a:extLst>
-              <a:ext uri="{FF2B5EF4-FFF2-40B4-BE49-F238E27FC236}">
-                <a16:creationId xmlns:a16="http://schemas.microsoft.com/office/drawing/2014/main" id="{9CA93BCC-6E58-464D-9EE1-A4FECDAAAAAB}"/>
-              </a:ext>
-            </a:extLst>
-          </p:cNvPr>
-          <p:cNvSpPr txBox="1"/>
-          <p:nvPr/>
-        </p:nvSpPr>
-        <p:spPr>
-          <a:xfrm>
-            <a:off x="1470991" y="5186745"/>
-            <a:ext cx="8348870" cy="1477328"/>
-          </a:xfrm>
-          <a:prstGeom prst="rect">
-            <a:avLst/>
-          </a:prstGeom>
-          <a:noFill/>
-        </p:spPr>
-        <p:txBody>
-          <a:bodyPr wrap="square" rtlCol="0">
-            <a:spAutoFit/>
-          </a:bodyPr>
-          <a:lstStyle/>
-          <a:p>
-            <a:r>
-              <a:rPr lang="en-US" b="1" dirty="0"/>
-              <a:t>Hybrid:</a:t>
-            </a:r>
-          </a:p>
-          <a:p>
-            <a:r>
-              <a:rPr lang="en-US" dirty="0"/>
-              <a:t>A:  moldy seed # ~(chilling time, temp) + |species</a:t>
-            </a:r>
-          </a:p>
-          <a:p>
-            <a:r>
-              <a:rPr lang="en-US" dirty="0"/>
-              <a:t>B: Cold germ~ chilling time</a:t>
-            </a:r>
-          </a:p>
-          <a:p>
-            <a:r>
-              <a:rPr lang="en-US" dirty="0"/>
-              <a:t>C: germination model (</a:t>
-            </a:r>
-            <a:r>
-              <a:rPr lang="en-US" dirty="0" err="1"/>
-              <a:t>drc</a:t>
-            </a:r>
-            <a:r>
-              <a:rPr lang="en-US" dirty="0"/>
-              <a:t> or survival)</a:t>
-            </a:r>
-          </a:p>
-          <a:p>
-            <a:r>
-              <a:rPr lang="en-US" dirty="0"/>
-              <a:t>D*: Cure model- how many right censored will germination</a:t>
-            </a:r>
-          </a:p>
-        </p:txBody>
-      </p:sp>
-    </p:spTree>
-    <p:extLst>
-      <p:ext uri="{BB962C8B-B14F-4D97-AF65-F5344CB8AC3E}">
-        <p14:creationId xmlns:p14="http://schemas.microsoft.com/office/powerpoint/2010/main" val="479286616"/>
-      </p:ext>
-    </p:extLst>
-  </p:cSld>
-  <p:clrMapOvr>
-    <a:masterClrMapping/>
-  </p:clrMapOvr>
-</p:sld>
-</file>
-
 <file path=ppt/slides/slide8.xml><?xml version="1.0" encoding="utf-8"?>
 <p:sld xmlns:a="http://schemas.openxmlformats.org/drawingml/2006/main" xmlns:r="http://schemas.openxmlformats.org/officeDocument/2006/relationships" xmlns:p="http://schemas.openxmlformats.org/presentationml/2006/main">
   <p:cSld>
@@ -5556,12 +8408,128 @@
           <a:chExt cx="0" cy="0"/>
         </a:xfrm>
       </p:grpSpPr>
+      <p:sp>
+        <p:nvSpPr>
+          <p:cNvPr id="2" name="TextBox 1">
+            <a:extLst>
+              <a:ext uri="{FF2B5EF4-FFF2-40B4-BE49-F238E27FC236}">
+                <a16:creationId xmlns:a16="http://schemas.microsoft.com/office/drawing/2014/main" id="{BCCCABAE-9369-D144-B489-D2DF40E47C75}"/>
+              </a:ext>
+            </a:extLst>
+          </p:cNvPr>
+          <p:cNvSpPr txBox="1"/>
+          <p:nvPr/>
+        </p:nvSpPr>
+        <p:spPr>
+          <a:xfrm>
+            <a:off x="1470991" y="304800"/>
+            <a:ext cx="8534400" cy="3139321"/>
+          </a:xfrm>
+          <a:prstGeom prst="rect">
+            <a:avLst/>
+          </a:prstGeom>
+          <a:noFill/>
+        </p:spPr>
+        <p:txBody>
+          <a:bodyPr wrap="square" rtlCol="0">
+            <a:spAutoFit/>
+          </a:bodyPr>
+          <a:lstStyle/>
+          <a:p>
+            <a:r>
+              <a:rPr lang="en-US" b="1" dirty="0"/>
+              <a:t>Baskin and Baskin suggest reporting:</a:t>
+            </a:r>
+          </a:p>
+          <a:p>
+            <a:pPr marL="285750" indent="-285750">
+              <a:buFont typeface="Arial" panose="020B0604020202020204" pitchFamily="34" charset="0"/>
+              <a:buChar char="•"/>
+            </a:pPr>
+            <a:r>
+              <a:rPr lang="en-US" dirty="0"/>
+              <a:t>Final germination percentage</a:t>
+            </a:r>
+          </a:p>
+          <a:p>
+            <a:pPr marL="285750" indent="-285750">
+              <a:buFont typeface="Arial" panose="020B0604020202020204" pitchFamily="34" charset="0"/>
+              <a:buChar char="•"/>
+            </a:pPr>
+            <a:r>
+              <a:rPr lang="en-US" dirty="0"/>
+              <a:t>A measure of germination speed (</a:t>
+            </a:r>
+            <a:r>
+              <a:rPr lang="en-US" dirty="0" err="1"/>
+              <a:t>ie</a:t>
+            </a:r>
+            <a:r>
+              <a:rPr lang="en-US" dirty="0"/>
+              <a:t> mean germination time, T50)</a:t>
+            </a:r>
+          </a:p>
+          <a:p>
+            <a:pPr marL="285750" indent="-285750">
+              <a:buFont typeface="Arial" panose="020B0604020202020204" pitchFamily="34" charset="0"/>
+              <a:buChar char="•"/>
+            </a:pPr>
+            <a:r>
+              <a:rPr lang="en-US" dirty="0"/>
+              <a:t>A measure of germination synchrony</a:t>
+            </a:r>
+          </a:p>
+          <a:p>
+            <a:pPr marL="285750" indent="-285750">
+              <a:buFont typeface="Arial" panose="020B0604020202020204" pitchFamily="34" charset="0"/>
+              <a:buChar char="•"/>
+            </a:pPr>
+            <a:endParaRPr lang="en-US" dirty="0"/>
+          </a:p>
+          <a:p>
+            <a:r>
+              <a:rPr lang="en-US" b="1" dirty="0"/>
+              <a:t>Modeling option 1:</a:t>
+            </a:r>
+          </a:p>
+          <a:p>
+            <a:r>
+              <a:rPr lang="en-US" dirty="0"/>
+              <a:t>Each of the above~ stratification duration * incubation temp |species</a:t>
+            </a:r>
+          </a:p>
+          <a:p>
+            <a:pPr lvl="1"/>
+            <a:r>
+              <a:rPr lang="en-US" dirty="0"/>
+              <a:t>Seems hard to make direct interspecific comparison</a:t>
+            </a:r>
+          </a:p>
+          <a:p>
+            <a:pPr lvl="1"/>
+            <a:endParaRPr lang="en-US" dirty="0"/>
+          </a:p>
+          <a:p>
+            <a:endParaRPr lang="en-US" dirty="0"/>
+          </a:p>
+          <a:p>
+            <a:r>
+              <a:rPr lang="en-US" b="1" dirty="0"/>
+              <a:t>1a. </a:t>
+            </a:r>
+            <a:r>
+              <a:rPr lang="en-US" dirty="0"/>
+              <a:t>Add a germination index</a:t>
+            </a:r>
+          </a:p>
+        </p:txBody>
+      </p:sp>
       <p:pic>
         <p:nvPicPr>
-          <p:cNvPr id="12" name="Picture 11">
-            <a:extLst>
-              <a:ext uri="{FF2B5EF4-FFF2-40B4-BE49-F238E27FC236}">
-                <a16:creationId xmlns:a16="http://schemas.microsoft.com/office/drawing/2014/main" id="{FBB02E3E-0B8C-6742-86B4-F54D3C79EE7C}"/>
+          <p:cNvPr id="3" name="Picture 2">
+            <a:extLst>
+              <a:ext uri="{FF2B5EF4-FFF2-40B4-BE49-F238E27FC236}">
+                <a16:creationId xmlns:a16="http://schemas.microsoft.com/office/drawing/2014/main" id="{4A5E73E1-41A6-C640-8177-9896B44FBAE3}"/>
               </a:ext>
             </a:extLst>
           </p:cNvPr>
@@ -5571,129 +8539,25 @@
           <p:nvPr/>
         </p:nvPicPr>
         <p:blipFill>
-          <a:blip r:embed="rId2"/>
+          <a:blip r:embed="rId3"/>
           <a:stretch>
             <a:fillRect/>
           </a:stretch>
         </p:blipFill>
         <p:spPr>
           <a:xfrm>
-            <a:off x="1132202" y="583021"/>
-            <a:ext cx="9337016" cy="5864162"/>
+            <a:off x="1006474" y="3444121"/>
+            <a:ext cx="9463433" cy="2674695"/>
           </a:xfrm>
           <a:prstGeom prst="rect">
             <a:avLst/>
           </a:prstGeom>
         </p:spPr>
       </p:pic>
-      <p:sp>
-        <p:nvSpPr>
-          <p:cNvPr id="14" name="Rectangle 13">
-            <a:extLst>
-              <a:ext uri="{FF2B5EF4-FFF2-40B4-BE49-F238E27FC236}">
-                <a16:creationId xmlns:a16="http://schemas.microsoft.com/office/drawing/2014/main" id="{BFB2E6F4-645C-DE48-B7BA-4CFB4F1D5EA1}"/>
-              </a:ext>
-            </a:extLst>
-          </p:cNvPr>
-          <p:cNvSpPr/>
-          <p:nvPr/>
-        </p:nvSpPr>
-        <p:spPr>
-          <a:xfrm>
-            <a:off x="4903304" y="583021"/>
-            <a:ext cx="1408471" cy="2852529"/>
-          </a:xfrm>
-          <a:prstGeom prst="rect">
-            <a:avLst/>
-          </a:prstGeom>
-          <a:noFill/>
-          <a:ln>
-            <a:solidFill>
-              <a:srgbClr val="FF0000"/>
-            </a:solidFill>
-          </a:ln>
-        </p:spPr>
-        <p:style>
-          <a:lnRef idx="2">
-            <a:schemeClr val="accent1">
-              <a:shade val="50000"/>
-            </a:schemeClr>
-          </a:lnRef>
-          <a:fillRef idx="1">
-            <a:schemeClr val="accent1"/>
-          </a:fillRef>
-          <a:effectRef idx="0">
-            <a:schemeClr val="accent1"/>
-          </a:effectRef>
-          <a:fontRef idx="minor">
-            <a:schemeClr val="lt1"/>
-          </a:fontRef>
-        </p:style>
-        <p:txBody>
-          <a:bodyPr rtlCol="0" anchor="ctr"/>
-          <a:lstStyle/>
-          <a:p>
-            <a:pPr algn="ctr"/>
-            <a:endParaRPr lang="en-US"/>
-          </a:p>
-        </p:txBody>
-      </p:sp>
-      <p:sp>
-        <p:nvSpPr>
-          <p:cNvPr id="15" name="Rectangle 14">
-            <a:extLst>
-              <a:ext uri="{FF2B5EF4-FFF2-40B4-BE49-F238E27FC236}">
-                <a16:creationId xmlns:a16="http://schemas.microsoft.com/office/drawing/2014/main" id="{85EF45B4-C339-BF46-BBA2-D258E6763CC2}"/>
-              </a:ext>
-            </a:extLst>
-          </p:cNvPr>
-          <p:cNvSpPr/>
-          <p:nvPr/>
-        </p:nvSpPr>
-        <p:spPr>
-          <a:xfrm>
-            <a:off x="7630367" y="3435550"/>
-            <a:ext cx="649357" cy="2852529"/>
-          </a:xfrm>
-          <a:prstGeom prst="rect">
-            <a:avLst/>
-          </a:prstGeom>
-          <a:noFill/>
-          <a:ln>
-            <a:solidFill>
-              <a:srgbClr val="FF0000"/>
-            </a:solidFill>
-          </a:ln>
-        </p:spPr>
-        <p:style>
-          <a:lnRef idx="2">
-            <a:schemeClr val="accent1">
-              <a:shade val="50000"/>
-            </a:schemeClr>
-          </a:lnRef>
-          <a:fillRef idx="1">
-            <a:schemeClr val="accent1"/>
-          </a:fillRef>
-          <a:effectRef idx="0">
-            <a:schemeClr val="accent1"/>
-          </a:effectRef>
-          <a:fontRef idx="minor">
-            <a:schemeClr val="lt1"/>
-          </a:fontRef>
-        </p:style>
-        <p:txBody>
-          <a:bodyPr rtlCol="0" anchor="ctr"/>
-          <a:lstStyle/>
-          <a:p>
-            <a:pPr algn="ctr"/>
-            <a:endParaRPr lang="en-US"/>
-          </a:p>
-        </p:txBody>
-      </p:sp>
     </p:spTree>
     <p:extLst>
       <p:ext uri="{BB962C8B-B14F-4D97-AF65-F5344CB8AC3E}">
-        <p14:creationId xmlns:p14="http://schemas.microsoft.com/office/powerpoint/2010/main" val="1463307141"/>
+        <p14:creationId xmlns:p14="http://schemas.microsoft.com/office/powerpoint/2010/main" val="2921935812"/>
       </p:ext>
     </p:extLst>
   </p:cSld>
@@ -5720,40 +8584,194 @@
           <a:chExt cx="0" cy="0"/>
         </a:xfrm>
       </p:grpSpPr>
-      <p:pic>
-        <p:nvPicPr>
-          <p:cNvPr id="3" name="Picture 2">
-            <a:extLst>
-              <a:ext uri="{FF2B5EF4-FFF2-40B4-BE49-F238E27FC236}">
-                <a16:creationId xmlns:a16="http://schemas.microsoft.com/office/drawing/2014/main" id="{36A47C26-3C56-394F-A797-C890129FCC1D}"/>
-              </a:ext>
-            </a:extLst>
-          </p:cNvPr>
-          <p:cNvPicPr>
-            <a:picLocks noChangeAspect="1"/>
-          </p:cNvPicPr>
+      <p:sp>
+        <p:nvSpPr>
+          <p:cNvPr id="4" name="TextBox 3">
+            <a:extLst>
+              <a:ext uri="{FF2B5EF4-FFF2-40B4-BE49-F238E27FC236}">
+                <a16:creationId xmlns:a16="http://schemas.microsoft.com/office/drawing/2014/main" id="{4B153ECD-1AA0-8145-ADDB-BE62378D51C3}"/>
+              </a:ext>
+            </a:extLst>
+          </p:cNvPr>
+          <p:cNvSpPr txBox="1"/>
           <p:nvPr/>
-        </p:nvPicPr>
-        <p:blipFill>
-          <a:blip r:embed="rId2"/>
-          <a:stretch>
-            <a:fillRect/>
-          </a:stretch>
-        </p:blipFill>
+        </p:nvSpPr>
         <p:spPr>
           <a:xfrm>
-            <a:off x="901148" y="289495"/>
-            <a:ext cx="10267088" cy="6210695"/>
+            <a:off x="1470991" y="304800"/>
+            <a:ext cx="8534400" cy="6186309"/>
           </a:xfrm>
           <a:prstGeom prst="rect">
             <a:avLst/>
           </a:prstGeom>
-        </p:spPr>
-      </p:pic>
+          <a:noFill/>
+        </p:spPr>
+        <p:txBody>
+          <a:bodyPr wrap="square" rtlCol="0">
+            <a:spAutoFit/>
+          </a:bodyPr>
+          <a:lstStyle/>
+          <a:p>
+            <a:r>
+              <a:rPr lang="en-US" b="1" dirty="0"/>
+              <a:t>More complicated….</a:t>
+            </a:r>
+          </a:p>
+          <a:p>
+            <a:r>
+              <a:rPr lang="en-US" b="1" dirty="0"/>
+              <a:t>2. Tradition nonlinear modeling:</a:t>
+            </a:r>
+          </a:p>
+          <a:p>
+            <a:pPr marL="285750" indent="-285750">
+              <a:buFont typeface="Arial" panose="020B0604020202020204" pitchFamily="34" charset="0"/>
+              <a:buChar char="•"/>
+            </a:pPr>
+            <a:r>
+              <a:rPr lang="en-US" dirty="0"/>
+              <a:t>Uses cumulative distribution counts</a:t>
+            </a:r>
+          </a:p>
+          <a:p>
+            <a:pPr marL="285750" indent="-285750">
+              <a:buFont typeface="Arial" panose="020B0604020202020204" pitchFamily="34" charset="0"/>
+              <a:buChar char="•"/>
+            </a:pPr>
+            <a:r>
+              <a:rPr lang="en-US" dirty="0"/>
+              <a:t>Violates assumptions of independence at each observation</a:t>
+            </a:r>
+          </a:p>
+          <a:p>
+            <a:pPr marL="285750" indent="-285750">
+              <a:buFont typeface="Arial" panose="020B0604020202020204" pitchFamily="34" charset="0"/>
+              <a:buChar char="•"/>
+            </a:pPr>
+            <a:r>
+              <a:rPr lang="en-US" dirty="0"/>
+              <a:t>Is there a repeat measure type analysis for nonlinear models?</a:t>
+            </a:r>
+          </a:p>
+          <a:p>
+            <a:endParaRPr lang="en-US" b="1" dirty="0"/>
+          </a:p>
+          <a:p>
+            <a:endParaRPr lang="en-US" b="1" dirty="0"/>
+          </a:p>
+          <a:p>
+            <a:r>
+              <a:rPr lang="en-US" b="1" dirty="0"/>
+              <a:t>3. Time to event analysis:</a:t>
+            </a:r>
+          </a:p>
+          <a:p>
+            <a:r>
+              <a:rPr lang="en-US" dirty="0"/>
+              <a:t>Survival models and dose-response curves</a:t>
+            </a:r>
+          </a:p>
+          <a:p>
+            <a:pPr marL="285750" indent="-285750">
+              <a:buFont typeface="Arial" panose="020B0604020202020204" pitchFamily="34" charset="0"/>
+              <a:buChar char="•"/>
+            </a:pPr>
+            <a:r>
+              <a:rPr lang="en-US" dirty="0"/>
+              <a:t>Assume all seeds can germinate</a:t>
+            </a:r>
+          </a:p>
+          <a:p>
+            <a:pPr marL="742950" lvl="1" indent="-285750">
+              <a:buFont typeface="Arial" panose="020B0604020202020204" pitchFamily="34" charset="0"/>
+              <a:buChar char="•"/>
+            </a:pPr>
+            <a:r>
+              <a:rPr lang="en-US" dirty="0"/>
+              <a:t>Estimates right censoring (maybe inappropriate for  seeds with dormancy)</a:t>
+            </a:r>
+          </a:p>
+          <a:p>
+            <a:pPr marL="742950" lvl="1" indent="-285750">
+              <a:buFont typeface="Arial" panose="020B0604020202020204" pitchFamily="34" charset="0"/>
+              <a:buChar char="•"/>
+            </a:pPr>
+            <a:r>
+              <a:rPr lang="en-US" dirty="0"/>
+              <a:t>The typical distributions used for germination can’t handle negative time values (some survival analysis can).</a:t>
+            </a:r>
+          </a:p>
+          <a:p>
+            <a:pPr marL="742950" lvl="1" indent="-285750">
+              <a:buFont typeface="Arial" panose="020B0604020202020204" pitchFamily="34" charset="0"/>
+              <a:buChar char="•"/>
+            </a:pPr>
+            <a:r>
+              <a:rPr lang="en-US" dirty="0"/>
+              <a:t>DRC-rigid packages, doesn’t play well with others, hard to diagnose problems</a:t>
+            </a:r>
+          </a:p>
+          <a:p>
+            <a:pPr marL="742950" lvl="1" indent="-285750">
+              <a:buFont typeface="Arial" panose="020B0604020202020204" pitchFamily="34" charset="0"/>
+              <a:buChar char="•"/>
+            </a:pPr>
+            <a:endParaRPr lang="en-US" b="1" dirty="0"/>
+          </a:p>
+          <a:p>
+            <a:r>
+              <a:rPr lang="en-US" b="1" dirty="0"/>
+              <a:t>4. Some sort of four part hierarchical:</a:t>
+            </a:r>
+          </a:p>
+          <a:p>
+            <a:r>
+              <a:rPr lang="en-US" dirty="0"/>
+              <a:t>A:  moldy seed # ~(chilling time, temp) + |species</a:t>
+            </a:r>
+          </a:p>
+          <a:p>
+            <a:r>
+              <a:rPr lang="en-US" dirty="0"/>
+              <a:t>B: Cold germ~ chilling time</a:t>
+            </a:r>
+          </a:p>
+          <a:p>
+            <a:r>
+              <a:rPr lang="en-US" dirty="0"/>
+              <a:t>C: germination model (</a:t>
+            </a:r>
+            <a:r>
+              <a:rPr lang="en-US" dirty="0" err="1"/>
+              <a:t>drc</a:t>
+            </a:r>
+            <a:r>
+              <a:rPr lang="en-US" dirty="0"/>
+              <a:t> or survival)</a:t>
+            </a:r>
+          </a:p>
+          <a:p>
+            <a:r>
+              <a:rPr lang="en-US" dirty="0"/>
+              <a:t>D*: Cure model- how many right censored will germination</a:t>
+            </a:r>
+          </a:p>
+          <a:p>
+            <a:endParaRPr lang="en-US" dirty="0"/>
+          </a:p>
+          <a:p>
+            <a:pPr marL="742950" lvl="1" indent="-285750">
+              <a:buFont typeface="Arial" panose="020B0604020202020204" pitchFamily="34" charset="0"/>
+              <a:buChar char="•"/>
+            </a:pPr>
+            <a:endParaRPr lang="en-US" dirty="0"/>
+          </a:p>
+        </p:txBody>
+      </p:sp>
     </p:spTree>
     <p:extLst>
       <p:ext uri="{BB962C8B-B14F-4D97-AF65-F5344CB8AC3E}">
-        <p14:creationId xmlns:p14="http://schemas.microsoft.com/office/powerpoint/2010/main" val="1785461122"/>
+        <p14:creationId xmlns:p14="http://schemas.microsoft.com/office/powerpoint/2010/main" val="479286616"/>
       </p:ext>
     </p:extLst>
   </p:cSld>

</xml_diff>